<commit_message>
Complete version of presentation
</commit_message>
<xml_diff>
--- a/presentation/readingFixedFilesInR.pptx
+++ b/presentation/readingFixedFilesInR.pptx
@@ -5,19 +5,29 @@
     <p:sldMasterId id="2147483648" r:id="rId1"/>
   </p:sldMasterIdLst>
   <p:notesMasterIdLst>
-    <p:notesMasterId r:id="rId12"/>
+    <p:notesMasterId r:id="rId22"/>
   </p:notesMasterIdLst>
   <p:sldIdLst>
     <p:sldId id="256" r:id="rId2"/>
     <p:sldId id="257" r:id="rId3"/>
     <p:sldId id="258" r:id="rId4"/>
-    <p:sldId id="259" r:id="rId5"/>
+    <p:sldId id="266" r:id="rId5"/>
     <p:sldId id="261" r:id="rId6"/>
     <p:sldId id="260" r:id="rId7"/>
     <p:sldId id="263" r:id="rId8"/>
     <p:sldId id="262" r:id="rId9"/>
     <p:sldId id="264" r:id="rId10"/>
     <p:sldId id="265" r:id="rId11"/>
+    <p:sldId id="268" r:id="rId12"/>
+    <p:sldId id="267" r:id="rId13"/>
+    <p:sldId id="269" r:id="rId14"/>
+    <p:sldId id="270" r:id="rId15"/>
+    <p:sldId id="271" r:id="rId16"/>
+    <p:sldId id="272" r:id="rId17"/>
+    <p:sldId id="273" r:id="rId18"/>
+    <p:sldId id="274" r:id="rId19"/>
+    <p:sldId id="275" r:id="rId20"/>
+    <p:sldId id="276" r:id="rId21"/>
   </p:sldIdLst>
   <p:sldSz cx="12192000" cy="6858000"/>
   <p:notesSz cx="6858000" cy="9144000"/>
@@ -116,6 +126,11 @@
       </a:defRPr>
     </a:lvl9pPr>
   </p:defaultTextStyle>
+  <p:extLst>
+    <p:ext uri="{EFAFB233-063F-42B5-8137-9DF3F51BA10A}">
+      <p15:sldGuideLst xmlns:p15="http://schemas.microsoft.com/office/powerpoint/2012/main"/>
+    </p:ext>
+  </p:extLst>
 </p:presentation>
 </file>
 
@@ -580,6 +595,261 @@
 </p:notes>
 </file>
 
+<file path=ppt/notesSlides/notesSlide2.xml><?xml version="1.0" encoding="utf-8"?>
+<p:notes xmlns:a="http://schemas.openxmlformats.org/drawingml/2006/main" xmlns:r="http://schemas.openxmlformats.org/officeDocument/2006/relationships" xmlns:p="http://schemas.openxmlformats.org/presentationml/2006/main">
+  <p:cSld>
+    <p:spTree>
+      <p:nvGrpSpPr>
+        <p:cNvPr id="1" name=""/>
+        <p:cNvGrpSpPr/>
+        <p:nvPr/>
+      </p:nvGrpSpPr>
+      <p:grpSpPr>
+        <a:xfrm>
+          <a:off x="0" y="0"/>
+          <a:ext cx="0" cy="0"/>
+          <a:chOff x="0" y="0"/>
+          <a:chExt cx="0" cy="0"/>
+        </a:xfrm>
+      </p:grpSpPr>
+      <p:sp>
+        <p:nvSpPr>
+          <p:cNvPr id="2" name="Slide Image Placeholder 1"/>
+          <p:cNvSpPr>
+            <a:spLocks noGrp="1" noRot="1" noChangeAspect="1"/>
+          </p:cNvSpPr>
+          <p:nvPr>
+            <p:ph type="sldImg"/>
+          </p:nvPr>
+        </p:nvSpPr>
+        <p:spPr/>
+      </p:sp>
+      <p:sp>
+        <p:nvSpPr>
+          <p:cNvPr id="3" name="Notes Placeholder 2"/>
+          <p:cNvSpPr>
+            <a:spLocks noGrp="1"/>
+          </p:cNvSpPr>
+          <p:nvPr>
+            <p:ph type="body" idx="1"/>
+          </p:nvPr>
+        </p:nvSpPr>
+        <p:spPr/>
+        <p:txBody>
+          <a:bodyPr/>
+          <a:lstStyle/>
+          <a:p>
+            <a:endParaRPr lang="en-US" dirty="0"/>
+          </a:p>
+        </p:txBody>
+      </p:sp>
+      <p:sp>
+        <p:nvSpPr>
+          <p:cNvPr id="4" name="Slide Number Placeholder 3"/>
+          <p:cNvSpPr>
+            <a:spLocks noGrp="1"/>
+          </p:cNvSpPr>
+          <p:nvPr>
+            <p:ph type="sldNum" sz="quarter" idx="5"/>
+          </p:nvPr>
+        </p:nvSpPr>
+        <p:spPr/>
+        <p:txBody>
+          <a:bodyPr/>
+          <a:lstStyle/>
+          <a:p>
+            <a:fld id="{ABA03B9F-5CD9-F644-B9E1-D29863D066F7}" type="slidenum">
+              <a:rPr lang="en-US" smtClean="0"/>
+              <a:t>4</a:t>
+            </a:fld>
+            <a:endParaRPr lang="en-US"/>
+          </a:p>
+        </p:txBody>
+      </p:sp>
+    </p:spTree>
+    <p:extLst>
+      <p:ext uri="{BB962C8B-B14F-4D97-AF65-F5344CB8AC3E}">
+        <p14:creationId xmlns:p14="http://schemas.microsoft.com/office/powerpoint/2010/main" val="1494094929"/>
+      </p:ext>
+    </p:extLst>
+  </p:cSld>
+  <p:clrMapOvr>
+    <a:masterClrMapping/>
+  </p:clrMapOvr>
+</p:notes>
+</file>
+
+<file path=ppt/notesSlides/notesSlide3.xml><?xml version="1.0" encoding="utf-8"?>
+<p:notes xmlns:a="http://schemas.openxmlformats.org/drawingml/2006/main" xmlns:r="http://schemas.openxmlformats.org/officeDocument/2006/relationships" xmlns:p="http://schemas.openxmlformats.org/presentationml/2006/main">
+  <p:cSld>
+    <p:spTree>
+      <p:nvGrpSpPr>
+        <p:cNvPr id="1" name=""/>
+        <p:cNvGrpSpPr/>
+        <p:nvPr/>
+      </p:nvGrpSpPr>
+      <p:grpSpPr>
+        <a:xfrm>
+          <a:off x="0" y="0"/>
+          <a:ext cx="0" cy="0"/>
+          <a:chOff x="0" y="0"/>
+          <a:chExt cx="0" cy="0"/>
+        </a:xfrm>
+      </p:grpSpPr>
+      <p:sp>
+        <p:nvSpPr>
+          <p:cNvPr id="2" name="Slide Image Placeholder 1"/>
+          <p:cNvSpPr>
+            <a:spLocks noGrp="1" noRot="1" noChangeAspect="1"/>
+          </p:cNvSpPr>
+          <p:nvPr>
+            <p:ph type="sldImg"/>
+          </p:nvPr>
+        </p:nvSpPr>
+        <p:spPr/>
+      </p:sp>
+      <p:sp>
+        <p:nvSpPr>
+          <p:cNvPr id="3" name="Notes Placeholder 2"/>
+          <p:cNvSpPr>
+            <a:spLocks noGrp="1"/>
+          </p:cNvSpPr>
+          <p:nvPr>
+            <p:ph type="body" idx="1"/>
+          </p:nvPr>
+        </p:nvSpPr>
+        <p:spPr/>
+        <p:txBody>
+          <a:bodyPr/>
+          <a:lstStyle/>
+          <a:p>
+            <a:endParaRPr lang="en-US" dirty="0"/>
+          </a:p>
+        </p:txBody>
+      </p:sp>
+      <p:sp>
+        <p:nvSpPr>
+          <p:cNvPr id="4" name="Slide Number Placeholder 3"/>
+          <p:cNvSpPr>
+            <a:spLocks noGrp="1"/>
+          </p:cNvSpPr>
+          <p:nvPr>
+            <p:ph type="sldNum" sz="quarter" idx="5"/>
+          </p:nvPr>
+        </p:nvSpPr>
+        <p:spPr/>
+        <p:txBody>
+          <a:bodyPr/>
+          <a:lstStyle/>
+          <a:p>
+            <a:fld id="{ABA03B9F-5CD9-F644-B9E1-D29863D066F7}" type="slidenum">
+              <a:rPr lang="en-US" smtClean="0"/>
+              <a:t>6</a:t>
+            </a:fld>
+            <a:endParaRPr lang="en-US"/>
+          </a:p>
+        </p:txBody>
+      </p:sp>
+    </p:spTree>
+    <p:extLst>
+      <p:ext uri="{BB962C8B-B14F-4D97-AF65-F5344CB8AC3E}">
+        <p14:creationId xmlns:p14="http://schemas.microsoft.com/office/powerpoint/2010/main" val="2723283186"/>
+      </p:ext>
+    </p:extLst>
+  </p:cSld>
+  <p:clrMapOvr>
+    <a:masterClrMapping/>
+  </p:clrMapOvr>
+</p:notes>
+</file>
+
+<file path=ppt/notesSlides/notesSlide4.xml><?xml version="1.0" encoding="utf-8"?>
+<p:notes xmlns:a="http://schemas.openxmlformats.org/drawingml/2006/main" xmlns:r="http://schemas.openxmlformats.org/officeDocument/2006/relationships" xmlns:p="http://schemas.openxmlformats.org/presentationml/2006/main">
+  <p:cSld>
+    <p:spTree>
+      <p:nvGrpSpPr>
+        <p:cNvPr id="1" name=""/>
+        <p:cNvGrpSpPr/>
+        <p:nvPr/>
+      </p:nvGrpSpPr>
+      <p:grpSpPr>
+        <a:xfrm>
+          <a:off x="0" y="0"/>
+          <a:ext cx="0" cy="0"/>
+          <a:chOff x="0" y="0"/>
+          <a:chExt cx="0" cy="0"/>
+        </a:xfrm>
+      </p:grpSpPr>
+      <p:sp>
+        <p:nvSpPr>
+          <p:cNvPr id="2" name="Slide Image Placeholder 1"/>
+          <p:cNvSpPr>
+            <a:spLocks noGrp="1" noRot="1" noChangeAspect="1"/>
+          </p:cNvSpPr>
+          <p:nvPr>
+            <p:ph type="sldImg"/>
+          </p:nvPr>
+        </p:nvSpPr>
+        <p:spPr/>
+      </p:sp>
+      <p:sp>
+        <p:nvSpPr>
+          <p:cNvPr id="3" name="Notes Placeholder 2"/>
+          <p:cNvSpPr>
+            <a:spLocks noGrp="1"/>
+          </p:cNvSpPr>
+          <p:nvPr>
+            <p:ph type="body" idx="1"/>
+          </p:nvPr>
+        </p:nvSpPr>
+        <p:spPr/>
+        <p:txBody>
+          <a:bodyPr/>
+          <a:lstStyle/>
+          <a:p>
+            <a:r>
+              <a:rPr lang="en-US" dirty="0"/>
+              <a:t>Reading of hierarchical files is a big weak spot in R. </a:t>
+            </a:r>
+          </a:p>
+        </p:txBody>
+      </p:sp>
+      <p:sp>
+        <p:nvSpPr>
+          <p:cNvPr id="4" name="Slide Number Placeholder 3"/>
+          <p:cNvSpPr>
+            <a:spLocks noGrp="1"/>
+          </p:cNvSpPr>
+          <p:nvPr>
+            <p:ph type="sldNum" sz="quarter" idx="5"/>
+          </p:nvPr>
+        </p:nvSpPr>
+        <p:spPr/>
+        <p:txBody>
+          <a:bodyPr/>
+          <a:lstStyle/>
+          <a:p>
+            <a:fld id="{ABA03B9F-5CD9-F644-B9E1-D29863D066F7}" type="slidenum">
+              <a:rPr lang="en-US" smtClean="0"/>
+              <a:t>10</a:t>
+            </a:fld>
+            <a:endParaRPr lang="en-US"/>
+          </a:p>
+        </p:txBody>
+      </p:sp>
+    </p:spTree>
+    <p:extLst>
+      <p:ext uri="{BB962C8B-B14F-4D97-AF65-F5344CB8AC3E}">
+        <p14:creationId xmlns:p14="http://schemas.microsoft.com/office/powerpoint/2010/main" val="850264694"/>
+      </p:ext>
+    </p:extLst>
+  </p:cSld>
+  <p:clrMapOvr>
+    <a:masterClrMapping/>
+  </p:clrMapOvr>
+</p:notes>
+</file>
+
 <file path=ppt/slideLayouts/slideLayout1.xml><?xml version="1.0" encoding="utf-8"?>
 <p:sldLayout xmlns:a="http://schemas.openxmlformats.org/drawingml/2006/main" xmlns:r="http://schemas.openxmlformats.org/officeDocument/2006/relationships" xmlns:p="http://schemas.openxmlformats.org/presentationml/2006/main" type="title" preserve="1">
   <p:cSld name="Title Slide">
@@ -2389,10 +2659,21 @@
             <p:ph type="title"/>
           </p:nvPr>
         </p:nvSpPr>
-        <p:spPr/>
-        <p:txBody>
-          <a:bodyPr/>
-          <a:lstStyle/>
+        <p:spPr>
+          <a:xfrm>
+            <a:off x="838200" y="275475"/>
+            <a:ext cx="10515600" cy="1078193"/>
+          </a:xfrm>
+        </p:spPr>
+        <p:txBody>
+          <a:bodyPr/>
+          <a:lstStyle>
+            <a:lvl1pPr>
+              <a:defRPr>
+                <a:latin typeface="+mn-lt"/>
+              </a:defRPr>
+            </a:lvl1pPr>
+          </a:lstStyle>
           <a:p>
             <a:r>
               <a:rPr lang="en-US"/>
@@ -3445,7 +3726,7 @@
         <p:spPr>
           <a:xfrm>
             <a:off x="8610600" y="6356350"/>
-            <a:ext cx="2743200" cy="365125"/>
+            <a:ext cx="883257" cy="365125"/>
           </a:xfrm>
           <a:prstGeom prst="rect">
             <a:avLst/>
@@ -3469,7 +3750,113 @@
               <a:rPr lang="en-US" smtClean="0"/>
               <a:t>‹#›</a:t>
             </a:fld>
-            <a:endParaRPr lang="en-US"/>
+            <a:endParaRPr lang="en-US" dirty="0"/>
+          </a:p>
+        </p:txBody>
+      </p:sp>
+      <p:pic>
+        <p:nvPicPr>
+          <p:cNvPr id="8" name="Graphic 7">
+            <a:extLst>
+              <a:ext uri="{FF2B5EF4-FFF2-40B4-BE49-F238E27FC236}">
+                <a16:creationId xmlns:a16="http://schemas.microsoft.com/office/drawing/2014/main" id="{6D1FC506-F304-8143-95AB-89B7696F03FD}"/>
+              </a:ext>
+            </a:extLst>
+          </p:cNvPr>
+          <p:cNvPicPr>
+            <a:picLocks noChangeAspect="1"/>
+          </p:cNvPicPr>
+          <p:nvPr userDrawn="1"/>
+        </p:nvPicPr>
+        <p:blipFill>
+          <a:blip r:embed="rId13">
+            <a:extLst>
+              <a:ext uri="{96DAC541-7B7A-43D3-8B79-37D633B846F1}">
+                <asvg:svgBlip xmlns:asvg="http://schemas.microsoft.com/office/drawing/2016/SVG/main" r:embed="rId14"/>
+              </a:ext>
+            </a:extLst>
+          </a:blip>
+          <a:stretch>
+            <a:fillRect/>
+          </a:stretch>
+        </p:blipFill>
+        <p:spPr>
+          <a:xfrm>
+            <a:off x="10139441" y="6356350"/>
+            <a:ext cx="506709" cy="391930"/>
+          </a:xfrm>
+          <a:prstGeom prst="rect">
+            <a:avLst/>
+          </a:prstGeom>
+        </p:spPr>
+      </p:pic>
+      <p:sp>
+        <p:nvSpPr>
+          <p:cNvPr id="9" name="TextBox 8">
+            <a:extLst>
+              <a:ext uri="{FF2B5EF4-FFF2-40B4-BE49-F238E27FC236}">
+                <a16:creationId xmlns:a16="http://schemas.microsoft.com/office/drawing/2014/main" id="{9B92B80B-6CD2-0743-A9C0-19E010D79675}"/>
+              </a:ext>
+            </a:extLst>
+          </p:cNvPr>
+          <p:cNvSpPr txBox="1"/>
+          <p:nvPr userDrawn="1"/>
+        </p:nvSpPr>
+        <p:spPr>
+          <a:xfrm>
+            <a:off x="9676737" y="6367649"/>
+            <a:ext cx="556592" cy="369332"/>
+          </a:xfrm>
+          <a:prstGeom prst="rect">
+            <a:avLst/>
+          </a:prstGeom>
+          <a:noFill/>
+        </p:spPr>
+        <p:txBody>
+          <a:bodyPr wrap="square" rtlCol="0">
+            <a:spAutoFit/>
+          </a:bodyPr>
+          <a:lstStyle/>
+          <a:p>
+            <a:r>
+              <a:rPr lang="en-US" dirty="0"/>
+              <a:t>ATL</a:t>
+            </a:r>
+          </a:p>
+        </p:txBody>
+      </p:sp>
+      <p:sp>
+        <p:nvSpPr>
+          <p:cNvPr id="10" name="TextBox 9">
+            <a:extLst>
+              <a:ext uri="{FF2B5EF4-FFF2-40B4-BE49-F238E27FC236}">
+                <a16:creationId xmlns:a16="http://schemas.microsoft.com/office/drawing/2014/main" id="{BC27DA13-ADDF-AE49-9157-5DD1EA74697E}"/>
+              </a:ext>
+            </a:extLst>
+          </p:cNvPr>
+          <p:cNvSpPr txBox="1"/>
+          <p:nvPr userDrawn="1"/>
+        </p:nvSpPr>
+        <p:spPr>
+          <a:xfrm>
+            <a:off x="10614912" y="6367649"/>
+            <a:ext cx="1446004" cy="369332"/>
+          </a:xfrm>
+          <a:prstGeom prst="rect">
+            <a:avLst/>
+          </a:prstGeom>
+          <a:noFill/>
+        </p:spPr>
+        <p:txBody>
+          <a:bodyPr wrap="square" rtlCol="0">
+            <a:spAutoFit/>
+          </a:bodyPr>
+          <a:lstStyle/>
+          <a:p>
+            <a:r>
+              <a:rPr lang="en-US" dirty="0"/>
+              <a:t>Users Group</a:t>
+            </a:r>
           </a:p>
         </p:txBody>
       </p:sp>
@@ -3508,7 +3895,7 @@
           <a:solidFill>
             <a:schemeClr val="tx1"/>
           </a:solidFill>
-          <a:latin typeface="+mj-lt"/>
+          <a:latin typeface="+mn-lt"/>
           <a:ea typeface="+mj-ea"/>
           <a:cs typeface="+mj-cs"/>
         </a:defRPr>
@@ -3840,8 +4227,13 @@
         </p:nvSpPr>
         <p:spPr/>
         <p:txBody>
-          <a:bodyPr/>
-          <a:lstStyle/>
+          <a:bodyPr>
+            <a:normAutofit fontScale="92500" lnSpcReduction="20000"/>
+          </a:bodyPr>
+          <a:lstStyle/>
+          <a:p>
+            <a:endParaRPr lang="en-US" dirty="0"/>
+          </a:p>
           <a:p>
             <a:r>
               <a:rPr lang="en-US" dirty="0"/>
@@ -3850,13 +4242,6 @@
             <a:r>
               <a:rPr lang="en-US" dirty="0" err="1"/>
               <a:t>Greski</a:t>
-            </a:r>
-            <a:endParaRPr lang="en-US" dirty="0"/>
-          </a:p>
-          <a:p>
-            <a:r>
-              <a:rPr lang="en-US" dirty="0"/>
-              <a:t>Atlanta R Users Group</a:t>
             </a:r>
             <a:br>
               <a:rPr lang="en-US" dirty="0"/>
@@ -3864,6 +4249,15 @@
             <a:r>
               <a:rPr lang="en-US" dirty="0"/>
               <a:t>January 28, 2021</a:t>
+            </a:r>
+          </a:p>
+          <a:p>
+            <a:endParaRPr lang="en-US" dirty="0"/>
+          </a:p>
+          <a:p>
+            <a:r>
+              <a:rPr lang="en-US" sz="1700" dirty="0"/>
+              <a:t>Level: basic / intermediate</a:t>
             </a:r>
           </a:p>
         </p:txBody>
@@ -3914,14 +4308,180 @@
             <p:ph type="title"/>
           </p:nvPr>
         </p:nvSpPr>
-        <p:spPr/>
-        <p:txBody>
-          <a:bodyPr/>
-          <a:lstStyle/>
-          <a:p>
+        <p:spPr>
+          <a:xfrm>
+            <a:off x="838200" y="365126"/>
+            <a:ext cx="10515600" cy="1032600"/>
+          </a:xfrm>
+        </p:spPr>
+        <p:txBody>
+          <a:bodyPr>
+            <a:normAutofit/>
+          </a:bodyPr>
+          <a:lstStyle/>
+          <a:p>
+            <a:r>
+              <a:rPr lang="en-US" sz="3200" dirty="0"/>
+              <a:t>A hierarchical file: 2000 American Community Survey data</a:t>
+            </a:r>
+          </a:p>
+        </p:txBody>
+      </p:sp>
+      <p:pic>
+        <p:nvPicPr>
+          <p:cNvPr id="3" name="Picture 2">
+            <a:extLst>
+              <a:ext uri="{FF2B5EF4-FFF2-40B4-BE49-F238E27FC236}">
+                <a16:creationId xmlns:a16="http://schemas.microsoft.com/office/drawing/2014/main" id="{88799DF9-C12F-4642-B08C-DDAE451107AC}"/>
+              </a:ext>
+            </a:extLst>
+          </p:cNvPr>
+          <p:cNvPicPr>
+            <a:picLocks noChangeAspect="1"/>
+          </p:cNvPicPr>
+          <p:nvPr/>
+        </p:nvPicPr>
+        <p:blipFill>
+          <a:blip r:embed="rId3"/>
+          <a:stretch>
+            <a:fillRect/>
+          </a:stretch>
+        </p:blipFill>
+        <p:spPr>
+          <a:xfrm>
+            <a:off x="838200" y="1397726"/>
+            <a:ext cx="6752511" cy="4467497"/>
+          </a:xfrm>
+          <a:prstGeom prst="rect">
+            <a:avLst/>
+          </a:prstGeom>
+        </p:spPr>
+      </p:pic>
+      <p:sp>
+        <p:nvSpPr>
+          <p:cNvPr id="4" name="TextBox 3">
+            <a:extLst>
+              <a:ext uri="{FF2B5EF4-FFF2-40B4-BE49-F238E27FC236}">
+                <a16:creationId xmlns:a16="http://schemas.microsoft.com/office/drawing/2014/main" id="{C8750EF0-BDFC-6844-85A7-38FE4573136A}"/>
+              </a:ext>
+            </a:extLst>
+          </p:cNvPr>
+          <p:cNvSpPr txBox="1"/>
+          <p:nvPr/>
+        </p:nvSpPr>
+        <p:spPr>
+          <a:xfrm>
+            <a:off x="7929155" y="2782669"/>
+            <a:ext cx="3752502" cy="2031325"/>
+          </a:xfrm>
+          <a:prstGeom prst="rect">
+            <a:avLst/>
+          </a:prstGeom>
+          <a:noFill/>
+        </p:spPr>
+        <p:txBody>
+          <a:bodyPr wrap="none" rtlCol="0">
+            <a:spAutoFit/>
+          </a:bodyPr>
+          <a:lstStyle/>
+          <a:p>
+            <a:pPr marL="285750" indent="-285750">
+              <a:buFont typeface="Arial" panose="020B0604020202020204" pitchFamily="34" charset="0"/>
+              <a:buChar char="•"/>
+            </a:pPr>
             <a:r>
               <a:rPr lang="en-US" dirty="0"/>
-              <a:t>A more complicated file: </a:t>
+              <a:t>Two types of records, Household</a:t>
+            </a:r>
+            <a:br>
+              <a:rPr lang="en-US" dirty="0"/>
+            </a:br>
+            <a:r>
+              <a:rPr lang="en-US" dirty="0"/>
+              <a:t>and Person </a:t>
+            </a:r>
+          </a:p>
+          <a:p>
+            <a:pPr marL="285750" indent="-285750">
+              <a:buFont typeface="Arial" panose="020B0604020202020204" pitchFamily="34" charset="0"/>
+              <a:buChar char="•"/>
+            </a:pPr>
+            <a:r>
+              <a:rPr lang="en-US" dirty="0"/>
+              <a:t>Data elements vary by record type</a:t>
+            </a:r>
+          </a:p>
+          <a:p>
+            <a:pPr marL="285750" indent="-285750">
+              <a:buFont typeface="Arial" panose="020B0604020202020204" pitchFamily="34" charset="0"/>
+              <a:buChar char="•"/>
+            </a:pPr>
+            <a:r>
+              <a:rPr lang="en-US" dirty="0"/>
+              <a:t>Varying numbers of person records</a:t>
+            </a:r>
+            <a:br>
+              <a:rPr lang="en-US" dirty="0"/>
+            </a:br>
+            <a:r>
+              <a:rPr lang="en-US" dirty="0"/>
+              <a:t>per household </a:t>
+            </a:r>
+          </a:p>
+          <a:p>
+            <a:pPr marL="285750" indent="-285750">
+              <a:buFont typeface="Arial" panose="020B0604020202020204" pitchFamily="34" charset="0"/>
+              <a:buChar char="•"/>
+            </a:pPr>
+            <a:r>
+              <a:rPr lang="en-US" dirty="0"/>
+              <a:t>Data on each type of record is in</a:t>
+            </a:r>
+            <a:br>
+              <a:rPr lang="en-US" dirty="0"/>
+            </a:br>
+            <a:r>
+              <a:rPr lang="en-US" dirty="0"/>
+              <a:t>fixed format</a:t>
+            </a:r>
+          </a:p>
+        </p:txBody>
+      </p:sp>
+      <p:sp>
+        <p:nvSpPr>
+          <p:cNvPr id="5" name="TextBox 4">
+            <a:extLst>
+              <a:ext uri="{FF2B5EF4-FFF2-40B4-BE49-F238E27FC236}">
+                <a16:creationId xmlns:a16="http://schemas.microsoft.com/office/drawing/2014/main" id="{3DC7E886-D15F-9147-9EC8-7E0A7D62C320}"/>
+              </a:ext>
+            </a:extLst>
+          </p:cNvPr>
+          <p:cNvSpPr txBox="1"/>
+          <p:nvPr/>
+        </p:nvSpPr>
+        <p:spPr>
+          <a:xfrm>
+            <a:off x="838200" y="6124176"/>
+            <a:ext cx="7422738" cy="400110"/>
+          </a:xfrm>
+          <a:prstGeom prst="rect">
+            <a:avLst/>
+          </a:prstGeom>
+          <a:noFill/>
+        </p:spPr>
+        <p:txBody>
+          <a:bodyPr wrap="none" rtlCol="0">
+            <a:spAutoFit/>
+          </a:bodyPr>
+          <a:lstStyle/>
+          <a:p>
+            <a:r>
+              <a:rPr lang="en-US" sz="2000" i="1" dirty="0">
+                <a:solidFill>
+                  <a:srgbClr val="FF0000"/>
+                </a:solidFill>
+              </a:rPr>
+              <a:t>How does one go about reading and analyzing the person-level data? </a:t>
             </a:r>
           </a:p>
         </p:txBody>
@@ -3930,6 +4490,1055 @@
     <p:extLst>
       <p:ext uri="{BB962C8B-B14F-4D97-AF65-F5344CB8AC3E}">
         <p14:creationId xmlns:p14="http://schemas.microsoft.com/office/powerpoint/2010/main" val="4265880072"/>
+      </p:ext>
+    </p:extLst>
+  </p:cSld>
+  <p:clrMapOvr>
+    <a:masterClrMapping/>
+  </p:clrMapOvr>
+</p:sld>
+</file>
+
+<file path=ppt/slides/slide11.xml><?xml version="1.0" encoding="utf-8"?>
+<p:sld xmlns:a="http://schemas.openxmlformats.org/drawingml/2006/main" xmlns:r="http://schemas.openxmlformats.org/officeDocument/2006/relationships" xmlns:p="http://schemas.openxmlformats.org/presentationml/2006/main">
+  <p:cSld>
+    <p:spTree>
+      <p:nvGrpSpPr>
+        <p:cNvPr id="1" name=""/>
+        <p:cNvGrpSpPr/>
+        <p:nvPr/>
+      </p:nvGrpSpPr>
+      <p:grpSpPr>
+        <a:xfrm>
+          <a:off x="0" y="0"/>
+          <a:ext cx="0" cy="0"/>
+          <a:chOff x="0" y="0"/>
+          <a:chExt cx="0" cy="0"/>
+        </a:xfrm>
+      </p:grpSpPr>
+      <p:sp>
+        <p:nvSpPr>
+          <p:cNvPr id="2" name="Title 1">
+            <a:extLst>
+              <a:ext uri="{FF2B5EF4-FFF2-40B4-BE49-F238E27FC236}">
+                <a16:creationId xmlns:a16="http://schemas.microsoft.com/office/drawing/2014/main" id="{EA84F187-250D-0E43-B649-42F6B388DC17}"/>
+              </a:ext>
+            </a:extLst>
+          </p:cNvPr>
+          <p:cNvSpPr>
+            <a:spLocks noGrp="1"/>
+          </p:cNvSpPr>
+          <p:nvPr>
+            <p:ph type="title"/>
+          </p:nvPr>
+        </p:nvSpPr>
+        <p:spPr/>
+        <p:txBody>
+          <a:bodyPr/>
+          <a:lstStyle/>
+          <a:p>
+            <a:r>
+              <a:rPr lang="en-US" dirty="0"/>
+              <a:t>Background</a:t>
+            </a:r>
+          </a:p>
+        </p:txBody>
+      </p:sp>
+      <p:pic>
+        <p:nvPicPr>
+          <p:cNvPr id="3" name="Picture 2">
+            <a:extLst>
+              <a:ext uri="{FF2B5EF4-FFF2-40B4-BE49-F238E27FC236}">
+                <a16:creationId xmlns:a16="http://schemas.microsoft.com/office/drawing/2014/main" id="{65956377-0A7F-AA44-B0A3-E1ACEB8180FD}"/>
+              </a:ext>
+            </a:extLst>
+          </p:cNvPr>
+          <p:cNvPicPr>
+            <a:picLocks noChangeAspect="1"/>
+          </p:cNvPicPr>
+          <p:nvPr/>
+        </p:nvPicPr>
+        <p:blipFill>
+          <a:blip r:embed="rId2"/>
+          <a:stretch>
+            <a:fillRect/>
+          </a:stretch>
+        </p:blipFill>
+        <p:spPr>
+          <a:xfrm>
+            <a:off x="838200" y="1424487"/>
+            <a:ext cx="7333125" cy="4924697"/>
+          </a:xfrm>
+          <a:prstGeom prst="rect">
+            <a:avLst/>
+          </a:prstGeom>
+        </p:spPr>
+      </p:pic>
+      <p:sp>
+        <p:nvSpPr>
+          <p:cNvPr id="4" name="TextBox 3">
+            <a:extLst>
+              <a:ext uri="{FF2B5EF4-FFF2-40B4-BE49-F238E27FC236}">
+                <a16:creationId xmlns:a16="http://schemas.microsoft.com/office/drawing/2014/main" id="{C98AA510-1032-6C48-AD00-EA6E6859135A}"/>
+              </a:ext>
+            </a:extLst>
+          </p:cNvPr>
+          <p:cNvSpPr txBox="1"/>
+          <p:nvPr/>
+        </p:nvSpPr>
+        <p:spPr>
+          <a:xfrm>
+            <a:off x="979713" y="6492875"/>
+            <a:ext cx="4053097" cy="276999"/>
+          </a:xfrm>
+          <a:prstGeom prst="rect">
+            <a:avLst/>
+          </a:prstGeom>
+          <a:noFill/>
+        </p:spPr>
+        <p:txBody>
+          <a:bodyPr wrap="none" rtlCol="0">
+            <a:spAutoFit/>
+          </a:bodyPr>
+          <a:lstStyle/>
+          <a:p>
+            <a:r>
+              <a:rPr lang="en-US" sz="1200" dirty="0"/>
+              <a:t>Reference:  </a:t>
+            </a:r>
+            <a:r>
+              <a:rPr lang="en-US" sz="1200" dirty="0">
+                <a:hlinkClick r:id="rId3"/>
+              </a:rPr>
+              <a:t>Public Use Microdata Sample, U. S. Census Bureau </a:t>
+            </a:r>
+            <a:endParaRPr lang="en-US" sz="1200" dirty="0"/>
+          </a:p>
+        </p:txBody>
+      </p:sp>
+    </p:spTree>
+    <p:extLst>
+      <p:ext uri="{BB962C8B-B14F-4D97-AF65-F5344CB8AC3E}">
+        <p14:creationId xmlns:p14="http://schemas.microsoft.com/office/powerpoint/2010/main" val="3787371780"/>
+      </p:ext>
+    </p:extLst>
+  </p:cSld>
+  <p:clrMapOvr>
+    <a:masterClrMapping/>
+  </p:clrMapOvr>
+</p:sld>
+</file>
+
+<file path=ppt/slides/slide12.xml><?xml version="1.0" encoding="utf-8"?>
+<p:sld xmlns:a="http://schemas.openxmlformats.org/drawingml/2006/main" xmlns:r="http://schemas.openxmlformats.org/officeDocument/2006/relationships" xmlns:p="http://schemas.openxmlformats.org/presentationml/2006/main">
+  <p:cSld>
+    <p:spTree>
+      <p:nvGrpSpPr>
+        <p:cNvPr id="1" name=""/>
+        <p:cNvGrpSpPr/>
+        <p:nvPr/>
+      </p:nvGrpSpPr>
+      <p:grpSpPr>
+        <a:xfrm>
+          <a:off x="0" y="0"/>
+          <a:ext cx="0" cy="0"/>
+          <a:chOff x="0" y="0"/>
+          <a:chExt cx="0" cy="0"/>
+        </a:xfrm>
+      </p:grpSpPr>
+      <p:sp>
+        <p:nvSpPr>
+          <p:cNvPr id="2" name="Title 1">
+            <a:extLst>
+              <a:ext uri="{FF2B5EF4-FFF2-40B4-BE49-F238E27FC236}">
+                <a16:creationId xmlns:a16="http://schemas.microsoft.com/office/drawing/2014/main" id="{CA2C3D95-765F-4B4E-9DC6-4F120D175A21}"/>
+              </a:ext>
+            </a:extLst>
+          </p:cNvPr>
+          <p:cNvSpPr>
+            <a:spLocks noGrp="1"/>
+          </p:cNvSpPr>
+          <p:nvPr>
+            <p:ph type="title"/>
+          </p:nvPr>
+        </p:nvSpPr>
+        <p:spPr/>
+        <p:txBody>
+          <a:bodyPr/>
+          <a:lstStyle/>
+          <a:p>
+            <a:r>
+              <a:rPr lang="en-US" dirty="0"/>
+              <a:t>Considerations</a:t>
+            </a:r>
+          </a:p>
+        </p:txBody>
+      </p:sp>
+      <p:sp>
+        <p:nvSpPr>
+          <p:cNvPr id="3" name="Content Placeholder 2">
+            <a:extLst>
+              <a:ext uri="{FF2B5EF4-FFF2-40B4-BE49-F238E27FC236}">
+                <a16:creationId xmlns:a16="http://schemas.microsoft.com/office/drawing/2014/main" id="{829FF1A4-565B-CF4B-B4E7-57C379F45CC5}"/>
+              </a:ext>
+            </a:extLst>
+          </p:cNvPr>
+          <p:cNvSpPr>
+            <a:spLocks noGrp="1"/>
+          </p:cNvSpPr>
+          <p:nvPr>
+            <p:ph idx="1"/>
+          </p:nvPr>
+        </p:nvSpPr>
+        <p:spPr/>
+        <p:txBody>
+          <a:bodyPr/>
+          <a:lstStyle/>
+          <a:p>
+            <a:r>
+              <a:rPr lang="en-US" dirty="0"/>
+              <a:t>Lots of variables</a:t>
+            </a:r>
+          </a:p>
+          <a:p>
+            <a:r>
+              <a:rPr lang="en-US" dirty="0"/>
+              <a:t>Large file size (Georgia file is 167Mb)</a:t>
+            </a:r>
+          </a:p>
+          <a:p>
+            <a:r>
+              <a:rPr lang="en-US" dirty="0"/>
+              <a:t>Using the data dictionary to configure the data read function</a:t>
+            </a:r>
+          </a:p>
+          <a:p>
+            <a:r>
+              <a:rPr lang="en-US" dirty="0"/>
+              <a:t>Separating 5% sample information from 1% sample information</a:t>
+            </a:r>
+          </a:p>
+          <a:p>
+            <a:r>
+              <a:rPr lang="en-US" dirty="0"/>
+              <a:t>Eliminating value labels from codebook </a:t>
+            </a:r>
+          </a:p>
+        </p:txBody>
+      </p:sp>
+    </p:spTree>
+    <p:extLst>
+      <p:ext uri="{BB962C8B-B14F-4D97-AF65-F5344CB8AC3E}">
+        <p14:creationId xmlns:p14="http://schemas.microsoft.com/office/powerpoint/2010/main" val="688200898"/>
+      </p:ext>
+    </p:extLst>
+  </p:cSld>
+  <p:clrMapOvr>
+    <a:masterClrMapping/>
+  </p:clrMapOvr>
+</p:sld>
+</file>
+
+<file path=ppt/slides/slide13.xml><?xml version="1.0" encoding="utf-8"?>
+<p:sld xmlns:a="http://schemas.openxmlformats.org/drawingml/2006/main" xmlns:r="http://schemas.openxmlformats.org/officeDocument/2006/relationships" xmlns:p="http://schemas.openxmlformats.org/presentationml/2006/main">
+  <p:cSld>
+    <p:spTree>
+      <p:nvGrpSpPr>
+        <p:cNvPr id="1" name=""/>
+        <p:cNvGrpSpPr/>
+        <p:nvPr/>
+      </p:nvGrpSpPr>
+      <p:grpSpPr>
+        <a:xfrm>
+          <a:off x="0" y="0"/>
+          <a:ext cx="0" cy="0"/>
+          <a:chOff x="0" y="0"/>
+          <a:chExt cx="0" cy="0"/>
+        </a:xfrm>
+      </p:grpSpPr>
+      <p:sp>
+        <p:nvSpPr>
+          <p:cNvPr id="4" name="Title 3">
+            <a:extLst>
+              <a:ext uri="{FF2B5EF4-FFF2-40B4-BE49-F238E27FC236}">
+                <a16:creationId xmlns:a16="http://schemas.microsoft.com/office/drawing/2014/main" id="{A9925383-F8CF-934C-A9BF-84BF19950896}"/>
+              </a:ext>
+            </a:extLst>
+          </p:cNvPr>
+          <p:cNvSpPr>
+            <a:spLocks noGrp="1"/>
+          </p:cNvSpPr>
+          <p:nvPr>
+            <p:ph type="title"/>
+          </p:nvPr>
+        </p:nvSpPr>
+        <p:spPr/>
+        <p:txBody>
+          <a:bodyPr/>
+          <a:lstStyle/>
+          <a:p>
+            <a:r>
+              <a:rPr lang="en-US" dirty="0"/>
+              <a:t>Data Dictionary</a:t>
+            </a:r>
+          </a:p>
+        </p:txBody>
+      </p:sp>
+      <p:pic>
+        <p:nvPicPr>
+          <p:cNvPr id="5" name="Picture 4">
+            <a:extLst>
+              <a:ext uri="{FF2B5EF4-FFF2-40B4-BE49-F238E27FC236}">
+                <a16:creationId xmlns:a16="http://schemas.microsoft.com/office/drawing/2014/main" id="{584A8673-E491-E04D-BFDB-8E4330EA5350}"/>
+              </a:ext>
+            </a:extLst>
+          </p:cNvPr>
+          <p:cNvPicPr>
+            <a:picLocks noChangeAspect="1"/>
+          </p:cNvPicPr>
+          <p:nvPr/>
+        </p:nvPicPr>
+        <p:blipFill>
+          <a:blip r:embed="rId2"/>
+          <a:stretch>
+            <a:fillRect/>
+          </a:stretch>
+        </p:blipFill>
+        <p:spPr>
+          <a:xfrm>
+            <a:off x="838200" y="1446221"/>
+            <a:ext cx="8477123" cy="5307276"/>
+          </a:xfrm>
+          <a:prstGeom prst="rect">
+            <a:avLst/>
+          </a:prstGeom>
+        </p:spPr>
+      </p:pic>
+    </p:spTree>
+    <p:extLst>
+      <p:ext uri="{BB962C8B-B14F-4D97-AF65-F5344CB8AC3E}">
+        <p14:creationId xmlns:p14="http://schemas.microsoft.com/office/powerpoint/2010/main" val="2070444847"/>
+      </p:ext>
+    </p:extLst>
+  </p:cSld>
+  <p:clrMapOvr>
+    <a:masterClrMapping/>
+  </p:clrMapOvr>
+</p:sld>
+</file>
+
+<file path=ppt/slides/slide14.xml><?xml version="1.0" encoding="utf-8"?>
+<p:sld xmlns:a="http://schemas.openxmlformats.org/drawingml/2006/main" xmlns:r="http://schemas.openxmlformats.org/officeDocument/2006/relationships" xmlns:p="http://schemas.openxmlformats.org/presentationml/2006/main">
+  <p:cSld>
+    <p:spTree>
+      <p:nvGrpSpPr>
+        <p:cNvPr id="1" name=""/>
+        <p:cNvGrpSpPr/>
+        <p:nvPr/>
+      </p:nvGrpSpPr>
+      <p:grpSpPr>
+        <a:xfrm>
+          <a:off x="0" y="0"/>
+          <a:ext cx="0" cy="0"/>
+          <a:chOff x="0" y="0"/>
+          <a:chExt cx="0" cy="0"/>
+        </a:xfrm>
+      </p:grpSpPr>
+      <p:sp>
+        <p:nvSpPr>
+          <p:cNvPr id="2" name="Title 1">
+            <a:extLst>
+              <a:ext uri="{FF2B5EF4-FFF2-40B4-BE49-F238E27FC236}">
+                <a16:creationId xmlns:a16="http://schemas.microsoft.com/office/drawing/2014/main" id="{F409999C-0680-1945-9F26-743E62B94767}"/>
+              </a:ext>
+            </a:extLst>
+          </p:cNvPr>
+          <p:cNvSpPr>
+            <a:spLocks noGrp="1"/>
+          </p:cNvSpPr>
+          <p:nvPr>
+            <p:ph type="title"/>
+          </p:nvPr>
+        </p:nvSpPr>
+        <p:spPr/>
+        <p:txBody>
+          <a:bodyPr/>
+          <a:lstStyle/>
+          <a:p>
+            <a:r>
+              <a:rPr lang="en-US" dirty="0"/>
+              <a:t>Obtaining the data</a:t>
+            </a:r>
+          </a:p>
+        </p:txBody>
+      </p:sp>
+      <p:pic>
+        <p:nvPicPr>
+          <p:cNvPr id="3" name="Picture 2">
+            <a:extLst>
+              <a:ext uri="{FF2B5EF4-FFF2-40B4-BE49-F238E27FC236}">
+                <a16:creationId xmlns:a16="http://schemas.microsoft.com/office/drawing/2014/main" id="{79995E5D-38B2-EC40-8E23-8CB65766B64F}"/>
+              </a:ext>
+            </a:extLst>
+          </p:cNvPr>
+          <p:cNvPicPr>
+            <a:picLocks noChangeAspect="1"/>
+          </p:cNvPicPr>
+          <p:nvPr/>
+        </p:nvPicPr>
+        <p:blipFill>
+          <a:blip r:embed="rId2"/>
+          <a:stretch>
+            <a:fillRect/>
+          </a:stretch>
+        </p:blipFill>
+        <p:spPr>
+          <a:xfrm>
+            <a:off x="838200" y="1513114"/>
+            <a:ext cx="10083800" cy="4876800"/>
+          </a:xfrm>
+          <a:prstGeom prst="rect">
+            <a:avLst/>
+          </a:prstGeom>
+        </p:spPr>
+      </p:pic>
+      <p:sp>
+        <p:nvSpPr>
+          <p:cNvPr id="4" name="TextBox 3">
+            <a:extLst>
+              <a:ext uri="{FF2B5EF4-FFF2-40B4-BE49-F238E27FC236}">
+                <a16:creationId xmlns:a16="http://schemas.microsoft.com/office/drawing/2014/main" id="{00150276-F902-0245-AE3C-B2B3331EDA6F}"/>
+              </a:ext>
+            </a:extLst>
+          </p:cNvPr>
+          <p:cNvSpPr txBox="1"/>
+          <p:nvPr/>
+        </p:nvSpPr>
+        <p:spPr>
+          <a:xfrm>
+            <a:off x="729465" y="6441112"/>
+            <a:ext cx="10016781" cy="276999"/>
+          </a:xfrm>
+          <a:prstGeom prst="rect">
+            <a:avLst/>
+          </a:prstGeom>
+          <a:noFill/>
+        </p:spPr>
+        <p:txBody>
+          <a:bodyPr wrap="none" rtlCol="0">
+            <a:spAutoFit/>
+          </a:bodyPr>
+          <a:lstStyle/>
+          <a:p>
+            <a:r>
+              <a:rPr lang="en-US" sz="1200" i="1" dirty="0"/>
+              <a:t>Note: there is a revised PUMS file stored in the same location as the original, but the revised file is not in zip format so it takes about 10 minutes to download.  </a:t>
+            </a:r>
+          </a:p>
+        </p:txBody>
+      </p:sp>
+    </p:spTree>
+    <p:extLst>
+      <p:ext uri="{BB962C8B-B14F-4D97-AF65-F5344CB8AC3E}">
+        <p14:creationId xmlns:p14="http://schemas.microsoft.com/office/powerpoint/2010/main" val="4065992348"/>
+      </p:ext>
+    </p:extLst>
+  </p:cSld>
+  <p:clrMapOvr>
+    <a:masterClrMapping/>
+  </p:clrMapOvr>
+</p:sld>
+</file>
+
+<file path=ppt/slides/slide15.xml><?xml version="1.0" encoding="utf-8"?>
+<p:sld xmlns:a="http://schemas.openxmlformats.org/drawingml/2006/main" xmlns:r="http://schemas.openxmlformats.org/officeDocument/2006/relationships" xmlns:p="http://schemas.openxmlformats.org/presentationml/2006/main">
+  <p:cSld>
+    <p:spTree>
+      <p:nvGrpSpPr>
+        <p:cNvPr id="1" name=""/>
+        <p:cNvGrpSpPr/>
+        <p:nvPr/>
+      </p:nvGrpSpPr>
+      <p:grpSpPr>
+        <a:xfrm>
+          <a:off x="0" y="0"/>
+          <a:ext cx="0" cy="0"/>
+          <a:chOff x="0" y="0"/>
+          <a:chExt cx="0" cy="0"/>
+        </a:xfrm>
+      </p:grpSpPr>
+      <p:sp>
+        <p:nvSpPr>
+          <p:cNvPr id="2" name="Title 1">
+            <a:extLst>
+              <a:ext uri="{FF2B5EF4-FFF2-40B4-BE49-F238E27FC236}">
+                <a16:creationId xmlns:a16="http://schemas.microsoft.com/office/drawing/2014/main" id="{75EE2DC4-BDFE-B048-8E57-44FA0E997636}"/>
+              </a:ext>
+            </a:extLst>
+          </p:cNvPr>
+          <p:cNvSpPr>
+            <a:spLocks noGrp="1"/>
+          </p:cNvSpPr>
+          <p:nvPr>
+            <p:ph type="title"/>
+          </p:nvPr>
+        </p:nvSpPr>
+        <p:spPr/>
+        <p:txBody>
+          <a:bodyPr/>
+          <a:lstStyle/>
+          <a:p>
+            <a:r>
+              <a:rPr lang="en-US" dirty="0"/>
+              <a:t>Read &amp; split the records by record type</a:t>
+            </a:r>
+          </a:p>
+        </p:txBody>
+      </p:sp>
+      <p:pic>
+        <p:nvPicPr>
+          <p:cNvPr id="5" name="Picture 4">
+            <a:extLst>
+              <a:ext uri="{FF2B5EF4-FFF2-40B4-BE49-F238E27FC236}">
+                <a16:creationId xmlns:a16="http://schemas.microsoft.com/office/drawing/2014/main" id="{FC041B83-1E27-B040-ACF6-112C5BAD86CD}"/>
+              </a:ext>
+            </a:extLst>
+          </p:cNvPr>
+          <p:cNvPicPr>
+            <a:picLocks noChangeAspect="1"/>
+          </p:cNvPicPr>
+          <p:nvPr/>
+        </p:nvPicPr>
+        <p:blipFill>
+          <a:blip r:embed="rId2"/>
+          <a:stretch>
+            <a:fillRect/>
+          </a:stretch>
+        </p:blipFill>
+        <p:spPr>
+          <a:xfrm>
+            <a:off x="894168" y="1690688"/>
+            <a:ext cx="6566279" cy="1206624"/>
+          </a:xfrm>
+          <a:prstGeom prst="rect">
+            <a:avLst/>
+          </a:prstGeom>
+        </p:spPr>
+      </p:pic>
+      <p:pic>
+        <p:nvPicPr>
+          <p:cNvPr id="6" name="Picture 5">
+            <a:extLst>
+              <a:ext uri="{FF2B5EF4-FFF2-40B4-BE49-F238E27FC236}">
+                <a16:creationId xmlns:a16="http://schemas.microsoft.com/office/drawing/2014/main" id="{28710683-1CAF-F945-B1BA-24AB12F86F73}"/>
+              </a:ext>
+            </a:extLst>
+          </p:cNvPr>
+          <p:cNvPicPr>
+            <a:picLocks noChangeAspect="1"/>
+          </p:cNvPicPr>
+          <p:nvPr/>
+        </p:nvPicPr>
+        <p:blipFill>
+          <a:blip r:embed="rId3"/>
+          <a:stretch>
+            <a:fillRect/>
+          </a:stretch>
+        </p:blipFill>
+        <p:spPr>
+          <a:xfrm>
+            <a:off x="894169" y="3562278"/>
+            <a:ext cx="6261100" cy="2692400"/>
+          </a:xfrm>
+          <a:prstGeom prst="rect">
+            <a:avLst/>
+          </a:prstGeom>
+        </p:spPr>
+      </p:pic>
+    </p:spTree>
+    <p:extLst>
+      <p:ext uri="{BB962C8B-B14F-4D97-AF65-F5344CB8AC3E}">
+        <p14:creationId xmlns:p14="http://schemas.microsoft.com/office/powerpoint/2010/main" val="652449204"/>
+      </p:ext>
+    </p:extLst>
+  </p:cSld>
+  <p:clrMapOvr>
+    <a:masterClrMapping/>
+  </p:clrMapOvr>
+</p:sld>
+</file>
+
+<file path=ppt/slides/slide16.xml><?xml version="1.0" encoding="utf-8"?>
+<p:sld xmlns:a="http://schemas.openxmlformats.org/drawingml/2006/main" xmlns:r="http://schemas.openxmlformats.org/officeDocument/2006/relationships" xmlns:p="http://schemas.openxmlformats.org/presentationml/2006/main">
+  <p:cSld>
+    <p:spTree>
+      <p:nvGrpSpPr>
+        <p:cNvPr id="1" name=""/>
+        <p:cNvGrpSpPr/>
+        <p:nvPr/>
+      </p:nvGrpSpPr>
+      <p:grpSpPr>
+        <a:xfrm>
+          <a:off x="0" y="0"/>
+          <a:ext cx="0" cy="0"/>
+          <a:chOff x="0" y="0"/>
+          <a:chExt cx="0" cy="0"/>
+        </a:xfrm>
+      </p:grpSpPr>
+      <p:sp>
+        <p:nvSpPr>
+          <p:cNvPr id="2" name="Title 1">
+            <a:extLst>
+              <a:ext uri="{FF2B5EF4-FFF2-40B4-BE49-F238E27FC236}">
+                <a16:creationId xmlns:a16="http://schemas.microsoft.com/office/drawing/2014/main" id="{0A1497BC-7306-BF4E-B417-3C6949BBCD1D}"/>
+              </a:ext>
+            </a:extLst>
+          </p:cNvPr>
+          <p:cNvSpPr>
+            <a:spLocks noGrp="1"/>
+          </p:cNvSpPr>
+          <p:nvPr>
+            <p:ph type="title"/>
+          </p:nvPr>
+        </p:nvSpPr>
+        <p:spPr/>
+        <p:txBody>
+          <a:bodyPr/>
+          <a:lstStyle/>
+          <a:p>
+            <a:r>
+              <a:rPr lang="en-US" dirty="0"/>
+              <a:t>Read &amp; clean the codebook</a:t>
+            </a:r>
+          </a:p>
+        </p:txBody>
+      </p:sp>
+      <p:pic>
+        <p:nvPicPr>
+          <p:cNvPr id="3" name="Picture 2">
+            <a:extLst>
+              <a:ext uri="{FF2B5EF4-FFF2-40B4-BE49-F238E27FC236}">
+                <a16:creationId xmlns:a16="http://schemas.microsoft.com/office/drawing/2014/main" id="{A97D9093-FC2C-8148-85AD-178ED33F485F}"/>
+              </a:ext>
+            </a:extLst>
+          </p:cNvPr>
+          <p:cNvPicPr>
+            <a:picLocks noChangeAspect="1"/>
+          </p:cNvPicPr>
+          <p:nvPr/>
+        </p:nvPicPr>
+        <p:blipFill>
+          <a:blip r:embed="rId2"/>
+          <a:stretch>
+            <a:fillRect/>
+          </a:stretch>
+        </p:blipFill>
+        <p:spPr>
+          <a:xfrm>
+            <a:off x="951955" y="1475559"/>
+            <a:ext cx="7392886" cy="4755424"/>
+          </a:xfrm>
+          <a:prstGeom prst="rect">
+            <a:avLst/>
+          </a:prstGeom>
+        </p:spPr>
+      </p:pic>
+    </p:spTree>
+    <p:extLst>
+      <p:ext uri="{BB962C8B-B14F-4D97-AF65-F5344CB8AC3E}">
+        <p14:creationId xmlns:p14="http://schemas.microsoft.com/office/powerpoint/2010/main" val="2820406415"/>
+      </p:ext>
+    </p:extLst>
+  </p:cSld>
+  <p:clrMapOvr>
+    <a:masterClrMapping/>
+  </p:clrMapOvr>
+</p:sld>
+</file>
+
+<file path=ppt/slides/slide17.xml><?xml version="1.0" encoding="utf-8"?>
+<p:sld xmlns:a="http://schemas.openxmlformats.org/drawingml/2006/main" xmlns:r="http://schemas.openxmlformats.org/officeDocument/2006/relationships" xmlns:p="http://schemas.openxmlformats.org/presentationml/2006/main">
+  <p:cSld>
+    <p:spTree>
+      <p:nvGrpSpPr>
+        <p:cNvPr id="1" name=""/>
+        <p:cNvGrpSpPr/>
+        <p:nvPr/>
+      </p:nvGrpSpPr>
+      <p:grpSpPr>
+        <a:xfrm>
+          <a:off x="0" y="0"/>
+          <a:ext cx="0" cy="0"/>
+          <a:chOff x="0" y="0"/>
+          <a:chExt cx="0" cy="0"/>
+        </a:xfrm>
+      </p:grpSpPr>
+      <p:sp>
+        <p:nvSpPr>
+          <p:cNvPr id="2" name="Title 1">
+            <a:extLst>
+              <a:ext uri="{FF2B5EF4-FFF2-40B4-BE49-F238E27FC236}">
+                <a16:creationId xmlns:a16="http://schemas.microsoft.com/office/drawing/2014/main" id="{27A200C3-B68A-C44B-A84F-20D44834AEB0}"/>
+              </a:ext>
+            </a:extLst>
+          </p:cNvPr>
+          <p:cNvSpPr>
+            <a:spLocks noGrp="1"/>
+          </p:cNvSpPr>
+          <p:nvPr>
+            <p:ph type="title"/>
+          </p:nvPr>
+        </p:nvSpPr>
+        <p:spPr/>
+        <p:txBody>
+          <a:bodyPr/>
+          <a:lstStyle/>
+          <a:p>
+            <a:r>
+              <a:rPr lang="en-US" dirty="0"/>
+              <a:t>Use codebook to configure </a:t>
+            </a:r>
+            <a:r>
+              <a:rPr lang="en-US" dirty="0" err="1"/>
+              <a:t>read_fwf</a:t>
+            </a:r>
+            <a:r>
+              <a:rPr lang="en-US" dirty="0"/>
+              <a:t>()</a:t>
+            </a:r>
+          </a:p>
+        </p:txBody>
+      </p:sp>
+      <p:pic>
+        <p:nvPicPr>
+          <p:cNvPr id="3" name="Picture 2">
+            <a:extLst>
+              <a:ext uri="{FF2B5EF4-FFF2-40B4-BE49-F238E27FC236}">
+                <a16:creationId xmlns:a16="http://schemas.microsoft.com/office/drawing/2014/main" id="{1108F545-9ECF-8E4D-BB56-275A636D6DE7}"/>
+              </a:ext>
+            </a:extLst>
+          </p:cNvPr>
+          <p:cNvPicPr>
+            <a:picLocks noChangeAspect="1"/>
+          </p:cNvPicPr>
+          <p:nvPr/>
+        </p:nvPicPr>
+        <p:blipFill>
+          <a:blip r:embed="rId2"/>
+          <a:stretch>
+            <a:fillRect/>
+          </a:stretch>
+        </p:blipFill>
+        <p:spPr>
+          <a:xfrm>
+            <a:off x="1043033" y="1567543"/>
+            <a:ext cx="6117678" cy="2258605"/>
+          </a:xfrm>
+          <a:prstGeom prst="rect">
+            <a:avLst/>
+          </a:prstGeom>
+        </p:spPr>
+      </p:pic>
+      <p:pic>
+        <p:nvPicPr>
+          <p:cNvPr id="4" name="Picture 3">
+            <a:extLst>
+              <a:ext uri="{FF2B5EF4-FFF2-40B4-BE49-F238E27FC236}">
+                <a16:creationId xmlns:a16="http://schemas.microsoft.com/office/drawing/2014/main" id="{CE888A91-E21F-DF4E-A36B-09A1AAA3D5CC}"/>
+              </a:ext>
+            </a:extLst>
+          </p:cNvPr>
+          <p:cNvPicPr>
+            <a:picLocks noChangeAspect="1"/>
+          </p:cNvPicPr>
+          <p:nvPr/>
+        </p:nvPicPr>
+        <p:blipFill>
+          <a:blip r:embed="rId3"/>
+          <a:stretch>
+            <a:fillRect/>
+          </a:stretch>
+        </p:blipFill>
+        <p:spPr>
+          <a:xfrm>
+            <a:off x="1043033" y="3966301"/>
+            <a:ext cx="6110784" cy="2526574"/>
+          </a:xfrm>
+          <a:prstGeom prst="rect">
+            <a:avLst/>
+          </a:prstGeom>
+        </p:spPr>
+      </p:pic>
+    </p:spTree>
+    <p:extLst>
+      <p:ext uri="{BB962C8B-B14F-4D97-AF65-F5344CB8AC3E}">
+        <p14:creationId xmlns:p14="http://schemas.microsoft.com/office/powerpoint/2010/main" val="911978099"/>
+      </p:ext>
+    </p:extLst>
+  </p:cSld>
+  <p:clrMapOvr>
+    <a:masterClrMapping/>
+  </p:clrMapOvr>
+</p:sld>
+</file>
+
+<file path=ppt/slides/slide18.xml><?xml version="1.0" encoding="utf-8"?>
+<p:sld xmlns:a="http://schemas.openxmlformats.org/drawingml/2006/main" xmlns:r="http://schemas.openxmlformats.org/officeDocument/2006/relationships" xmlns:p="http://schemas.openxmlformats.org/presentationml/2006/main">
+  <p:cSld>
+    <p:spTree>
+      <p:nvGrpSpPr>
+        <p:cNvPr id="1" name=""/>
+        <p:cNvGrpSpPr/>
+        <p:nvPr/>
+      </p:nvGrpSpPr>
+      <p:grpSpPr>
+        <a:xfrm>
+          <a:off x="0" y="0"/>
+          <a:ext cx="0" cy="0"/>
+          <a:chOff x="0" y="0"/>
+          <a:chExt cx="0" cy="0"/>
+        </a:xfrm>
+      </p:grpSpPr>
+      <p:sp>
+        <p:nvSpPr>
+          <p:cNvPr id="2" name="Title 1">
+            <a:extLst>
+              <a:ext uri="{FF2B5EF4-FFF2-40B4-BE49-F238E27FC236}">
+                <a16:creationId xmlns:a16="http://schemas.microsoft.com/office/drawing/2014/main" id="{A491959E-F635-624A-A884-AB9CE2DC221D}"/>
+              </a:ext>
+            </a:extLst>
+          </p:cNvPr>
+          <p:cNvSpPr>
+            <a:spLocks noGrp="1"/>
+          </p:cNvSpPr>
+          <p:nvPr>
+            <p:ph type="title"/>
+          </p:nvPr>
+        </p:nvSpPr>
+        <p:spPr/>
+        <p:txBody>
+          <a:bodyPr/>
+          <a:lstStyle/>
+          <a:p>
+            <a:r>
+              <a:rPr lang="en-US" dirty="0"/>
+              <a:t>Read the file</a:t>
+            </a:r>
+          </a:p>
+        </p:txBody>
+      </p:sp>
+      <p:pic>
+        <p:nvPicPr>
+          <p:cNvPr id="5" name="Picture 4">
+            <a:extLst>
+              <a:ext uri="{FF2B5EF4-FFF2-40B4-BE49-F238E27FC236}">
+                <a16:creationId xmlns:a16="http://schemas.microsoft.com/office/drawing/2014/main" id="{AB1DB2B9-8648-F54F-8250-8E73ECEDA99E}"/>
+              </a:ext>
+            </a:extLst>
+          </p:cNvPr>
+          <p:cNvPicPr>
+            <a:picLocks noChangeAspect="1"/>
+          </p:cNvPicPr>
+          <p:nvPr/>
+        </p:nvPicPr>
+        <p:blipFill>
+          <a:blip r:embed="rId2"/>
+          <a:stretch>
+            <a:fillRect/>
+          </a:stretch>
+        </p:blipFill>
+        <p:spPr>
+          <a:xfrm>
+            <a:off x="948648" y="1607192"/>
+            <a:ext cx="6841598" cy="981896"/>
+          </a:xfrm>
+          <a:prstGeom prst="rect">
+            <a:avLst/>
+          </a:prstGeom>
+        </p:spPr>
+      </p:pic>
+      <p:pic>
+        <p:nvPicPr>
+          <p:cNvPr id="6" name="Picture 5">
+            <a:extLst>
+              <a:ext uri="{FF2B5EF4-FFF2-40B4-BE49-F238E27FC236}">
+                <a16:creationId xmlns:a16="http://schemas.microsoft.com/office/drawing/2014/main" id="{552DDBCC-5B54-8A4A-80EF-DA328FCE87B9}"/>
+              </a:ext>
+            </a:extLst>
+          </p:cNvPr>
+          <p:cNvPicPr>
+            <a:picLocks noChangeAspect="1"/>
+          </p:cNvPicPr>
+          <p:nvPr/>
+        </p:nvPicPr>
+        <p:blipFill>
+          <a:blip r:embed="rId3"/>
+          <a:stretch>
+            <a:fillRect/>
+          </a:stretch>
+        </p:blipFill>
+        <p:spPr>
+          <a:xfrm>
+            <a:off x="838200" y="3379325"/>
+            <a:ext cx="9753754" cy="1767868"/>
+          </a:xfrm>
+          <a:prstGeom prst="rect">
+            <a:avLst/>
+          </a:prstGeom>
+        </p:spPr>
+      </p:pic>
+    </p:spTree>
+    <p:extLst>
+      <p:ext uri="{BB962C8B-B14F-4D97-AF65-F5344CB8AC3E}">
+        <p14:creationId xmlns:p14="http://schemas.microsoft.com/office/powerpoint/2010/main" val="3514293667"/>
+      </p:ext>
+    </p:extLst>
+  </p:cSld>
+  <p:clrMapOvr>
+    <a:masterClrMapping/>
+  </p:clrMapOvr>
+</p:sld>
+</file>
+
+<file path=ppt/slides/slide19.xml><?xml version="1.0" encoding="utf-8"?>
+<p:sld xmlns:a="http://schemas.openxmlformats.org/drawingml/2006/main" xmlns:r="http://schemas.openxmlformats.org/officeDocument/2006/relationships" xmlns:p="http://schemas.openxmlformats.org/presentationml/2006/main">
+  <p:cSld>
+    <p:spTree>
+      <p:nvGrpSpPr>
+        <p:cNvPr id="1" name=""/>
+        <p:cNvGrpSpPr/>
+        <p:nvPr/>
+      </p:nvGrpSpPr>
+      <p:grpSpPr>
+        <a:xfrm>
+          <a:off x="0" y="0"/>
+          <a:ext cx="0" cy="0"/>
+          <a:chOff x="0" y="0"/>
+          <a:chExt cx="0" cy="0"/>
+        </a:xfrm>
+      </p:grpSpPr>
+      <p:sp>
+        <p:nvSpPr>
+          <p:cNvPr id="2" name="Title 1">
+            <a:extLst>
+              <a:ext uri="{FF2B5EF4-FFF2-40B4-BE49-F238E27FC236}">
+                <a16:creationId xmlns:a16="http://schemas.microsoft.com/office/drawing/2014/main" id="{8C733588-1AEF-374A-B095-B4CC21D16DD3}"/>
+              </a:ext>
+            </a:extLst>
+          </p:cNvPr>
+          <p:cNvSpPr>
+            <a:spLocks noGrp="1"/>
+          </p:cNvSpPr>
+          <p:nvPr>
+            <p:ph type="title"/>
+          </p:nvPr>
+        </p:nvSpPr>
+        <p:spPr/>
+        <p:txBody>
+          <a:bodyPr/>
+          <a:lstStyle/>
+          <a:p>
+            <a:r>
+              <a:rPr lang="en-US" dirty="0"/>
+              <a:t>Run a simple analysis</a:t>
+            </a:r>
+          </a:p>
+        </p:txBody>
+      </p:sp>
+      <p:pic>
+        <p:nvPicPr>
+          <p:cNvPr id="4" name="Picture 3">
+            <a:extLst>
+              <a:ext uri="{FF2B5EF4-FFF2-40B4-BE49-F238E27FC236}">
+                <a16:creationId xmlns:a16="http://schemas.microsoft.com/office/drawing/2014/main" id="{D4BE3F9A-3177-5F44-9FC0-03C062A0ADA3}"/>
+              </a:ext>
+            </a:extLst>
+          </p:cNvPr>
+          <p:cNvPicPr>
+            <a:picLocks noChangeAspect="1"/>
+          </p:cNvPicPr>
+          <p:nvPr/>
+        </p:nvPicPr>
+        <p:blipFill>
+          <a:blip r:embed="rId2"/>
+          <a:stretch>
+            <a:fillRect/>
+          </a:stretch>
+        </p:blipFill>
+        <p:spPr>
+          <a:xfrm>
+            <a:off x="838200" y="2377011"/>
+            <a:ext cx="5613400" cy="3441700"/>
+          </a:xfrm>
+          <a:prstGeom prst="rect">
+            <a:avLst/>
+          </a:prstGeom>
+        </p:spPr>
+      </p:pic>
+      <p:pic>
+        <p:nvPicPr>
+          <p:cNvPr id="5" name="Picture 4">
+            <a:extLst>
+              <a:ext uri="{FF2B5EF4-FFF2-40B4-BE49-F238E27FC236}">
+                <a16:creationId xmlns:a16="http://schemas.microsoft.com/office/drawing/2014/main" id="{A61EC309-DF08-DF43-9C98-0ABAFDCC48E3}"/>
+              </a:ext>
+            </a:extLst>
+          </p:cNvPr>
+          <p:cNvPicPr>
+            <a:picLocks noChangeAspect="1"/>
+          </p:cNvPicPr>
+          <p:nvPr/>
+        </p:nvPicPr>
+        <p:blipFill>
+          <a:blip r:embed="rId3"/>
+          <a:stretch>
+            <a:fillRect/>
+          </a:stretch>
+        </p:blipFill>
+        <p:spPr>
+          <a:xfrm>
+            <a:off x="838200" y="5703119"/>
+            <a:ext cx="4906281" cy="998126"/>
+          </a:xfrm>
+          <a:prstGeom prst="rect">
+            <a:avLst/>
+          </a:prstGeom>
+        </p:spPr>
+      </p:pic>
+      <p:pic>
+        <p:nvPicPr>
+          <p:cNvPr id="6" name="Picture 5">
+            <a:extLst>
+              <a:ext uri="{FF2B5EF4-FFF2-40B4-BE49-F238E27FC236}">
+                <a16:creationId xmlns:a16="http://schemas.microsoft.com/office/drawing/2014/main" id="{6851049C-7157-D540-A041-2C18A4A85F8D}"/>
+              </a:ext>
+            </a:extLst>
+          </p:cNvPr>
+          <p:cNvPicPr>
+            <a:picLocks noChangeAspect="1"/>
+          </p:cNvPicPr>
+          <p:nvPr/>
+        </p:nvPicPr>
+        <p:blipFill>
+          <a:blip r:embed="rId4"/>
+          <a:stretch>
+            <a:fillRect/>
+          </a:stretch>
+        </p:blipFill>
+        <p:spPr>
+          <a:xfrm>
+            <a:off x="972094" y="1643154"/>
+            <a:ext cx="3439819" cy="901700"/>
+          </a:xfrm>
+          <a:prstGeom prst="rect">
+            <a:avLst/>
+          </a:prstGeom>
+        </p:spPr>
+      </p:pic>
+    </p:spTree>
+    <p:extLst>
+      <p:ext uri="{BB962C8B-B14F-4D97-AF65-F5344CB8AC3E}">
+        <p14:creationId xmlns:p14="http://schemas.microsoft.com/office/powerpoint/2010/main" val="1008562000"/>
       </p:ext>
     </p:extLst>
   </p:cSld>
@@ -4112,6 +5721,71 @@
 </p:sld>
 </file>
 
+<file path=ppt/slides/slide20.xml><?xml version="1.0" encoding="utf-8"?>
+<p:sld xmlns:a="http://schemas.openxmlformats.org/drawingml/2006/main" xmlns:r="http://schemas.openxmlformats.org/officeDocument/2006/relationships" xmlns:p="http://schemas.openxmlformats.org/presentationml/2006/main">
+  <p:cSld>
+    <p:spTree>
+      <p:nvGrpSpPr>
+        <p:cNvPr id="1" name=""/>
+        <p:cNvGrpSpPr/>
+        <p:nvPr/>
+      </p:nvGrpSpPr>
+      <p:grpSpPr>
+        <a:xfrm>
+          <a:off x="0" y="0"/>
+          <a:ext cx="0" cy="0"/>
+          <a:chOff x="0" y="0"/>
+          <a:chExt cx="0" cy="0"/>
+        </a:xfrm>
+      </p:grpSpPr>
+      <p:sp>
+        <p:nvSpPr>
+          <p:cNvPr id="3" name="TextBox 2">
+            <a:extLst>
+              <a:ext uri="{FF2B5EF4-FFF2-40B4-BE49-F238E27FC236}">
+                <a16:creationId xmlns:a16="http://schemas.microsoft.com/office/drawing/2014/main" id="{D639DFBB-76B2-E64D-91BA-C82ACDE98D30}"/>
+              </a:ext>
+            </a:extLst>
+          </p:cNvPr>
+          <p:cNvSpPr txBox="1"/>
+          <p:nvPr/>
+        </p:nvSpPr>
+        <p:spPr>
+          <a:xfrm>
+            <a:off x="4526165" y="2967200"/>
+            <a:ext cx="3401893" cy="1569660"/>
+          </a:xfrm>
+          <a:prstGeom prst="rect">
+            <a:avLst/>
+          </a:prstGeom>
+          <a:noFill/>
+        </p:spPr>
+        <p:txBody>
+          <a:bodyPr wrap="none" rtlCol="0">
+            <a:spAutoFit/>
+          </a:bodyPr>
+          <a:lstStyle/>
+          <a:p>
+            <a:r>
+              <a:rPr lang="en-US" sz="9600" dirty="0"/>
+              <a:t>Q &amp; A </a:t>
+            </a:r>
+          </a:p>
+        </p:txBody>
+      </p:sp>
+    </p:spTree>
+    <p:extLst>
+      <p:ext uri="{BB962C8B-B14F-4D97-AF65-F5344CB8AC3E}">
+        <p14:creationId xmlns:p14="http://schemas.microsoft.com/office/powerpoint/2010/main" val="3085140371"/>
+      </p:ext>
+    </p:extLst>
+  </p:cSld>
+  <p:clrMapOvr>
+    <a:masterClrMapping/>
+  </p:clrMapOvr>
+</p:sld>
+</file>
+
 <file path=ppt/slides/slide3.xml><?xml version="1.0" encoding="utf-8"?>
 <p:sld xmlns:a="http://schemas.openxmlformats.org/drawingml/2006/main" xmlns:r="http://schemas.openxmlformats.org/officeDocument/2006/relationships" xmlns:p="http://schemas.openxmlformats.org/presentationml/2006/main">
   <p:cSld>
@@ -4202,7 +5876,7 @@
         <p:spPr>
           <a:xfrm>
             <a:off x="7929155" y="2782669"/>
-            <a:ext cx="3565528" cy="1754326"/>
+            <a:ext cx="3987502" cy="2308324"/>
           </a:xfrm>
           <a:prstGeom prst="rect">
             <a:avLst/>
@@ -4221,7 +5895,14 @@
             </a:pPr>
             <a:r>
               <a:rPr lang="en-US" dirty="0"/>
-              <a:t>How many columns?</a:t>
+              <a:t>What does the .for file extension</a:t>
+            </a:r>
+            <a:br>
+              <a:rPr lang="en-US" dirty="0"/>
+            </a:br>
+            <a:r>
+              <a:rPr lang="en-US" dirty="0"/>
+              <a:t>mean?</a:t>
             </a:r>
           </a:p>
           <a:p>
@@ -4231,7 +5912,7 @@
             </a:pPr>
             <a:r>
               <a:rPr lang="en-US" dirty="0"/>
-              <a:t>What separates the columns?</a:t>
+              <a:t>How many columns?</a:t>
             </a:r>
           </a:p>
           <a:p>
@@ -4241,14 +5922,7 @@
             </a:pPr>
             <a:r>
               <a:rPr lang="en-US" dirty="0"/>
-              <a:t>What does the .for file extension</a:t>
-            </a:r>
-            <a:br>
-              <a:rPr lang="en-US" dirty="0"/>
-            </a:br>
-            <a:r>
-              <a:rPr lang="en-US" dirty="0"/>
-              <a:t>mean?</a:t>
+              <a:t>What separates the columns?</a:t>
             </a:r>
           </a:p>
           <a:p>
@@ -4258,14 +5932,31 @@
             </a:pPr>
             <a:r>
               <a:rPr lang="en-US" dirty="0"/>
-              <a:t>Why does government data have</a:t>
+              <a:t>How does one handle variable names</a:t>
             </a:r>
             <a:br>
               <a:rPr lang="en-US" dirty="0"/>
             </a:br>
             <a:r>
               <a:rPr lang="en-US" dirty="0"/>
-              <a:t>to be such a pain to read?  </a:t>
+              <a:t>for the data set? </a:t>
+            </a:r>
+          </a:p>
+          <a:p>
+            <a:pPr marL="285750" indent="-285750">
+              <a:buFont typeface="Arial" panose="020B0604020202020204" pitchFamily="34" charset="0"/>
+              <a:buChar char="•"/>
+            </a:pPr>
+            <a:r>
+              <a:rPr lang="en-US" dirty="0"/>
+              <a:t>Why does government data have</a:t>
+            </a:r>
+            <a:br>
+              <a:rPr lang="en-US" dirty="0"/>
+            </a:br>
+            <a:r>
+              <a:rPr lang="en-US" dirty="0"/>
+              <a:t>to be such a hassle to read?  </a:t>
             </a:r>
           </a:p>
         </p:txBody>
@@ -4347,7 +6038,7 @@
           <p:cNvPr id="2" name="Title 1">
             <a:extLst>
               <a:ext uri="{FF2B5EF4-FFF2-40B4-BE49-F238E27FC236}">
-                <a16:creationId xmlns:a16="http://schemas.microsoft.com/office/drawing/2014/main" id="{02DA023C-510C-414A-A092-DDF75FE96A50}"/>
+                <a16:creationId xmlns:a16="http://schemas.microsoft.com/office/drawing/2014/main" id="{2727EE38-2A10-C541-978F-62D48CDFAD0C}"/>
               </a:ext>
             </a:extLst>
           </p:cNvPr>
@@ -4365,45 +6056,146 @@
           <a:p>
             <a:r>
               <a:rPr lang="en-US" dirty="0"/>
-              <a:t>What is a .for file? </a:t>
+              <a:t>Background: El Niño Southern Oscillation</a:t>
             </a:r>
           </a:p>
         </p:txBody>
       </p:sp>
       <p:pic>
         <p:nvPicPr>
-          <p:cNvPr id="3" name="Picture 2">
-            <a:extLst>
-              <a:ext uri="{FF2B5EF4-FFF2-40B4-BE49-F238E27FC236}">
-                <a16:creationId xmlns:a16="http://schemas.microsoft.com/office/drawing/2014/main" id="{8AD3D58A-611B-E144-8CC3-321C184F61B5}"/>
+          <p:cNvPr id="1026" name="Picture 2">
+            <a:extLst>
+              <a:ext uri="{FF2B5EF4-FFF2-40B4-BE49-F238E27FC236}">
+                <a16:creationId xmlns:a16="http://schemas.microsoft.com/office/drawing/2014/main" id="{520E7900-BF95-A845-9C79-B411F19AF6F6}"/>
               </a:ext>
             </a:extLst>
           </p:cNvPr>
           <p:cNvPicPr>
-            <a:picLocks noChangeAspect="1"/>
+            <a:picLocks noChangeAspect="1" noChangeArrowheads="1"/>
           </p:cNvPicPr>
           <p:nvPr/>
         </p:nvPicPr>
         <p:blipFill>
-          <a:blip r:embed="rId2"/>
+          <a:blip r:embed="rId3">
+            <a:extLst>
+              <a:ext uri="{28A0092B-C50C-407E-A947-70E740481C1C}">
+                <a14:useLocalDpi xmlns:a14="http://schemas.microsoft.com/office/drawing/2010/main" val="0"/>
+              </a:ext>
+            </a:extLst>
+          </a:blip>
+          <a:srcRect/>
           <a:stretch>
             <a:fillRect/>
           </a:stretch>
         </p:blipFill>
-        <p:spPr>
+        <p:spPr bwMode="auto">
           <a:xfrm>
-            <a:off x="838200" y="1298903"/>
-            <a:ext cx="6973389" cy="5193972"/>
+            <a:off x="969735" y="1784350"/>
+            <a:ext cx="7378700" cy="3289300"/>
           </a:xfrm>
           <a:prstGeom prst="rect">
             <a:avLst/>
           </a:prstGeom>
+          <a:noFill/>
+          <a:extLst>
+            <a:ext uri="{909E8E84-426E-40DD-AFC4-6F175D3DCCD1}">
+              <a14:hiddenFill xmlns:a14="http://schemas.microsoft.com/office/drawing/2010/main">
+                <a:solidFill>
+                  <a:srgbClr val="FFFFFF"/>
+                </a:solidFill>
+              </a14:hiddenFill>
+            </a:ext>
+          </a:extLst>
         </p:spPr>
       </p:pic>
+      <p:sp>
+        <p:nvSpPr>
+          <p:cNvPr id="4" name="TextBox 3">
+            <a:extLst>
+              <a:ext uri="{FF2B5EF4-FFF2-40B4-BE49-F238E27FC236}">
+                <a16:creationId xmlns:a16="http://schemas.microsoft.com/office/drawing/2014/main" id="{79828A31-49F0-1547-B91B-312C80B6A09B}"/>
+              </a:ext>
+            </a:extLst>
+          </p:cNvPr>
+          <p:cNvSpPr txBox="1"/>
+          <p:nvPr/>
+        </p:nvSpPr>
+        <p:spPr>
+          <a:xfrm>
+            <a:off x="969735" y="5355770"/>
+            <a:ext cx="9574352" cy="707886"/>
+          </a:xfrm>
+          <a:prstGeom prst="rect">
+            <a:avLst/>
+          </a:prstGeom>
+          <a:noFill/>
+        </p:spPr>
+        <p:txBody>
+          <a:bodyPr wrap="none" rtlCol="0">
+            <a:spAutoFit/>
+          </a:bodyPr>
+          <a:lstStyle/>
+          <a:p>
+            <a:r>
+              <a:rPr lang="en-US" sz="2000" dirty="0"/>
+              <a:t>A combined atmospheric and ocean system consisting of four regions for which the NOAA </a:t>
+            </a:r>
+            <a:br>
+              <a:rPr lang="en-US" sz="2000" dirty="0"/>
+            </a:br>
+            <a:r>
+              <a:rPr lang="en-US" sz="2000" dirty="0"/>
+              <a:t>collects data.</a:t>
+            </a:r>
+          </a:p>
+        </p:txBody>
+      </p:sp>
+      <p:sp>
+        <p:nvSpPr>
+          <p:cNvPr id="5" name="TextBox 4">
+            <a:extLst>
+              <a:ext uri="{FF2B5EF4-FFF2-40B4-BE49-F238E27FC236}">
+                <a16:creationId xmlns:a16="http://schemas.microsoft.com/office/drawing/2014/main" id="{BC7EB83D-118D-6243-82A1-943CA8C87329}"/>
+              </a:ext>
+            </a:extLst>
+          </p:cNvPr>
+          <p:cNvSpPr txBox="1"/>
+          <p:nvPr/>
+        </p:nvSpPr>
+        <p:spPr>
+          <a:xfrm>
+            <a:off x="969735" y="6308209"/>
+            <a:ext cx="3664465" cy="276999"/>
+          </a:xfrm>
+          <a:prstGeom prst="rect">
+            <a:avLst/>
+          </a:prstGeom>
+          <a:noFill/>
+        </p:spPr>
+        <p:txBody>
+          <a:bodyPr wrap="none" rtlCol="0">
+            <a:spAutoFit/>
+          </a:bodyPr>
+          <a:lstStyle/>
+          <a:p>
+            <a:r>
+              <a:rPr lang="en-US" sz="1200" dirty="0"/>
+              <a:t>Reference: </a:t>
+            </a:r>
+            <a:r>
+              <a:rPr lang="en-US" sz="1200" dirty="0">
+                <a:hlinkClick r:id="rId4"/>
+              </a:rPr>
+              <a:t>El Niño Southern Oscillation, NOAA Website </a:t>
+            </a:r>
+            <a:endParaRPr lang="en-US" sz="1200" dirty="0"/>
+          </a:p>
+        </p:txBody>
+      </p:sp>
     </p:spTree>
     <p:extLst>
       <p:ext uri="{BB962C8B-B14F-4D97-AF65-F5344CB8AC3E}">
-        <p14:creationId xmlns:p14="http://schemas.microsoft.com/office/powerpoint/2010/main" val="984568838"/>
+        <p14:creationId xmlns:p14="http://schemas.microsoft.com/office/powerpoint/2010/main" val="4282270923"/>
       </p:ext>
     </p:extLst>
   </p:cSld>
@@ -4642,7 +6434,7 @@
           <a:p>
             <a:r>
               <a:rPr lang="en-US" dirty="0"/>
-              <a:t>Alternative 1: </a:t>
+              <a:t>“Yes Virginia, there is a </a:t>
             </a:r>
             <a:r>
               <a:rPr lang="en-US" dirty="0" err="1"/>
@@ -4650,7 +6442,7 @@
             </a:r>
             <a:r>
               <a:rPr lang="en-US" dirty="0"/>
-              <a:t>() </a:t>
+              <a:t>()” </a:t>
             </a:r>
           </a:p>
         </p:txBody>
@@ -4670,7 +6462,7 @@
           <p:nvPr/>
         </p:nvPicPr>
         <p:blipFill>
-          <a:blip r:embed="rId2"/>
+          <a:blip r:embed="rId3"/>
           <a:stretch>
             <a:fillRect/>
           </a:stretch>
@@ -4700,7 +6492,7 @@
           <p:nvPr/>
         </p:nvPicPr>
         <p:blipFill>
-          <a:blip r:embed="rId3"/>
+          <a:blip r:embed="rId4"/>
           <a:stretch>
             <a:fillRect/>
           </a:stretch>
@@ -4730,7 +6522,7 @@
         <p:spPr>
           <a:xfrm>
             <a:off x="838200" y="6123543"/>
-            <a:ext cx="5075492" cy="307777"/>
+            <a:ext cx="5311775" cy="307777"/>
           </a:xfrm>
           <a:prstGeom prst="rect">
             <a:avLst/>
@@ -4745,11 +6537,11 @@
           <a:p>
             <a:r>
               <a:rPr lang="en-US" sz="1400" dirty="0"/>
-              <a:t>Source: </a:t>
+              <a:t>Reference: </a:t>
             </a:r>
             <a:r>
               <a:rPr lang="en-US" sz="1400" dirty="0">
-                <a:hlinkClick r:id="rId4"/>
+                <a:hlinkClick r:id="rId5"/>
               </a:rPr>
               <a:t>Michigan Technological University CS201 – Fortran Formats</a:t>
             </a:r>
@@ -4941,8 +6733,8 @@
         </p:blipFill>
         <p:spPr>
           <a:xfrm>
-            <a:off x="838200" y="1812834"/>
-            <a:ext cx="7277100" cy="2997200"/>
+            <a:off x="838200" y="1812833"/>
+            <a:ext cx="8158104" cy="3360057"/>
           </a:xfrm>
           <a:prstGeom prst="rect">
             <a:avLst/>

</xml_diff>

<commit_message>
add content on reading multiple state files
</commit_message>
<xml_diff>
--- a/presentation/readingFixedFilesInR.pptx
+++ b/presentation/readingFixedFilesInR.pptx
@@ -5,7 +5,7 @@
     <p:sldMasterId id="2147483648" r:id="rId1"/>
   </p:sldMasterIdLst>
   <p:notesMasterIdLst>
-    <p:notesMasterId r:id="rId22"/>
+    <p:notesMasterId r:id="rId27"/>
   </p:notesMasterIdLst>
   <p:sldIdLst>
     <p:sldId id="256" r:id="rId2"/>
@@ -23,11 +23,16 @@
     <p:sldId id="269" r:id="rId14"/>
     <p:sldId id="270" r:id="rId15"/>
     <p:sldId id="271" r:id="rId16"/>
-    <p:sldId id="272" r:id="rId17"/>
-    <p:sldId id="273" r:id="rId18"/>
-    <p:sldId id="274" r:id="rId19"/>
-    <p:sldId id="275" r:id="rId20"/>
-    <p:sldId id="276" r:id="rId21"/>
+    <p:sldId id="279" r:id="rId17"/>
+    <p:sldId id="272" r:id="rId18"/>
+    <p:sldId id="273" r:id="rId19"/>
+    <p:sldId id="274" r:id="rId20"/>
+    <p:sldId id="275" r:id="rId21"/>
+    <p:sldId id="280" r:id="rId22"/>
+    <p:sldId id="281" r:id="rId23"/>
+    <p:sldId id="282" r:id="rId24"/>
+    <p:sldId id="276" r:id="rId25"/>
+    <p:sldId id="278" r:id="rId26"/>
   </p:sldIdLst>
   <p:sldSz cx="12192000" cy="6858000"/>
   <p:notesSz cx="6858000" cy="9144000"/>
@@ -841,6 +846,102 @@
     <p:extLst>
       <p:ext uri="{BB962C8B-B14F-4D97-AF65-F5344CB8AC3E}">
         <p14:creationId xmlns:p14="http://schemas.microsoft.com/office/powerpoint/2010/main" val="850264694"/>
+      </p:ext>
+    </p:extLst>
+  </p:cSld>
+  <p:clrMapOvr>
+    <a:masterClrMapping/>
+  </p:clrMapOvr>
+</p:notes>
+</file>
+
+<file path=ppt/notesSlides/notesSlide5.xml><?xml version="1.0" encoding="utf-8"?>
+<p:notes xmlns:a="http://schemas.openxmlformats.org/drawingml/2006/main" xmlns:r="http://schemas.openxmlformats.org/officeDocument/2006/relationships" xmlns:p="http://schemas.openxmlformats.org/presentationml/2006/main">
+  <p:cSld>
+    <p:spTree>
+      <p:nvGrpSpPr>
+        <p:cNvPr id="1" name=""/>
+        <p:cNvGrpSpPr/>
+        <p:nvPr/>
+      </p:nvGrpSpPr>
+      <p:grpSpPr>
+        <a:xfrm>
+          <a:off x="0" y="0"/>
+          <a:ext cx="0" cy="0"/>
+          <a:chOff x="0" y="0"/>
+          <a:chExt cx="0" cy="0"/>
+        </a:xfrm>
+      </p:grpSpPr>
+      <p:sp>
+        <p:nvSpPr>
+          <p:cNvPr id="2" name="Slide Image Placeholder 1"/>
+          <p:cNvSpPr>
+            <a:spLocks noGrp="1" noRot="1" noChangeAspect="1"/>
+          </p:cNvSpPr>
+          <p:nvPr>
+            <p:ph type="sldImg"/>
+          </p:nvPr>
+        </p:nvSpPr>
+        <p:spPr/>
+      </p:sp>
+      <p:sp>
+        <p:nvSpPr>
+          <p:cNvPr id="3" name="Notes Placeholder 2"/>
+          <p:cNvSpPr>
+            <a:spLocks noGrp="1"/>
+          </p:cNvSpPr>
+          <p:nvPr>
+            <p:ph type="body" idx="1"/>
+          </p:nvPr>
+        </p:nvSpPr>
+        <p:spPr/>
+        <p:txBody>
+          <a:bodyPr/>
+          <a:lstStyle/>
+          <a:p>
+            <a:r>
+              <a:rPr lang="en-US" dirty="0"/>
+              <a:t>Talk about importance of reproducibility – downloads are provided so the work is reproducible </a:t>
+            </a:r>
+          </a:p>
+          <a:p>
+            <a:endParaRPr lang="en-US" dirty="0"/>
+          </a:p>
+          <a:p>
+            <a:r>
+              <a:rPr lang="en-US" dirty="0"/>
+              <a:t>Why store data in a /Georgia subdirectory? This allows us to abstract the code into a function, where we can use the state names to drive an apply() function to read data for multiple states. </a:t>
+            </a:r>
+          </a:p>
+        </p:txBody>
+      </p:sp>
+      <p:sp>
+        <p:nvSpPr>
+          <p:cNvPr id="4" name="Slide Number Placeholder 3"/>
+          <p:cNvSpPr>
+            <a:spLocks noGrp="1"/>
+          </p:cNvSpPr>
+          <p:nvPr>
+            <p:ph type="sldNum" sz="quarter" idx="5"/>
+          </p:nvPr>
+        </p:nvSpPr>
+        <p:spPr/>
+        <p:txBody>
+          <a:bodyPr/>
+          <a:lstStyle/>
+          <a:p>
+            <a:fld id="{ABA03B9F-5CD9-F644-B9E1-D29863D066F7}" type="slidenum">
+              <a:rPr lang="en-US" smtClean="0"/>
+              <a:t>14</a:t>
+            </a:fld>
+            <a:endParaRPr lang="en-US"/>
+          </a:p>
+        </p:txBody>
+      </p:sp>
+    </p:spTree>
+    <p:extLst>
+      <p:ext uri="{BB962C8B-B14F-4D97-AF65-F5344CB8AC3E}">
+        <p14:creationId xmlns:p14="http://schemas.microsoft.com/office/powerpoint/2010/main" val="4083797345"/>
       </p:ext>
     </p:extLst>
   </p:cSld>
@@ -4721,7 +4822,7 @@
           <a:p>
             <a:r>
               <a:rPr lang="en-US" dirty="0"/>
-              <a:t>Eliminating value labels from codebook </a:t>
+              <a:t>Eliminating value labels from the codebook </a:t>
             </a:r>
           </a:p>
         </p:txBody>
@@ -4779,7 +4880,7 @@
           <a:p>
             <a:r>
               <a:rPr lang="en-US" dirty="0"/>
-              <a:t>Data Dictionary</a:t>
+              <a:t>PUMS Codebook</a:t>
             </a:r>
           </a:p>
         </p:txBody>
@@ -4806,8 +4907,8 @@
         </p:blipFill>
         <p:spPr>
           <a:xfrm>
-            <a:off x="838200" y="1446221"/>
-            <a:ext cx="8477123" cy="5307276"/>
+            <a:off x="838200" y="1248101"/>
+            <a:ext cx="8778240" cy="5495796"/>
           </a:xfrm>
           <a:prstGeom prst="rect">
             <a:avLst/>
@@ -4872,12 +4973,54 @@
           </a:p>
         </p:txBody>
       </p:sp>
+      <p:sp>
+        <p:nvSpPr>
+          <p:cNvPr id="4" name="TextBox 3">
+            <a:extLst>
+              <a:ext uri="{FF2B5EF4-FFF2-40B4-BE49-F238E27FC236}">
+                <a16:creationId xmlns:a16="http://schemas.microsoft.com/office/drawing/2014/main" id="{00150276-F902-0245-AE3C-B2B3331EDA6F}"/>
+              </a:ext>
+            </a:extLst>
+          </p:cNvPr>
+          <p:cNvSpPr txBox="1"/>
+          <p:nvPr/>
+        </p:nvSpPr>
+        <p:spPr>
+          <a:xfrm>
+            <a:off x="729465" y="6303952"/>
+            <a:ext cx="8002896" cy="461665"/>
+          </a:xfrm>
+          <a:prstGeom prst="rect">
+            <a:avLst/>
+          </a:prstGeom>
+          <a:noFill/>
+        </p:spPr>
+        <p:txBody>
+          <a:bodyPr wrap="none" rtlCol="0">
+            <a:spAutoFit/>
+          </a:bodyPr>
+          <a:lstStyle/>
+          <a:p>
+            <a:r>
+              <a:rPr lang="en-US" sz="1200" i="1" dirty="0"/>
+              <a:t>Note: there is a revised PUMS file stored in the same location as the original, but the revised file is not in zip format so it takes </a:t>
+            </a:r>
+            <a:br>
+              <a:rPr lang="en-US" sz="1200" i="1" dirty="0"/>
+            </a:br>
+            <a:r>
+              <a:rPr lang="en-US" sz="1200" i="1" dirty="0"/>
+              <a:t>about 10 minutes to download.  </a:t>
+            </a:r>
+          </a:p>
+        </p:txBody>
+      </p:sp>
       <p:pic>
         <p:nvPicPr>
-          <p:cNvPr id="3" name="Picture 2">
-            <a:extLst>
-              <a:ext uri="{FF2B5EF4-FFF2-40B4-BE49-F238E27FC236}">
-                <a16:creationId xmlns:a16="http://schemas.microsoft.com/office/drawing/2014/main" id="{79995E5D-38B2-EC40-8E23-8CB65766B64F}"/>
+          <p:cNvPr id="6" name="Picture 5">
+            <a:extLst>
+              <a:ext uri="{FF2B5EF4-FFF2-40B4-BE49-F238E27FC236}">
+                <a16:creationId xmlns:a16="http://schemas.microsoft.com/office/drawing/2014/main" id="{2717F071-91D0-8742-8E0F-A2D30786FE14}"/>
               </a:ext>
             </a:extLst>
           </p:cNvPr>
@@ -4887,56 +5030,21 @@
           <p:nvPr/>
         </p:nvPicPr>
         <p:blipFill>
-          <a:blip r:embed="rId2"/>
+          <a:blip r:embed="rId3"/>
           <a:stretch>
             <a:fillRect/>
           </a:stretch>
         </p:blipFill>
         <p:spPr>
           <a:xfrm>
-            <a:off x="838200" y="1513114"/>
-            <a:ext cx="10083800" cy="4876800"/>
+            <a:off x="838199" y="1216508"/>
+            <a:ext cx="10200977" cy="5087444"/>
           </a:xfrm>
           <a:prstGeom prst="rect">
             <a:avLst/>
           </a:prstGeom>
         </p:spPr>
       </p:pic>
-      <p:sp>
-        <p:nvSpPr>
-          <p:cNvPr id="4" name="TextBox 3">
-            <a:extLst>
-              <a:ext uri="{FF2B5EF4-FFF2-40B4-BE49-F238E27FC236}">
-                <a16:creationId xmlns:a16="http://schemas.microsoft.com/office/drawing/2014/main" id="{00150276-F902-0245-AE3C-B2B3331EDA6F}"/>
-              </a:ext>
-            </a:extLst>
-          </p:cNvPr>
-          <p:cNvSpPr txBox="1"/>
-          <p:nvPr/>
-        </p:nvSpPr>
-        <p:spPr>
-          <a:xfrm>
-            <a:off x="729465" y="6441112"/>
-            <a:ext cx="10016781" cy="276999"/>
-          </a:xfrm>
-          <a:prstGeom prst="rect">
-            <a:avLst/>
-          </a:prstGeom>
-          <a:noFill/>
-        </p:spPr>
-        <p:txBody>
-          <a:bodyPr wrap="none" rtlCol="0">
-            <a:spAutoFit/>
-          </a:bodyPr>
-          <a:lstStyle/>
-          <a:p>
-            <a:r>
-              <a:rPr lang="en-US" sz="1200" i="1" dirty="0"/>
-              <a:t>Note: there is a revised PUMS file stored in the same location as the original, but the revised file is not in zip format so it takes about 10 minutes to download.  </a:t>
-            </a:r>
-          </a:p>
-        </p:txBody>
-      </p:sp>
     </p:spTree>
     <p:extLst>
       <p:ext uri="{BB962C8B-B14F-4D97-AF65-F5344CB8AC3E}">
@@ -4997,10 +5105,10 @@
       </p:sp>
       <p:pic>
         <p:nvPicPr>
-          <p:cNvPr id="5" name="Picture 4">
-            <a:extLst>
-              <a:ext uri="{FF2B5EF4-FFF2-40B4-BE49-F238E27FC236}">
-                <a16:creationId xmlns:a16="http://schemas.microsoft.com/office/drawing/2014/main" id="{FC041B83-1E27-B040-ACF6-112C5BAD86CD}"/>
+          <p:cNvPr id="6" name="Picture 5">
+            <a:extLst>
+              <a:ext uri="{FF2B5EF4-FFF2-40B4-BE49-F238E27FC236}">
+                <a16:creationId xmlns:a16="http://schemas.microsoft.com/office/drawing/2014/main" id="{28710683-1CAF-F945-B1BA-24AB12F86F73}"/>
               </a:ext>
             </a:extLst>
           </p:cNvPr>
@@ -5017,8 +5125,8 @@
         </p:blipFill>
         <p:spPr>
           <a:xfrm>
-            <a:off x="894168" y="1690688"/>
-            <a:ext cx="6566279" cy="1206624"/>
+            <a:off x="894169" y="3429000"/>
+            <a:ext cx="6261100" cy="2692400"/>
           </a:xfrm>
           <a:prstGeom prst="rect">
             <a:avLst/>
@@ -5027,10 +5135,10 @@
       </p:pic>
       <p:pic>
         <p:nvPicPr>
-          <p:cNvPr id="6" name="Picture 5">
-            <a:extLst>
-              <a:ext uri="{FF2B5EF4-FFF2-40B4-BE49-F238E27FC236}">
-                <a16:creationId xmlns:a16="http://schemas.microsoft.com/office/drawing/2014/main" id="{28710683-1CAF-F945-B1BA-24AB12F86F73}"/>
+          <p:cNvPr id="3" name="Picture 2">
+            <a:extLst>
+              <a:ext uri="{FF2B5EF4-FFF2-40B4-BE49-F238E27FC236}">
+                <a16:creationId xmlns:a16="http://schemas.microsoft.com/office/drawing/2014/main" id="{B61E285A-80E9-AA4A-BE54-2712FD8BDB8E}"/>
               </a:ext>
             </a:extLst>
           </p:cNvPr>
@@ -5047,8 +5155,8 @@
         </p:blipFill>
         <p:spPr>
           <a:xfrm>
-            <a:off x="894169" y="3562278"/>
-            <a:ext cx="6261100" cy="2692400"/>
+            <a:off x="894169" y="1353668"/>
+            <a:ext cx="9425760" cy="1648612"/>
           </a:xfrm>
           <a:prstGeom prst="rect">
             <a:avLst/>
@@ -5090,7 +5198,7 @@
           <p:cNvPr id="2" name="Title 1">
             <a:extLst>
               <a:ext uri="{FF2B5EF4-FFF2-40B4-BE49-F238E27FC236}">
-                <a16:creationId xmlns:a16="http://schemas.microsoft.com/office/drawing/2014/main" id="{0A1497BC-7306-BF4E-B417-3C6949BBCD1D}"/>
+                <a16:creationId xmlns:a16="http://schemas.microsoft.com/office/drawing/2014/main" id="{D78837B3-1C7C-E144-8C26-B46F878299AD}"/>
               </a:ext>
             </a:extLst>
           </p:cNvPr>
@@ -5108,17 +5216,17 @@
           <a:p>
             <a:r>
               <a:rPr lang="en-US" dirty="0"/>
-              <a:t>Read &amp; clean the codebook</a:t>
+              <a:t>Alternate approach: don’t try this at home</a:t>
             </a:r>
           </a:p>
         </p:txBody>
       </p:sp>
       <p:pic>
         <p:nvPicPr>
-          <p:cNvPr id="3" name="Picture 2">
-            <a:extLst>
-              <a:ext uri="{FF2B5EF4-FFF2-40B4-BE49-F238E27FC236}">
-                <a16:creationId xmlns:a16="http://schemas.microsoft.com/office/drawing/2014/main" id="{A97D9093-FC2C-8148-85AD-178ED33F485F}"/>
+          <p:cNvPr id="4" name="Picture 3">
+            <a:extLst>
+              <a:ext uri="{FF2B5EF4-FFF2-40B4-BE49-F238E27FC236}">
+                <a16:creationId xmlns:a16="http://schemas.microsoft.com/office/drawing/2014/main" id="{F6C69231-5B38-5846-96B3-E1F7728AC58B}"/>
               </a:ext>
             </a:extLst>
           </p:cNvPr>
@@ -5135,8 +5243,8 @@
         </p:blipFill>
         <p:spPr>
           <a:xfrm>
-            <a:off x="951955" y="1475559"/>
-            <a:ext cx="7392886" cy="4755424"/>
+            <a:off x="838200" y="1569720"/>
+            <a:ext cx="9488488" cy="3276600"/>
           </a:xfrm>
           <a:prstGeom prst="rect">
             <a:avLst/>
@@ -5146,7 +5254,7 @@
     </p:spTree>
     <p:extLst>
       <p:ext uri="{BB962C8B-B14F-4D97-AF65-F5344CB8AC3E}">
-        <p14:creationId xmlns:p14="http://schemas.microsoft.com/office/powerpoint/2010/main" val="2820406415"/>
+        <p14:creationId xmlns:p14="http://schemas.microsoft.com/office/powerpoint/2010/main" val="2744624890"/>
       </p:ext>
     </p:extLst>
   </p:cSld>
@@ -5178,7 +5286,7 @@
           <p:cNvPr id="2" name="Title 1">
             <a:extLst>
               <a:ext uri="{FF2B5EF4-FFF2-40B4-BE49-F238E27FC236}">
-                <a16:creationId xmlns:a16="http://schemas.microsoft.com/office/drawing/2014/main" id="{27A200C3-B68A-C44B-A84F-20D44834AEB0}"/>
+                <a16:creationId xmlns:a16="http://schemas.microsoft.com/office/drawing/2014/main" id="{0A1497BC-7306-BF4E-B417-3C6949BBCD1D}"/>
               </a:ext>
             </a:extLst>
           </p:cNvPr>
@@ -5196,15 +5304,7 @@
           <a:p>
             <a:r>
               <a:rPr lang="en-US" dirty="0"/>
-              <a:t>Use codebook to configure </a:t>
-            </a:r>
-            <a:r>
-              <a:rPr lang="en-US" dirty="0" err="1"/>
-              <a:t>read_fwf</a:t>
-            </a:r>
-            <a:r>
-              <a:rPr lang="en-US" dirty="0"/>
-              <a:t>()</a:t>
+              <a:t>Read &amp; clean the codebook</a:t>
             </a:r>
           </a:p>
         </p:txBody>
@@ -5214,7 +5314,7 @@
           <p:cNvPr id="3" name="Picture 2">
             <a:extLst>
               <a:ext uri="{FF2B5EF4-FFF2-40B4-BE49-F238E27FC236}">
-                <a16:creationId xmlns:a16="http://schemas.microsoft.com/office/drawing/2014/main" id="{1108F545-9ECF-8E4D-BB56-275A636D6DE7}"/>
+                <a16:creationId xmlns:a16="http://schemas.microsoft.com/office/drawing/2014/main" id="{A97D9093-FC2C-8148-85AD-178ED33F485F}"/>
               </a:ext>
             </a:extLst>
           </p:cNvPr>
@@ -5231,38 +5331,8 @@
         </p:blipFill>
         <p:spPr>
           <a:xfrm>
-            <a:off x="1043033" y="1567543"/>
-            <a:ext cx="6117678" cy="2258605"/>
-          </a:xfrm>
-          <a:prstGeom prst="rect">
-            <a:avLst/>
-          </a:prstGeom>
-        </p:spPr>
-      </p:pic>
-      <p:pic>
-        <p:nvPicPr>
-          <p:cNvPr id="4" name="Picture 3">
-            <a:extLst>
-              <a:ext uri="{FF2B5EF4-FFF2-40B4-BE49-F238E27FC236}">
-                <a16:creationId xmlns:a16="http://schemas.microsoft.com/office/drawing/2014/main" id="{CE888A91-E21F-DF4E-A36B-09A1AAA3D5CC}"/>
-              </a:ext>
-            </a:extLst>
-          </p:cNvPr>
-          <p:cNvPicPr>
-            <a:picLocks noChangeAspect="1"/>
-          </p:cNvPicPr>
-          <p:nvPr/>
-        </p:nvPicPr>
-        <p:blipFill>
-          <a:blip r:embed="rId3"/>
-          <a:stretch>
-            <a:fillRect/>
-          </a:stretch>
-        </p:blipFill>
-        <p:spPr>
-          <a:xfrm>
-            <a:off x="1043033" y="3966301"/>
-            <a:ext cx="6110784" cy="2526574"/>
+            <a:off x="838200" y="1353668"/>
+            <a:ext cx="7993925" cy="5142038"/>
           </a:xfrm>
           <a:prstGeom prst="rect">
             <a:avLst/>
@@ -5272,7 +5342,7 @@
     </p:spTree>
     <p:extLst>
       <p:ext uri="{BB962C8B-B14F-4D97-AF65-F5344CB8AC3E}">
-        <p14:creationId xmlns:p14="http://schemas.microsoft.com/office/powerpoint/2010/main" val="911978099"/>
+        <p14:creationId xmlns:p14="http://schemas.microsoft.com/office/powerpoint/2010/main" val="2820406415"/>
       </p:ext>
     </p:extLst>
   </p:cSld>
@@ -5304,7 +5374,7 @@
           <p:cNvPr id="2" name="Title 1">
             <a:extLst>
               <a:ext uri="{FF2B5EF4-FFF2-40B4-BE49-F238E27FC236}">
-                <a16:creationId xmlns:a16="http://schemas.microsoft.com/office/drawing/2014/main" id="{A491959E-F635-624A-A884-AB9CE2DC221D}"/>
+                <a16:creationId xmlns:a16="http://schemas.microsoft.com/office/drawing/2014/main" id="{27A200C3-B68A-C44B-A84F-20D44834AEB0}"/>
               </a:ext>
             </a:extLst>
           </p:cNvPr>
@@ -5322,17 +5392,25 @@
           <a:p>
             <a:r>
               <a:rPr lang="en-US" dirty="0"/>
-              <a:t>Read the file</a:t>
+              <a:t>Use codebook to configure </a:t>
+            </a:r>
+            <a:r>
+              <a:rPr lang="en-US" dirty="0" err="1"/>
+              <a:t>read_fwf</a:t>
+            </a:r>
+            <a:r>
+              <a:rPr lang="en-US" dirty="0"/>
+              <a:t>()</a:t>
             </a:r>
           </a:p>
         </p:txBody>
       </p:sp>
       <p:pic>
         <p:nvPicPr>
-          <p:cNvPr id="5" name="Picture 4">
-            <a:extLst>
-              <a:ext uri="{FF2B5EF4-FFF2-40B4-BE49-F238E27FC236}">
-                <a16:creationId xmlns:a16="http://schemas.microsoft.com/office/drawing/2014/main" id="{AB1DB2B9-8648-F54F-8250-8E73ECEDA99E}"/>
+          <p:cNvPr id="3" name="Picture 2">
+            <a:extLst>
+              <a:ext uri="{FF2B5EF4-FFF2-40B4-BE49-F238E27FC236}">
+                <a16:creationId xmlns:a16="http://schemas.microsoft.com/office/drawing/2014/main" id="{1108F545-9ECF-8E4D-BB56-275A636D6DE7}"/>
               </a:ext>
             </a:extLst>
           </p:cNvPr>
@@ -5349,8 +5427,8 @@
         </p:blipFill>
         <p:spPr>
           <a:xfrm>
-            <a:off x="948648" y="1607192"/>
-            <a:ext cx="6841598" cy="981896"/>
+            <a:off x="1043033" y="1353668"/>
+            <a:ext cx="6529406" cy="2410612"/>
           </a:xfrm>
           <a:prstGeom prst="rect">
             <a:avLst/>
@@ -5359,10 +5437,10 @@
       </p:pic>
       <p:pic>
         <p:nvPicPr>
-          <p:cNvPr id="6" name="Picture 5">
-            <a:extLst>
-              <a:ext uri="{FF2B5EF4-FFF2-40B4-BE49-F238E27FC236}">
-                <a16:creationId xmlns:a16="http://schemas.microsoft.com/office/drawing/2014/main" id="{552DDBCC-5B54-8A4A-80EF-DA328FCE87B9}"/>
+          <p:cNvPr id="4" name="Picture 3">
+            <a:extLst>
+              <a:ext uri="{FF2B5EF4-FFF2-40B4-BE49-F238E27FC236}">
+                <a16:creationId xmlns:a16="http://schemas.microsoft.com/office/drawing/2014/main" id="{CE888A91-E21F-DF4E-A36B-09A1AAA3D5CC}"/>
               </a:ext>
             </a:extLst>
           </p:cNvPr>
@@ -5379,8 +5457,8 @@
         </p:blipFill>
         <p:spPr>
           <a:xfrm>
-            <a:off x="838200" y="3379325"/>
-            <a:ext cx="9753754" cy="1767868"/>
+            <a:off x="1043033" y="3794760"/>
+            <a:ext cx="6394087" cy="2643709"/>
           </a:xfrm>
           <a:prstGeom prst="rect">
             <a:avLst/>
@@ -5390,7 +5468,7 @@
     </p:spTree>
     <p:extLst>
       <p:ext uri="{BB962C8B-B14F-4D97-AF65-F5344CB8AC3E}">
-        <p14:creationId xmlns:p14="http://schemas.microsoft.com/office/powerpoint/2010/main" val="3514293667"/>
+        <p14:creationId xmlns:p14="http://schemas.microsoft.com/office/powerpoint/2010/main" val="911978099"/>
       </p:ext>
     </p:extLst>
   </p:cSld>
@@ -5422,7 +5500,7 @@
           <p:cNvPr id="2" name="Title 1">
             <a:extLst>
               <a:ext uri="{FF2B5EF4-FFF2-40B4-BE49-F238E27FC236}">
-                <a16:creationId xmlns:a16="http://schemas.microsoft.com/office/drawing/2014/main" id="{8C733588-1AEF-374A-B095-B4CC21D16DD3}"/>
+                <a16:creationId xmlns:a16="http://schemas.microsoft.com/office/drawing/2014/main" id="{A491959E-F635-624A-A884-AB9CE2DC221D}"/>
               </a:ext>
             </a:extLst>
           </p:cNvPr>
@@ -5440,17 +5518,17 @@
           <a:p>
             <a:r>
               <a:rPr lang="en-US" dirty="0"/>
-              <a:t>Run a simple analysis</a:t>
+              <a:t>Read the file</a:t>
             </a:r>
           </a:p>
         </p:txBody>
       </p:sp>
       <p:pic>
         <p:nvPicPr>
-          <p:cNvPr id="4" name="Picture 3">
-            <a:extLst>
-              <a:ext uri="{FF2B5EF4-FFF2-40B4-BE49-F238E27FC236}">
-                <a16:creationId xmlns:a16="http://schemas.microsoft.com/office/drawing/2014/main" id="{D4BE3F9A-3177-5F44-9FC0-03C062A0ADA3}"/>
+          <p:cNvPr id="5" name="Picture 4">
+            <a:extLst>
+              <a:ext uri="{FF2B5EF4-FFF2-40B4-BE49-F238E27FC236}">
+                <a16:creationId xmlns:a16="http://schemas.microsoft.com/office/drawing/2014/main" id="{AB1DB2B9-8648-F54F-8250-8E73ECEDA99E}"/>
               </a:ext>
             </a:extLst>
           </p:cNvPr>
@@ -5467,8 +5545,8 @@
         </p:blipFill>
         <p:spPr>
           <a:xfrm>
-            <a:off x="838200" y="2377011"/>
-            <a:ext cx="5613400" cy="3441700"/>
+            <a:off x="948648" y="1607192"/>
+            <a:ext cx="6841598" cy="981896"/>
           </a:xfrm>
           <a:prstGeom prst="rect">
             <a:avLst/>
@@ -5477,10 +5555,10 @@
       </p:pic>
       <p:pic>
         <p:nvPicPr>
-          <p:cNvPr id="5" name="Picture 4">
-            <a:extLst>
-              <a:ext uri="{FF2B5EF4-FFF2-40B4-BE49-F238E27FC236}">
-                <a16:creationId xmlns:a16="http://schemas.microsoft.com/office/drawing/2014/main" id="{A61EC309-DF08-DF43-9C98-0ABAFDCC48E3}"/>
+          <p:cNvPr id="6" name="Picture 5">
+            <a:extLst>
+              <a:ext uri="{FF2B5EF4-FFF2-40B4-BE49-F238E27FC236}">
+                <a16:creationId xmlns:a16="http://schemas.microsoft.com/office/drawing/2014/main" id="{552DDBCC-5B54-8A4A-80EF-DA328FCE87B9}"/>
               </a:ext>
             </a:extLst>
           </p:cNvPr>
@@ -5497,38 +5575,8 @@
         </p:blipFill>
         <p:spPr>
           <a:xfrm>
-            <a:off x="838200" y="5703119"/>
-            <a:ext cx="4906281" cy="998126"/>
-          </a:xfrm>
-          <a:prstGeom prst="rect">
-            <a:avLst/>
-          </a:prstGeom>
-        </p:spPr>
-      </p:pic>
-      <p:pic>
-        <p:nvPicPr>
-          <p:cNvPr id="6" name="Picture 5">
-            <a:extLst>
-              <a:ext uri="{FF2B5EF4-FFF2-40B4-BE49-F238E27FC236}">
-                <a16:creationId xmlns:a16="http://schemas.microsoft.com/office/drawing/2014/main" id="{6851049C-7157-D540-A041-2C18A4A85F8D}"/>
-              </a:ext>
-            </a:extLst>
-          </p:cNvPr>
-          <p:cNvPicPr>
-            <a:picLocks noChangeAspect="1"/>
-          </p:cNvPicPr>
-          <p:nvPr/>
-        </p:nvPicPr>
-        <p:blipFill>
-          <a:blip r:embed="rId4"/>
-          <a:stretch>
-            <a:fillRect/>
-          </a:stretch>
-        </p:blipFill>
-        <p:spPr>
-          <a:xfrm>
-            <a:off x="972094" y="1643154"/>
-            <a:ext cx="3439819" cy="901700"/>
+            <a:off x="838200" y="3379325"/>
+            <a:ext cx="9753754" cy="1767868"/>
           </a:xfrm>
           <a:prstGeom prst="rect">
             <a:avLst/>
@@ -5538,7 +5586,7 @@
     </p:spTree>
     <p:extLst>
       <p:ext uri="{BB962C8B-B14F-4D97-AF65-F5344CB8AC3E}">
-        <p14:creationId xmlns:p14="http://schemas.microsoft.com/office/powerpoint/2010/main" val="1008562000"/>
+        <p14:creationId xmlns:p14="http://schemas.microsoft.com/office/powerpoint/2010/main" val="3514293667"/>
       </p:ext>
     </p:extLst>
   </p:cSld>
@@ -5740,10 +5788,216 @@
       </p:grpSpPr>
       <p:sp>
         <p:nvSpPr>
-          <p:cNvPr id="3" name="TextBox 2">
-            <a:extLst>
-              <a:ext uri="{FF2B5EF4-FFF2-40B4-BE49-F238E27FC236}">
-                <a16:creationId xmlns:a16="http://schemas.microsoft.com/office/drawing/2014/main" id="{D639DFBB-76B2-E64D-91BA-C82ACDE98D30}"/>
+          <p:cNvPr id="2" name="Title 1">
+            <a:extLst>
+              <a:ext uri="{FF2B5EF4-FFF2-40B4-BE49-F238E27FC236}">
+                <a16:creationId xmlns:a16="http://schemas.microsoft.com/office/drawing/2014/main" id="{8C733588-1AEF-374A-B095-B4CC21D16DD3}"/>
+              </a:ext>
+            </a:extLst>
+          </p:cNvPr>
+          <p:cNvSpPr>
+            <a:spLocks noGrp="1"/>
+          </p:cNvSpPr>
+          <p:nvPr>
+            <p:ph type="title"/>
+          </p:nvPr>
+        </p:nvSpPr>
+        <p:spPr/>
+        <p:txBody>
+          <a:bodyPr/>
+          <a:lstStyle/>
+          <a:p>
+            <a:r>
+              <a:rPr lang="en-US" dirty="0"/>
+              <a:t>Run a simple analysis</a:t>
+            </a:r>
+          </a:p>
+        </p:txBody>
+      </p:sp>
+      <p:pic>
+        <p:nvPicPr>
+          <p:cNvPr id="4" name="Picture 3">
+            <a:extLst>
+              <a:ext uri="{FF2B5EF4-FFF2-40B4-BE49-F238E27FC236}">
+                <a16:creationId xmlns:a16="http://schemas.microsoft.com/office/drawing/2014/main" id="{D4BE3F9A-3177-5F44-9FC0-03C062A0ADA3}"/>
+              </a:ext>
+            </a:extLst>
+          </p:cNvPr>
+          <p:cNvPicPr>
+            <a:picLocks noChangeAspect="1"/>
+          </p:cNvPicPr>
+          <p:nvPr/>
+        </p:nvPicPr>
+        <p:blipFill>
+          <a:blip r:embed="rId2"/>
+          <a:stretch>
+            <a:fillRect/>
+          </a:stretch>
+        </p:blipFill>
+        <p:spPr>
+          <a:xfrm>
+            <a:off x="838200" y="2377011"/>
+            <a:ext cx="5613400" cy="3441700"/>
+          </a:xfrm>
+          <a:prstGeom prst="rect">
+            <a:avLst/>
+          </a:prstGeom>
+        </p:spPr>
+      </p:pic>
+      <p:pic>
+        <p:nvPicPr>
+          <p:cNvPr id="5" name="Picture 4">
+            <a:extLst>
+              <a:ext uri="{FF2B5EF4-FFF2-40B4-BE49-F238E27FC236}">
+                <a16:creationId xmlns:a16="http://schemas.microsoft.com/office/drawing/2014/main" id="{A61EC309-DF08-DF43-9C98-0ABAFDCC48E3}"/>
+              </a:ext>
+            </a:extLst>
+          </p:cNvPr>
+          <p:cNvPicPr>
+            <a:picLocks noChangeAspect="1"/>
+          </p:cNvPicPr>
+          <p:nvPr/>
+        </p:nvPicPr>
+        <p:blipFill>
+          <a:blip r:embed="rId3"/>
+          <a:stretch>
+            <a:fillRect/>
+          </a:stretch>
+        </p:blipFill>
+        <p:spPr>
+          <a:xfrm>
+            <a:off x="838200" y="5703119"/>
+            <a:ext cx="4906281" cy="998126"/>
+          </a:xfrm>
+          <a:prstGeom prst="rect">
+            <a:avLst/>
+          </a:prstGeom>
+        </p:spPr>
+      </p:pic>
+      <p:pic>
+        <p:nvPicPr>
+          <p:cNvPr id="6" name="Picture 5">
+            <a:extLst>
+              <a:ext uri="{FF2B5EF4-FFF2-40B4-BE49-F238E27FC236}">
+                <a16:creationId xmlns:a16="http://schemas.microsoft.com/office/drawing/2014/main" id="{6851049C-7157-D540-A041-2C18A4A85F8D}"/>
+              </a:ext>
+            </a:extLst>
+          </p:cNvPr>
+          <p:cNvPicPr>
+            <a:picLocks noChangeAspect="1"/>
+          </p:cNvPicPr>
+          <p:nvPr/>
+        </p:nvPicPr>
+        <p:blipFill>
+          <a:blip r:embed="rId4"/>
+          <a:stretch>
+            <a:fillRect/>
+          </a:stretch>
+        </p:blipFill>
+        <p:spPr>
+          <a:xfrm>
+            <a:off x="972094" y="1643154"/>
+            <a:ext cx="3439819" cy="901700"/>
+          </a:xfrm>
+          <a:prstGeom prst="rect">
+            <a:avLst/>
+          </a:prstGeom>
+        </p:spPr>
+      </p:pic>
+    </p:spTree>
+    <p:extLst>
+      <p:ext uri="{BB962C8B-B14F-4D97-AF65-F5344CB8AC3E}">
+        <p14:creationId xmlns:p14="http://schemas.microsoft.com/office/powerpoint/2010/main" val="1008562000"/>
+      </p:ext>
+    </p:extLst>
+  </p:cSld>
+  <p:clrMapOvr>
+    <a:masterClrMapping/>
+  </p:clrMapOvr>
+</p:sld>
+</file>
+
+<file path=ppt/slides/slide21.xml><?xml version="1.0" encoding="utf-8"?>
+<p:sld xmlns:a="http://schemas.openxmlformats.org/drawingml/2006/main" xmlns:r="http://schemas.openxmlformats.org/officeDocument/2006/relationships" xmlns:p="http://schemas.openxmlformats.org/presentationml/2006/main">
+  <p:cSld>
+    <p:spTree>
+      <p:nvGrpSpPr>
+        <p:cNvPr id="1" name=""/>
+        <p:cNvGrpSpPr/>
+        <p:nvPr/>
+      </p:nvGrpSpPr>
+      <p:grpSpPr>
+        <a:xfrm>
+          <a:off x="0" y="0"/>
+          <a:ext cx="0" cy="0"/>
+          <a:chOff x="0" y="0"/>
+          <a:chExt cx="0" cy="0"/>
+        </a:xfrm>
+      </p:grpSpPr>
+      <p:sp>
+        <p:nvSpPr>
+          <p:cNvPr id="2" name="Title 1">
+            <a:extLst>
+              <a:ext uri="{FF2B5EF4-FFF2-40B4-BE49-F238E27FC236}">
+                <a16:creationId xmlns:a16="http://schemas.microsoft.com/office/drawing/2014/main" id="{2D4739D4-3A8D-3D41-8E89-B51A1C35C0B7}"/>
+              </a:ext>
+            </a:extLst>
+          </p:cNvPr>
+          <p:cNvSpPr>
+            <a:spLocks noGrp="1"/>
+          </p:cNvSpPr>
+          <p:nvPr>
+            <p:ph type="title"/>
+          </p:nvPr>
+        </p:nvSpPr>
+        <p:spPr/>
+        <p:txBody>
+          <a:bodyPr/>
+          <a:lstStyle/>
+          <a:p>
+            <a:r>
+              <a:rPr lang="en-US" dirty="0"/>
+              <a:t>Generalizing the solution</a:t>
+            </a:r>
+          </a:p>
+        </p:txBody>
+      </p:sp>
+      <p:pic>
+        <p:nvPicPr>
+          <p:cNvPr id="3" name="Picture 2">
+            <a:extLst>
+              <a:ext uri="{FF2B5EF4-FFF2-40B4-BE49-F238E27FC236}">
+                <a16:creationId xmlns:a16="http://schemas.microsoft.com/office/drawing/2014/main" id="{41663BBC-43D5-1846-98D8-D05860CD2A49}"/>
+              </a:ext>
+            </a:extLst>
+          </p:cNvPr>
+          <p:cNvPicPr>
+            <a:picLocks noChangeAspect="1"/>
+          </p:cNvPicPr>
+          <p:nvPr/>
+        </p:nvPicPr>
+        <p:blipFill>
+          <a:blip r:embed="rId2"/>
+          <a:stretch>
+            <a:fillRect/>
+          </a:stretch>
+        </p:blipFill>
+        <p:spPr>
+          <a:xfrm>
+            <a:off x="838200" y="1216508"/>
+            <a:ext cx="4986020" cy="4986020"/>
+          </a:xfrm>
+          <a:prstGeom prst="rect">
+            <a:avLst/>
+          </a:prstGeom>
+        </p:spPr>
+      </p:pic>
+      <p:sp>
+        <p:nvSpPr>
+          <p:cNvPr id="4" name="TextBox 3">
+            <a:extLst>
+              <a:ext uri="{FF2B5EF4-FFF2-40B4-BE49-F238E27FC236}">
+                <a16:creationId xmlns:a16="http://schemas.microsoft.com/office/drawing/2014/main" id="{7A906087-80A7-F442-A7A5-E5099EE64847}"/>
               </a:ext>
             </a:extLst>
           </p:cNvPr>
@@ -5752,8 +6006,8 @@
         </p:nvSpPr>
         <p:spPr>
           <a:xfrm>
-            <a:off x="4526165" y="2967200"/>
-            <a:ext cx="3401893" cy="1569660"/>
+            <a:off x="838200" y="6397859"/>
+            <a:ext cx="7830220" cy="369332"/>
           </a:xfrm>
           <a:prstGeom prst="rect">
             <a:avLst/>
@@ -5767,6 +6021,313 @@
           <a:lstStyle/>
           <a:p>
             <a:r>
+              <a:rPr lang="en-US" dirty="0"/>
+              <a:t>Reference:  </a:t>
+            </a:r>
+            <a:r>
+              <a:rPr lang="en-US" dirty="0">
+                <a:hlinkClick r:id="rId3"/>
+              </a:rPr>
+              <a:t>https://www2.census.gov/census_2000/datasets/PUMS/FivePercent/</a:t>
+            </a:r>
+            <a:r>
+              <a:rPr lang="en-US" dirty="0"/>
+              <a:t> </a:t>
+            </a:r>
+          </a:p>
+        </p:txBody>
+      </p:sp>
+      <p:sp>
+        <p:nvSpPr>
+          <p:cNvPr id="5" name="TextBox 4">
+            <a:extLst>
+              <a:ext uri="{FF2B5EF4-FFF2-40B4-BE49-F238E27FC236}">
+                <a16:creationId xmlns:a16="http://schemas.microsoft.com/office/drawing/2014/main" id="{FC7C067A-A099-8741-B452-1DEDC8A4037F}"/>
+              </a:ext>
+            </a:extLst>
+          </p:cNvPr>
+          <p:cNvSpPr txBox="1"/>
+          <p:nvPr/>
+        </p:nvSpPr>
+        <p:spPr>
+          <a:xfrm>
+            <a:off x="6555114" y="2997815"/>
+            <a:ext cx="4798686" cy="1200329"/>
+          </a:xfrm>
+          <a:prstGeom prst="rect">
+            <a:avLst/>
+          </a:prstGeom>
+          <a:noFill/>
+        </p:spPr>
+        <p:txBody>
+          <a:bodyPr wrap="none" rtlCol="0">
+            <a:spAutoFit/>
+          </a:bodyPr>
+          <a:lstStyle/>
+          <a:p>
+            <a:r>
+              <a:rPr lang="en-US" sz="2400" dirty="0"/>
+              <a:t>We can use the state names to drive</a:t>
+            </a:r>
+          </a:p>
+          <a:p>
+            <a:r>
+              <a:rPr lang="en-US" sz="2400" dirty="0"/>
+              <a:t>an apply() function to download and </a:t>
+            </a:r>
+            <a:br>
+              <a:rPr lang="en-US" sz="2400" dirty="0"/>
+            </a:br>
+            <a:r>
+              <a:rPr lang="en-US" sz="2400" dirty="0"/>
+              <a:t>process the data for multiple states. </a:t>
+            </a:r>
+          </a:p>
+        </p:txBody>
+      </p:sp>
+    </p:spTree>
+    <p:extLst>
+      <p:ext uri="{BB962C8B-B14F-4D97-AF65-F5344CB8AC3E}">
+        <p14:creationId xmlns:p14="http://schemas.microsoft.com/office/powerpoint/2010/main" val="4173295013"/>
+      </p:ext>
+    </p:extLst>
+  </p:cSld>
+  <p:clrMapOvr>
+    <a:masterClrMapping/>
+  </p:clrMapOvr>
+</p:sld>
+</file>
+
+<file path=ppt/slides/slide22.xml><?xml version="1.0" encoding="utf-8"?>
+<p:sld xmlns:a="http://schemas.openxmlformats.org/drawingml/2006/main" xmlns:r="http://schemas.openxmlformats.org/officeDocument/2006/relationships" xmlns:p="http://schemas.openxmlformats.org/presentationml/2006/main">
+  <p:cSld>
+    <p:spTree>
+      <p:nvGrpSpPr>
+        <p:cNvPr id="1" name=""/>
+        <p:cNvGrpSpPr/>
+        <p:nvPr/>
+      </p:nvGrpSpPr>
+      <p:grpSpPr>
+        <a:xfrm>
+          <a:off x="0" y="0"/>
+          <a:ext cx="0" cy="0"/>
+          <a:chOff x="0" y="0"/>
+          <a:chExt cx="0" cy="0"/>
+        </a:xfrm>
+      </p:grpSpPr>
+      <p:sp>
+        <p:nvSpPr>
+          <p:cNvPr id="2" name="Title 1">
+            <a:extLst>
+              <a:ext uri="{FF2B5EF4-FFF2-40B4-BE49-F238E27FC236}">
+                <a16:creationId xmlns:a16="http://schemas.microsoft.com/office/drawing/2014/main" id="{767A8BC1-4E83-7347-8948-6AC77F0765ED}"/>
+              </a:ext>
+            </a:extLst>
+          </p:cNvPr>
+          <p:cNvSpPr>
+            <a:spLocks noGrp="1"/>
+          </p:cNvSpPr>
+          <p:nvPr>
+            <p:ph type="title"/>
+          </p:nvPr>
+        </p:nvSpPr>
+        <p:spPr/>
+        <p:txBody>
+          <a:bodyPr/>
+          <a:lstStyle/>
+          <a:p>
+            <a:r>
+              <a:rPr lang="en-US" dirty="0"/>
+              <a:t>First, the setup</a:t>
+            </a:r>
+          </a:p>
+        </p:txBody>
+      </p:sp>
+      <p:pic>
+        <p:nvPicPr>
+          <p:cNvPr id="3" name="Picture 2">
+            <a:extLst>
+              <a:ext uri="{FF2B5EF4-FFF2-40B4-BE49-F238E27FC236}">
+                <a16:creationId xmlns:a16="http://schemas.microsoft.com/office/drawing/2014/main" id="{A0E81EDA-850A-7842-A79C-841344DBF191}"/>
+              </a:ext>
+            </a:extLst>
+          </p:cNvPr>
+          <p:cNvPicPr>
+            <a:picLocks noChangeAspect="1"/>
+          </p:cNvPicPr>
+          <p:nvPr/>
+        </p:nvPicPr>
+        <p:blipFill>
+          <a:blip r:embed="rId2"/>
+          <a:stretch>
+            <a:fillRect/>
+          </a:stretch>
+        </p:blipFill>
+        <p:spPr>
+          <a:xfrm>
+            <a:off x="838200" y="1353668"/>
+            <a:ext cx="4780280" cy="2612479"/>
+          </a:xfrm>
+          <a:prstGeom prst="rect">
+            <a:avLst/>
+          </a:prstGeom>
+        </p:spPr>
+      </p:pic>
+    </p:spTree>
+    <p:extLst>
+      <p:ext uri="{BB962C8B-B14F-4D97-AF65-F5344CB8AC3E}">
+        <p14:creationId xmlns:p14="http://schemas.microsoft.com/office/powerpoint/2010/main" val="2117136955"/>
+      </p:ext>
+    </p:extLst>
+  </p:cSld>
+  <p:clrMapOvr>
+    <a:masterClrMapping/>
+  </p:clrMapOvr>
+</p:sld>
+</file>
+
+<file path=ppt/slides/slide23.xml><?xml version="1.0" encoding="utf-8"?>
+<p:sld xmlns:a="http://schemas.openxmlformats.org/drawingml/2006/main" xmlns:r="http://schemas.openxmlformats.org/officeDocument/2006/relationships" xmlns:p="http://schemas.openxmlformats.org/presentationml/2006/main">
+  <p:cSld>
+    <p:spTree>
+      <p:nvGrpSpPr>
+        <p:cNvPr id="1" name=""/>
+        <p:cNvGrpSpPr/>
+        <p:nvPr/>
+      </p:nvGrpSpPr>
+      <p:grpSpPr>
+        <a:xfrm>
+          <a:off x="0" y="0"/>
+          <a:ext cx="0" cy="0"/>
+          <a:chOff x="0" y="0"/>
+          <a:chExt cx="0" cy="0"/>
+        </a:xfrm>
+      </p:grpSpPr>
+      <p:sp>
+        <p:nvSpPr>
+          <p:cNvPr id="2" name="Title 1">
+            <a:extLst>
+              <a:ext uri="{FF2B5EF4-FFF2-40B4-BE49-F238E27FC236}">
+                <a16:creationId xmlns:a16="http://schemas.microsoft.com/office/drawing/2014/main" id="{0E4CF397-91B0-594F-8E45-56EC74CC35E0}"/>
+              </a:ext>
+            </a:extLst>
+          </p:cNvPr>
+          <p:cNvSpPr>
+            <a:spLocks noGrp="1"/>
+          </p:cNvSpPr>
+          <p:nvPr>
+            <p:ph type="title"/>
+          </p:nvPr>
+        </p:nvSpPr>
+        <p:spPr/>
+        <p:txBody>
+          <a:bodyPr/>
+          <a:lstStyle/>
+          <a:p>
+            <a:r>
+              <a:rPr lang="en-US" dirty="0"/>
+              <a:t>Next, the load process driven by </a:t>
+            </a:r>
+            <a:r>
+              <a:rPr lang="en-US" dirty="0" err="1"/>
+              <a:t>lapply</a:t>
+            </a:r>
+            <a:r>
+              <a:rPr lang="en-US" dirty="0"/>
+              <a:t>()</a:t>
+            </a:r>
+          </a:p>
+        </p:txBody>
+      </p:sp>
+      <p:pic>
+        <p:nvPicPr>
+          <p:cNvPr id="5" name="Picture 4">
+            <a:extLst>
+              <a:ext uri="{FF2B5EF4-FFF2-40B4-BE49-F238E27FC236}">
+                <a16:creationId xmlns:a16="http://schemas.microsoft.com/office/drawing/2014/main" id="{5BEACBD1-FC76-5A43-8BEC-3AF42455F23D}"/>
+              </a:ext>
+            </a:extLst>
+          </p:cNvPr>
+          <p:cNvPicPr>
+            <a:picLocks noChangeAspect="1"/>
+          </p:cNvPicPr>
+          <p:nvPr/>
+        </p:nvPicPr>
+        <p:blipFill>
+          <a:blip r:embed="rId2"/>
+          <a:stretch>
+            <a:fillRect/>
+          </a:stretch>
+        </p:blipFill>
+        <p:spPr>
+          <a:xfrm>
+            <a:off x="838200" y="1319414"/>
+            <a:ext cx="8369778" cy="5401426"/>
+          </a:xfrm>
+          <a:prstGeom prst="rect">
+            <a:avLst/>
+          </a:prstGeom>
+        </p:spPr>
+      </p:pic>
+    </p:spTree>
+    <p:extLst>
+      <p:ext uri="{BB962C8B-B14F-4D97-AF65-F5344CB8AC3E}">
+        <p14:creationId xmlns:p14="http://schemas.microsoft.com/office/powerpoint/2010/main" val="1415465657"/>
+      </p:ext>
+    </p:extLst>
+  </p:cSld>
+  <p:clrMapOvr>
+    <a:masterClrMapping/>
+  </p:clrMapOvr>
+</p:sld>
+</file>
+
+<file path=ppt/slides/slide24.xml><?xml version="1.0" encoding="utf-8"?>
+<p:sld xmlns:a="http://schemas.openxmlformats.org/drawingml/2006/main" xmlns:r="http://schemas.openxmlformats.org/officeDocument/2006/relationships" xmlns:p="http://schemas.openxmlformats.org/presentationml/2006/main">
+  <p:cSld>
+    <p:spTree>
+      <p:nvGrpSpPr>
+        <p:cNvPr id="1" name=""/>
+        <p:cNvGrpSpPr/>
+        <p:nvPr/>
+      </p:nvGrpSpPr>
+      <p:grpSpPr>
+        <a:xfrm>
+          <a:off x="0" y="0"/>
+          <a:ext cx="0" cy="0"/>
+          <a:chOff x="0" y="0"/>
+          <a:chExt cx="0" cy="0"/>
+        </a:xfrm>
+      </p:grpSpPr>
+      <p:sp>
+        <p:nvSpPr>
+          <p:cNvPr id="3" name="TextBox 2">
+            <a:extLst>
+              <a:ext uri="{FF2B5EF4-FFF2-40B4-BE49-F238E27FC236}">
+                <a16:creationId xmlns:a16="http://schemas.microsoft.com/office/drawing/2014/main" id="{D639DFBB-76B2-E64D-91BA-C82ACDE98D30}"/>
+              </a:ext>
+            </a:extLst>
+          </p:cNvPr>
+          <p:cNvSpPr txBox="1"/>
+          <p:nvPr/>
+        </p:nvSpPr>
+        <p:spPr>
+          <a:xfrm>
+            <a:off x="4526165" y="2967200"/>
+            <a:ext cx="3401893" cy="1569660"/>
+          </a:xfrm>
+          <a:prstGeom prst="rect">
+            <a:avLst/>
+          </a:prstGeom>
+          <a:noFill/>
+        </p:spPr>
+        <p:txBody>
+          <a:bodyPr wrap="none" rtlCol="0">
+            <a:spAutoFit/>
+          </a:bodyPr>
+          <a:lstStyle/>
+          <a:p>
+            <a:r>
               <a:rPr lang="en-US" sz="9600" dirty="0"/>
               <a:t>Q &amp; A </a:t>
             </a:r>
@@ -5777,6 +6338,552 @@
     <p:extLst>
       <p:ext uri="{BB962C8B-B14F-4D97-AF65-F5344CB8AC3E}">
         <p14:creationId xmlns:p14="http://schemas.microsoft.com/office/powerpoint/2010/main" val="3085140371"/>
+      </p:ext>
+    </p:extLst>
+  </p:cSld>
+  <p:clrMapOvr>
+    <a:masterClrMapping/>
+  </p:clrMapOvr>
+</p:sld>
+</file>
+
+<file path=ppt/slides/slide25.xml><?xml version="1.0" encoding="utf-8"?>
+<p:sld xmlns:a="http://schemas.openxmlformats.org/drawingml/2006/main" xmlns:r="http://schemas.openxmlformats.org/officeDocument/2006/relationships" xmlns:p="http://schemas.openxmlformats.org/presentationml/2006/main">
+  <p:cSld>
+    <p:spTree>
+      <p:nvGrpSpPr>
+        <p:cNvPr id="1" name=""/>
+        <p:cNvGrpSpPr/>
+        <p:nvPr/>
+      </p:nvGrpSpPr>
+      <p:grpSpPr>
+        <a:xfrm>
+          <a:off x="0" y="0"/>
+          <a:ext cx="0" cy="0"/>
+          <a:chOff x="0" y="0"/>
+          <a:chExt cx="0" cy="0"/>
+        </a:xfrm>
+      </p:grpSpPr>
+      <p:sp>
+        <p:nvSpPr>
+          <p:cNvPr id="2" name="Title 1">
+            <a:extLst>
+              <a:ext uri="{FF2B5EF4-FFF2-40B4-BE49-F238E27FC236}">
+                <a16:creationId xmlns:a16="http://schemas.microsoft.com/office/drawing/2014/main" id="{6092EAB6-FFEF-B54D-886F-29B8FBD73691}"/>
+              </a:ext>
+            </a:extLst>
+          </p:cNvPr>
+          <p:cNvSpPr>
+            <a:spLocks noGrp="1"/>
+          </p:cNvSpPr>
+          <p:nvPr>
+            <p:ph type="title"/>
+          </p:nvPr>
+        </p:nvSpPr>
+        <p:spPr/>
+        <p:txBody>
+          <a:bodyPr/>
+          <a:lstStyle/>
+          <a:p>
+            <a:r>
+              <a:rPr lang="en-US" dirty="0"/>
+              <a:t>About Len</a:t>
+            </a:r>
+          </a:p>
+        </p:txBody>
+      </p:sp>
+      <p:pic>
+        <p:nvPicPr>
+          <p:cNvPr id="4" name="Picture 3">
+            <a:extLst>
+              <a:ext uri="{FF2B5EF4-FFF2-40B4-BE49-F238E27FC236}">
+                <a16:creationId xmlns:a16="http://schemas.microsoft.com/office/drawing/2014/main" id="{F5842CDC-9BCF-ED4A-B142-F82CFFC48374}"/>
+              </a:ext>
+            </a:extLst>
+          </p:cNvPr>
+          <p:cNvPicPr>
+            <a:picLocks noChangeAspect="1"/>
+          </p:cNvPicPr>
+          <p:nvPr/>
+        </p:nvPicPr>
+        <p:blipFill>
+          <a:blip r:embed="rId2"/>
+          <a:stretch>
+            <a:fillRect/>
+          </a:stretch>
+        </p:blipFill>
+        <p:spPr>
+          <a:xfrm>
+            <a:off x="838200" y="1487692"/>
+            <a:ext cx="1828800" cy="1848679"/>
+          </a:xfrm>
+          <a:prstGeom prst="rect">
+            <a:avLst/>
+          </a:prstGeom>
+        </p:spPr>
+      </p:pic>
+      <p:sp>
+        <p:nvSpPr>
+          <p:cNvPr id="5" name="TextBox 4">
+            <a:extLst>
+              <a:ext uri="{FF2B5EF4-FFF2-40B4-BE49-F238E27FC236}">
+                <a16:creationId xmlns:a16="http://schemas.microsoft.com/office/drawing/2014/main" id="{6414056E-90F6-7344-ACA0-21B67F079388}"/>
+              </a:ext>
+            </a:extLst>
+          </p:cNvPr>
+          <p:cNvSpPr txBox="1"/>
+          <p:nvPr/>
+        </p:nvSpPr>
+        <p:spPr>
+          <a:xfrm>
+            <a:off x="1456297" y="3810270"/>
+            <a:ext cx="2116605" cy="369332"/>
+          </a:xfrm>
+          <a:prstGeom prst="rect">
+            <a:avLst/>
+          </a:prstGeom>
+          <a:noFill/>
+        </p:spPr>
+        <p:txBody>
+          <a:bodyPr wrap="none" rtlCol="0">
+            <a:spAutoFit/>
+          </a:bodyPr>
+          <a:lstStyle/>
+          <a:p>
+            <a:r>
+              <a:rPr lang="en-US" dirty="0"/>
+              <a:t> </a:t>
+            </a:r>
+            <a:r>
+              <a:rPr lang="en-US" dirty="0">
+                <a:hlinkClick r:id="rId3"/>
+              </a:rPr>
+              <a:t>len@greskilabs.com</a:t>
+            </a:r>
+            <a:endParaRPr lang="en-US" dirty="0"/>
+          </a:p>
+        </p:txBody>
+      </p:sp>
+      <p:pic>
+        <p:nvPicPr>
+          <p:cNvPr id="6" name="Picture 5">
+            <a:extLst>
+              <a:ext uri="{FF2B5EF4-FFF2-40B4-BE49-F238E27FC236}">
+                <a16:creationId xmlns:a16="http://schemas.microsoft.com/office/drawing/2014/main" id="{C78A498D-59ED-254A-8EA3-0F3D3158DAB6}"/>
+              </a:ext>
+            </a:extLst>
+          </p:cNvPr>
+          <p:cNvPicPr>
+            <a:picLocks noChangeAspect="1"/>
+          </p:cNvPicPr>
+          <p:nvPr/>
+        </p:nvPicPr>
+        <p:blipFill>
+          <a:blip r:embed="rId4"/>
+          <a:stretch>
+            <a:fillRect/>
+          </a:stretch>
+        </p:blipFill>
+        <p:spPr>
+          <a:xfrm>
+            <a:off x="912737" y="4410881"/>
+            <a:ext cx="355600" cy="368300"/>
+          </a:xfrm>
+          <a:prstGeom prst="rect">
+            <a:avLst/>
+          </a:prstGeom>
+        </p:spPr>
+      </p:pic>
+      <p:pic>
+        <p:nvPicPr>
+          <p:cNvPr id="7" name="Picture 6">
+            <a:extLst>
+              <a:ext uri="{FF2B5EF4-FFF2-40B4-BE49-F238E27FC236}">
+                <a16:creationId xmlns:a16="http://schemas.microsoft.com/office/drawing/2014/main" id="{8564C8CC-7A1B-5848-BB26-0560A3F83B9A}"/>
+              </a:ext>
+            </a:extLst>
+          </p:cNvPr>
+          <p:cNvPicPr>
+            <a:picLocks noChangeAspect="1"/>
+          </p:cNvPicPr>
+          <p:nvPr/>
+        </p:nvPicPr>
+        <p:blipFill>
+          <a:blip r:embed="rId5"/>
+          <a:stretch>
+            <a:fillRect/>
+          </a:stretch>
+        </p:blipFill>
+        <p:spPr>
+          <a:xfrm>
+            <a:off x="882257" y="3810270"/>
+            <a:ext cx="419100" cy="419100"/>
+          </a:xfrm>
+          <a:prstGeom prst="rect">
+            <a:avLst/>
+          </a:prstGeom>
+        </p:spPr>
+      </p:pic>
+      <p:sp>
+        <p:nvSpPr>
+          <p:cNvPr id="8" name="TextBox 7">
+            <a:extLst>
+              <a:ext uri="{FF2B5EF4-FFF2-40B4-BE49-F238E27FC236}">
+                <a16:creationId xmlns:a16="http://schemas.microsoft.com/office/drawing/2014/main" id="{C121EDAC-2901-CC45-A0A7-8D75B4C1AB41}"/>
+              </a:ext>
+            </a:extLst>
+          </p:cNvPr>
+          <p:cNvSpPr txBox="1"/>
+          <p:nvPr/>
+        </p:nvSpPr>
+        <p:spPr>
+          <a:xfrm>
+            <a:off x="1456297" y="4296832"/>
+            <a:ext cx="838884" cy="369332"/>
+          </a:xfrm>
+          <a:prstGeom prst="rect">
+            <a:avLst/>
+          </a:prstGeom>
+          <a:noFill/>
+        </p:spPr>
+        <p:txBody>
+          <a:bodyPr wrap="none" rtlCol="0">
+            <a:spAutoFit/>
+          </a:bodyPr>
+          <a:lstStyle/>
+          <a:p>
+            <a:r>
+              <a:rPr lang="en-US" dirty="0"/>
+              <a:t> </a:t>
+            </a:r>
+            <a:r>
+              <a:rPr lang="en-US" dirty="0" err="1"/>
+              <a:t>lgreski</a:t>
+            </a:r>
+            <a:endParaRPr lang="en-US" dirty="0"/>
+          </a:p>
+        </p:txBody>
+      </p:sp>
+      <p:sp>
+        <p:nvSpPr>
+          <p:cNvPr id="9" name="TextBox 8">
+            <a:extLst>
+              <a:ext uri="{FF2B5EF4-FFF2-40B4-BE49-F238E27FC236}">
+                <a16:creationId xmlns:a16="http://schemas.microsoft.com/office/drawing/2014/main" id="{F66CC08F-50EB-9442-9382-9749498C8D6E}"/>
+              </a:ext>
+            </a:extLst>
+          </p:cNvPr>
+          <p:cNvSpPr txBox="1"/>
+          <p:nvPr/>
+        </p:nvSpPr>
+        <p:spPr>
+          <a:xfrm>
+            <a:off x="1456297" y="4609946"/>
+            <a:ext cx="8283101" cy="369332"/>
+          </a:xfrm>
+          <a:prstGeom prst="rect">
+            <a:avLst/>
+          </a:prstGeom>
+          <a:noFill/>
+        </p:spPr>
+        <p:txBody>
+          <a:bodyPr wrap="none" rtlCol="0">
+            <a:spAutoFit/>
+          </a:bodyPr>
+          <a:lstStyle/>
+          <a:p>
+            <a:r>
+              <a:rPr lang="en-US" dirty="0"/>
+              <a:t> </a:t>
+            </a:r>
+            <a:r>
+              <a:rPr lang="en-US" dirty="0" err="1"/>
+              <a:t>lgreski</a:t>
+            </a:r>
+            <a:r>
+              <a:rPr lang="en-US" dirty="0"/>
+              <a:t>/</a:t>
+            </a:r>
+            <a:r>
+              <a:rPr lang="en-US" dirty="0" err="1"/>
+              <a:t>readingFilesInR</a:t>
+            </a:r>
+            <a:r>
+              <a:rPr lang="en-US" dirty="0"/>
+              <a:t> – repository where tonight’s code and presentation are stored </a:t>
+            </a:r>
+          </a:p>
+        </p:txBody>
+      </p:sp>
+      <p:pic>
+        <p:nvPicPr>
+          <p:cNvPr id="10" name="Picture 9">
+            <a:extLst>
+              <a:ext uri="{FF2B5EF4-FFF2-40B4-BE49-F238E27FC236}">
+                <a16:creationId xmlns:a16="http://schemas.microsoft.com/office/drawing/2014/main" id="{939D18BB-69F5-B443-91B0-AB1B112D102A}"/>
+              </a:ext>
+            </a:extLst>
+          </p:cNvPr>
+          <p:cNvPicPr>
+            <a:picLocks noChangeAspect="1"/>
+          </p:cNvPicPr>
+          <p:nvPr/>
+        </p:nvPicPr>
+        <p:blipFill>
+          <a:blip r:embed="rId6"/>
+          <a:stretch>
+            <a:fillRect/>
+          </a:stretch>
+        </p:blipFill>
+        <p:spPr>
+          <a:xfrm>
+            <a:off x="894957" y="5026221"/>
+            <a:ext cx="406400" cy="406400"/>
+          </a:xfrm>
+          <a:prstGeom prst="rect">
+            <a:avLst/>
+          </a:prstGeom>
+        </p:spPr>
+      </p:pic>
+      <p:sp>
+        <p:nvSpPr>
+          <p:cNvPr id="11" name="TextBox 10">
+            <a:extLst>
+              <a:ext uri="{FF2B5EF4-FFF2-40B4-BE49-F238E27FC236}">
+                <a16:creationId xmlns:a16="http://schemas.microsoft.com/office/drawing/2014/main" id="{821E509B-E0B5-984D-8495-D099B3C62B4E}"/>
+              </a:ext>
+            </a:extLst>
+          </p:cNvPr>
+          <p:cNvSpPr txBox="1"/>
+          <p:nvPr/>
+        </p:nvSpPr>
+        <p:spPr>
+          <a:xfrm>
+            <a:off x="1456297" y="5044755"/>
+            <a:ext cx="838884" cy="369332"/>
+          </a:xfrm>
+          <a:prstGeom prst="rect">
+            <a:avLst/>
+          </a:prstGeom>
+          <a:noFill/>
+        </p:spPr>
+        <p:txBody>
+          <a:bodyPr wrap="none" rtlCol="0">
+            <a:spAutoFit/>
+          </a:bodyPr>
+          <a:lstStyle/>
+          <a:p>
+            <a:r>
+              <a:rPr lang="en-US" dirty="0"/>
+              <a:t> </a:t>
+            </a:r>
+            <a:r>
+              <a:rPr lang="en-US" dirty="0" err="1"/>
+              <a:t>lgreski</a:t>
+            </a:r>
+            <a:endParaRPr lang="en-US" dirty="0"/>
+          </a:p>
+        </p:txBody>
+      </p:sp>
+      <p:pic>
+        <p:nvPicPr>
+          <p:cNvPr id="12" name="Picture 11">
+            <a:extLst>
+              <a:ext uri="{FF2B5EF4-FFF2-40B4-BE49-F238E27FC236}">
+                <a16:creationId xmlns:a16="http://schemas.microsoft.com/office/drawing/2014/main" id="{E258D6E7-31DF-B841-B3A5-67880E34E6C6}"/>
+              </a:ext>
+            </a:extLst>
+          </p:cNvPr>
+          <p:cNvPicPr>
+            <a:picLocks noChangeAspect="1"/>
+          </p:cNvPicPr>
+          <p:nvPr/>
+        </p:nvPicPr>
+        <p:blipFill>
+          <a:blip r:embed="rId7"/>
+          <a:stretch>
+            <a:fillRect/>
+          </a:stretch>
+        </p:blipFill>
+        <p:spPr>
+          <a:xfrm>
+            <a:off x="822013" y="5531999"/>
+            <a:ext cx="537047" cy="537047"/>
+          </a:xfrm>
+          <a:prstGeom prst="rect">
+            <a:avLst/>
+          </a:prstGeom>
+        </p:spPr>
+      </p:pic>
+      <p:sp>
+        <p:nvSpPr>
+          <p:cNvPr id="13" name="TextBox 12">
+            <a:extLst>
+              <a:ext uri="{FF2B5EF4-FFF2-40B4-BE49-F238E27FC236}">
+                <a16:creationId xmlns:a16="http://schemas.microsoft.com/office/drawing/2014/main" id="{C7BC55D7-BE16-0543-9D90-8400CC766953}"/>
+              </a:ext>
+            </a:extLst>
+          </p:cNvPr>
+          <p:cNvSpPr txBox="1"/>
+          <p:nvPr/>
+        </p:nvSpPr>
+        <p:spPr>
+          <a:xfrm>
+            <a:off x="1456297" y="5615856"/>
+            <a:ext cx="6703182" cy="369332"/>
+          </a:xfrm>
+          <a:prstGeom prst="rect">
+            <a:avLst/>
+          </a:prstGeom>
+          <a:noFill/>
+        </p:spPr>
+        <p:txBody>
+          <a:bodyPr wrap="none" rtlCol="0">
+            <a:spAutoFit/>
+          </a:bodyPr>
+          <a:lstStyle/>
+          <a:p>
+            <a:r>
+              <a:rPr lang="en-US" dirty="0"/>
+              <a:t> Data Science Depot blog: </a:t>
+            </a:r>
+            <a:r>
+              <a:rPr lang="en-US" dirty="0">
+                <a:hlinkClick r:id="rId8"/>
+              </a:rPr>
+              <a:t>https://lgreski.github.io/datasciencedepot/</a:t>
+            </a:r>
+            <a:r>
+              <a:rPr lang="en-US" dirty="0"/>
+              <a:t> </a:t>
+            </a:r>
+          </a:p>
+        </p:txBody>
+      </p:sp>
+      <p:sp>
+        <p:nvSpPr>
+          <p:cNvPr id="14" name="TextBox 13">
+            <a:extLst>
+              <a:ext uri="{FF2B5EF4-FFF2-40B4-BE49-F238E27FC236}">
+                <a16:creationId xmlns:a16="http://schemas.microsoft.com/office/drawing/2014/main" id="{A9F10A48-1AA5-F144-818F-BACDFEE8248C}"/>
+              </a:ext>
+            </a:extLst>
+          </p:cNvPr>
+          <p:cNvSpPr txBox="1"/>
+          <p:nvPr/>
+        </p:nvSpPr>
+        <p:spPr>
+          <a:xfrm>
+            <a:off x="2865120" y="1384844"/>
+            <a:ext cx="8883009" cy="2308324"/>
+          </a:xfrm>
+          <a:prstGeom prst="rect">
+            <a:avLst/>
+          </a:prstGeom>
+          <a:noFill/>
+        </p:spPr>
+        <p:txBody>
+          <a:bodyPr wrap="none" rtlCol="0">
+            <a:spAutoFit/>
+          </a:bodyPr>
+          <a:lstStyle/>
+          <a:p>
+            <a:r>
+              <a:rPr lang="en-US" dirty="0"/>
+              <a:t>Len Greski currently serves as Principal Consultant at LeadingAgile, the leader in helping large</a:t>
+            </a:r>
+            <a:br>
+              <a:rPr lang="en-US" dirty="0"/>
+            </a:br>
+            <a:r>
+              <a:rPr lang="en-US" dirty="0"/>
+              <a:t>companies generate economic value through agile transformation. Len started his </a:t>
+            </a:r>
+            <a:br>
+              <a:rPr lang="en-US" dirty="0"/>
+            </a:br>
+            <a:r>
+              <a:rPr lang="en-US" dirty="0"/>
+              <a:t>career at Information Resources Inc., developing statistical and AI models to predict</a:t>
+            </a:r>
+            <a:br>
+              <a:rPr lang="en-US" dirty="0"/>
+            </a:br>
+            <a:r>
+              <a:rPr lang="en-US" dirty="0"/>
+              <a:t>consumer behavior. He learned R in 2015 when he needed a way to analyze the value of a </a:t>
+            </a:r>
+            <a:br>
+              <a:rPr lang="en-US" dirty="0"/>
+            </a:br>
+            <a:r>
+              <a:rPr lang="en-US" dirty="0"/>
+              <a:t>software portfolio without spending $9,000 on a copy of SAS.  Len has mentored hundreds </a:t>
+            </a:r>
+          </a:p>
+          <a:p>
+            <a:r>
+              <a:rPr lang="en-US" dirty="0"/>
+              <a:t>of thousands of students in the Johns Hopkins University Data Science Specialization on </a:t>
+            </a:r>
+          </a:p>
+          <a:p>
+            <a:r>
+              <a:rPr lang="en-US" dirty="0"/>
+              <a:t>Coursera, having served as a Community Mentor since 2015.  Len has a top 5% </a:t>
+            </a:r>
+            <a:br>
+              <a:rPr lang="en-US" dirty="0"/>
+            </a:br>
+            <a:r>
+              <a:rPr lang="en-US" dirty="0"/>
+              <a:t>ranking on </a:t>
+            </a:r>
+            <a:r>
+              <a:rPr lang="en-US" dirty="0" err="1"/>
+              <a:t>Stackoverflow.com</a:t>
+            </a:r>
+            <a:r>
+              <a:rPr lang="en-US" dirty="0"/>
+              <a:t>, where he primarily answers questions about R. </a:t>
+            </a:r>
+          </a:p>
+        </p:txBody>
+      </p:sp>
+      <p:pic>
+        <p:nvPicPr>
+          <p:cNvPr id="15" name="Picture 14">
+            <a:extLst>
+              <a:ext uri="{FF2B5EF4-FFF2-40B4-BE49-F238E27FC236}">
+                <a16:creationId xmlns:a16="http://schemas.microsoft.com/office/drawing/2014/main" id="{7BC9C847-7C77-4C44-8CB7-A571842D5092}"/>
+              </a:ext>
+            </a:extLst>
+          </p:cNvPr>
+          <p:cNvPicPr>
+            <a:picLocks noChangeAspect="1"/>
+          </p:cNvPicPr>
+          <p:nvPr/>
+        </p:nvPicPr>
+        <p:blipFill>
+          <a:blip r:embed="rId9"/>
+          <a:stretch>
+            <a:fillRect/>
+          </a:stretch>
+        </p:blipFill>
+        <p:spPr>
+          <a:xfrm>
+            <a:off x="803811" y="6115199"/>
+            <a:ext cx="2013926" cy="537047"/>
+          </a:xfrm>
+          <a:prstGeom prst="rect">
+            <a:avLst/>
+          </a:prstGeom>
+        </p:spPr>
+      </p:pic>
+    </p:spTree>
+    <p:extLst>
+      <p:ext uri="{BB962C8B-B14F-4D97-AF65-F5344CB8AC3E}">
+        <p14:creationId xmlns:p14="http://schemas.microsoft.com/office/powerpoint/2010/main" val="3418446521"/>
       </p:ext>
     </p:extLst>
   </p:cSld>
@@ -6733,8 +7840,8 @@
         </p:blipFill>
         <p:spPr>
           <a:xfrm>
-            <a:off x="838200" y="1812833"/>
-            <a:ext cx="8158104" cy="3360057"/>
+            <a:off x="838200" y="1584596"/>
+            <a:ext cx="9547452" cy="3932284"/>
           </a:xfrm>
           <a:prstGeom prst="rect">
             <a:avLst/>

</xml_diff>

<commit_message>
add what is .for file? slide
</commit_message>
<xml_diff>
--- a/presentation/readingFixedFilesInR.pptx
+++ b/presentation/readingFixedFilesInR.pptx
@@ -5,7 +5,7 @@
     <p:sldMasterId id="2147483648" r:id="rId1"/>
   </p:sldMasterIdLst>
   <p:notesMasterIdLst>
-    <p:notesMasterId r:id="rId27"/>
+    <p:notesMasterId r:id="rId28"/>
   </p:notesMasterIdLst>
   <p:sldIdLst>
     <p:sldId id="256" r:id="rId2"/>
@@ -13,26 +13,27 @@
     <p:sldId id="258" r:id="rId4"/>
     <p:sldId id="266" r:id="rId5"/>
     <p:sldId id="261" r:id="rId6"/>
-    <p:sldId id="260" r:id="rId7"/>
-    <p:sldId id="263" r:id="rId8"/>
-    <p:sldId id="262" r:id="rId9"/>
-    <p:sldId id="264" r:id="rId10"/>
-    <p:sldId id="265" r:id="rId11"/>
-    <p:sldId id="268" r:id="rId12"/>
-    <p:sldId id="267" r:id="rId13"/>
-    <p:sldId id="269" r:id="rId14"/>
-    <p:sldId id="270" r:id="rId15"/>
-    <p:sldId id="271" r:id="rId16"/>
-    <p:sldId id="279" r:id="rId17"/>
-    <p:sldId id="272" r:id="rId18"/>
-    <p:sldId id="273" r:id="rId19"/>
-    <p:sldId id="274" r:id="rId20"/>
-    <p:sldId id="275" r:id="rId21"/>
-    <p:sldId id="280" r:id="rId22"/>
-    <p:sldId id="281" r:id="rId23"/>
-    <p:sldId id="282" r:id="rId24"/>
-    <p:sldId id="276" r:id="rId25"/>
-    <p:sldId id="278" r:id="rId26"/>
+    <p:sldId id="283" r:id="rId7"/>
+    <p:sldId id="260" r:id="rId8"/>
+    <p:sldId id="263" r:id="rId9"/>
+    <p:sldId id="262" r:id="rId10"/>
+    <p:sldId id="264" r:id="rId11"/>
+    <p:sldId id="265" r:id="rId12"/>
+    <p:sldId id="268" r:id="rId13"/>
+    <p:sldId id="267" r:id="rId14"/>
+    <p:sldId id="269" r:id="rId15"/>
+    <p:sldId id="270" r:id="rId16"/>
+    <p:sldId id="271" r:id="rId17"/>
+    <p:sldId id="279" r:id="rId18"/>
+    <p:sldId id="272" r:id="rId19"/>
+    <p:sldId id="273" r:id="rId20"/>
+    <p:sldId id="274" r:id="rId21"/>
+    <p:sldId id="275" r:id="rId22"/>
+    <p:sldId id="280" r:id="rId23"/>
+    <p:sldId id="281" r:id="rId24"/>
+    <p:sldId id="282" r:id="rId25"/>
+    <p:sldId id="276" r:id="rId26"/>
+    <p:sldId id="278" r:id="rId27"/>
   </p:sldIdLst>
   <p:sldSz cx="12192000" cy="6858000"/>
   <p:notesSz cx="6858000" cy="9144000"/>
@@ -749,7 +750,7 @@
           <a:p>
             <a:fld id="{ABA03B9F-5CD9-F644-B9E1-D29863D066F7}" type="slidenum">
               <a:rPr lang="en-US" smtClean="0"/>
-              <a:t>6</a:t>
+              <a:t>7</a:t>
             </a:fld>
             <a:endParaRPr lang="en-US"/>
           </a:p>
@@ -836,7 +837,7 @@
           <a:p>
             <a:fld id="{ABA03B9F-5CD9-F644-B9E1-D29863D066F7}" type="slidenum">
               <a:rPr lang="en-US" smtClean="0"/>
-              <a:t>10</a:t>
+              <a:t>11</a:t>
             </a:fld>
             <a:endParaRPr lang="en-US"/>
           </a:p>
@@ -932,7 +933,7 @@
           <a:p>
             <a:fld id="{ABA03B9F-5CD9-F644-B9E1-D29863D066F7}" type="slidenum">
               <a:rPr lang="en-US" smtClean="0"/>
-              <a:t>14</a:t>
+              <a:t>15</a:t>
             </a:fld>
             <a:endParaRPr lang="en-US"/>
           </a:p>
@@ -4398,7 +4399,7 @@
           <p:cNvPr id="2" name="Title 1">
             <a:extLst>
               <a:ext uri="{FF2B5EF4-FFF2-40B4-BE49-F238E27FC236}">
-                <a16:creationId xmlns:a16="http://schemas.microsoft.com/office/drawing/2014/main" id="{3103780A-3816-9B4B-930D-DB07CE854AF0}"/>
+                <a16:creationId xmlns:a16="http://schemas.microsoft.com/office/drawing/2014/main" id="{FA91C373-D12A-DF42-BFA7-D33BE3A2442A}"/>
               </a:ext>
             </a:extLst>
           </p:cNvPr>
@@ -4409,31 +4410,54 @@
             <p:ph type="title"/>
           </p:nvPr>
         </p:nvSpPr>
-        <p:spPr>
-          <a:xfrm>
-            <a:off x="838200" y="365126"/>
-            <a:ext cx="10515600" cy="1032600"/>
-          </a:xfrm>
-        </p:spPr>
-        <p:txBody>
-          <a:bodyPr>
-            <a:normAutofit/>
-          </a:bodyPr>
-          <a:lstStyle/>
-          <a:p>
-            <a:r>
-              <a:rPr lang="en-US" sz="3200" dirty="0"/>
-              <a:t>A hierarchical file: 2000 American Community Survey data</a:t>
+        <p:spPr/>
+        <p:txBody>
+          <a:bodyPr/>
+          <a:lstStyle/>
+          <a:p>
+            <a:r>
+              <a:rPr lang="en-US" dirty="0"/>
+              <a:t>Checking our results…</a:t>
             </a:r>
           </a:p>
         </p:txBody>
       </p:sp>
       <p:pic>
         <p:nvPicPr>
-          <p:cNvPr id="3" name="Picture 2">
-            <a:extLst>
-              <a:ext uri="{FF2B5EF4-FFF2-40B4-BE49-F238E27FC236}">
-                <a16:creationId xmlns:a16="http://schemas.microsoft.com/office/drawing/2014/main" id="{88799DF9-C12F-4642-B08C-DDAE451107AC}"/>
+          <p:cNvPr id="4" name="Picture 3">
+            <a:extLst>
+              <a:ext uri="{FF2B5EF4-FFF2-40B4-BE49-F238E27FC236}">
+                <a16:creationId xmlns:a16="http://schemas.microsoft.com/office/drawing/2014/main" id="{CA1CCE43-C5F6-5742-BF52-2E396EDA0582}"/>
+              </a:ext>
+            </a:extLst>
+          </p:cNvPr>
+          <p:cNvPicPr>
+            <a:picLocks noChangeAspect="1"/>
+          </p:cNvPicPr>
+          <p:nvPr/>
+        </p:nvPicPr>
+        <p:blipFill>
+          <a:blip r:embed="rId2"/>
+          <a:stretch>
+            <a:fillRect/>
+          </a:stretch>
+        </p:blipFill>
+        <p:spPr>
+          <a:xfrm>
+            <a:off x="838200" y="1381578"/>
+            <a:ext cx="6502400" cy="5270500"/>
+          </a:xfrm>
+          <a:prstGeom prst="rect">
+            <a:avLst/>
+          </a:prstGeom>
+        </p:spPr>
+      </p:pic>
+      <p:pic>
+        <p:nvPicPr>
+          <p:cNvPr id="5" name="Picture 4">
+            <a:extLst>
+              <a:ext uri="{FF2B5EF4-FFF2-40B4-BE49-F238E27FC236}">
+                <a16:creationId xmlns:a16="http://schemas.microsoft.com/office/drawing/2014/main" id="{2306BF28-0DB4-CB46-BD4C-E4C77891E1F4}"/>
               </a:ext>
             </a:extLst>
           </p:cNvPr>
@@ -4450,147 +4474,18 @@
         </p:blipFill>
         <p:spPr>
           <a:xfrm>
-            <a:off x="838200" y="1397726"/>
-            <a:ext cx="6752511" cy="4467497"/>
+            <a:off x="7340600" y="1381578"/>
+            <a:ext cx="4672587" cy="3177359"/>
           </a:xfrm>
           <a:prstGeom prst="rect">
             <a:avLst/>
           </a:prstGeom>
         </p:spPr>
       </p:pic>
-      <p:sp>
-        <p:nvSpPr>
-          <p:cNvPr id="4" name="TextBox 3">
-            <a:extLst>
-              <a:ext uri="{FF2B5EF4-FFF2-40B4-BE49-F238E27FC236}">
-                <a16:creationId xmlns:a16="http://schemas.microsoft.com/office/drawing/2014/main" id="{C8750EF0-BDFC-6844-85A7-38FE4573136A}"/>
-              </a:ext>
-            </a:extLst>
-          </p:cNvPr>
-          <p:cNvSpPr txBox="1"/>
-          <p:nvPr/>
-        </p:nvSpPr>
-        <p:spPr>
-          <a:xfrm>
-            <a:off x="7929155" y="2782669"/>
-            <a:ext cx="3752502" cy="2031325"/>
-          </a:xfrm>
-          <a:prstGeom prst="rect">
-            <a:avLst/>
-          </a:prstGeom>
-          <a:noFill/>
-        </p:spPr>
-        <p:txBody>
-          <a:bodyPr wrap="none" rtlCol="0">
-            <a:spAutoFit/>
-          </a:bodyPr>
-          <a:lstStyle/>
-          <a:p>
-            <a:pPr marL="285750" indent="-285750">
-              <a:buFont typeface="Arial" panose="020B0604020202020204" pitchFamily="34" charset="0"/>
-              <a:buChar char="•"/>
-            </a:pPr>
-            <a:r>
-              <a:rPr lang="en-US" dirty="0"/>
-              <a:t>Two types of records, Household</a:t>
-            </a:r>
-            <a:br>
-              <a:rPr lang="en-US" dirty="0"/>
-            </a:br>
-            <a:r>
-              <a:rPr lang="en-US" dirty="0"/>
-              <a:t>and Person </a:t>
-            </a:r>
-          </a:p>
-          <a:p>
-            <a:pPr marL="285750" indent="-285750">
-              <a:buFont typeface="Arial" panose="020B0604020202020204" pitchFamily="34" charset="0"/>
-              <a:buChar char="•"/>
-            </a:pPr>
-            <a:r>
-              <a:rPr lang="en-US" dirty="0"/>
-              <a:t>Data elements vary by record type</a:t>
-            </a:r>
-          </a:p>
-          <a:p>
-            <a:pPr marL="285750" indent="-285750">
-              <a:buFont typeface="Arial" panose="020B0604020202020204" pitchFamily="34" charset="0"/>
-              <a:buChar char="•"/>
-            </a:pPr>
-            <a:r>
-              <a:rPr lang="en-US" dirty="0"/>
-              <a:t>Varying numbers of person records</a:t>
-            </a:r>
-            <a:br>
-              <a:rPr lang="en-US" dirty="0"/>
-            </a:br>
-            <a:r>
-              <a:rPr lang="en-US" dirty="0"/>
-              <a:t>per household </a:t>
-            </a:r>
-          </a:p>
-          <a:p>
-            <a:pPr marL="285750" indent="-285750">
-              <a:buFont typeface="Arial" panose="020B0604020202020204" pitchFamily="34" charset="0"/>
-              <a:buChar char="•"/>
-            </a:pPr>
-            <a:r>
-              <a:rPr lang="en-US" dirty="0"/>
-              <a:t>Data on each type of record is in</a:t>
-            </a:r>
-            <a:br>
-              <a:rPr lang="en-US" dirty="0"/>
-            </a:br>
-            <a:r>
-              <a:rPr lang="en-US" dirty="0"/>
-              <a:t>fixed format</a:t>
-            </a:r>
-          </a:p>
-        </p:txBody>
-      </p:sp>
-      <p:sp>
-        <p:nvSpPr>
-          <p:cNvPr id="5" name="TextBox 4">
-            <a:extLst>
-              <a:ext uri="{FF2B5EF4-FFF2-40B4-BE49-F238E27FC236}">
-                <a16:creationId xmlns:a16="http://schemas.microsoft.com/office/drawing/2014/main" id="{3DC7E886-D15F-9147-9EC8-7E0A7D62C320}"/>
-              </a:ext>
-            </a:extLst>
-          </p:cNvPr>
-          <p:cNvSpPr txBox="1"/>
-          <p:nvPr/>
-        </p:nvSpPr>
-        <p:spPr>
-          <a:xfrm>
-            <a:off x="838200" y="6124176"/>
-            <a:ext cx="7422738" cy="400110"/>
-          </a:xfrm>
-          <a:prstGeom prst="rect">
-            <a:avLst/>
-          </a:prstGeom>
-          <a:noFill/>
-        </p:spPr>
-        <p:txBody>
-          <a:bodyPr wrap="none" rtlCol="0">
-            <a:spAutoFit/>
-          </a:bodyPr>
-          <a:lstStyle/>
-          <a:p>
-            <a:r>
-              <a:rPr lang="en-US" sz="2000" i="1" dirty="0">
-                <a:solidFill>
-                  <a:srgbClr val="FF0000"/>
-                </a:solidFill>
-              </a:rPr>
-              <a:t>How does one go about reading and analyzing the person-level data? </a:t>
-            </a:r>
-          </a:p>
-        </p:txBody>
-      </p:sp>
     </p:spTree>
     <p:extLst>
       <p:ext uri="{BB962C8B-B14F-4D97-AF65-F5344CB8AC3E}">
-        <p14:creationId xmlns:p14="http://schemas.microsoft.com/office/powerpoint/2010/main" val="4265880072"/>
+        <p14:creationId xmlns:p14="http://schemas.microsoft.com/office/powerpoint/2010/main" val="2643501384"/>
       </p:ext>
     </p:extLst>
   </p:cSld>
@@ -4622,7 +4517,7 @@
           <p:cNvPr id="2" name="Title 1">
             <a:extLst>
               <a:ext uri="{FF2B5EF4-FFF2-40B4-BE49-F238E27FC236}">
-                <a16:creationId xmlns:a16="http://schemas.microsoft.com/office/drawing/2014/main" id="{EA84F187-250D-0E43-B649-42F6B388DC17}"/>
+                <a16:creationId xmlns:a16="http://schemas.microsoft.com/office/drawing/2014/main" id="{3103780A-3816-9B4B-930D-DB07CE854AF0}"/>
               </a:ext>
             </a:extLst>
           </p:cNvPr>
@@ -4633,14 +4528,21 @@
             <p:ph type="title"/>
           </p:nvPr>
         </p:nvSpPr>
-        <p:spPr/>
-        <p:txBody>
-          <a:bodyPr/>
-          <a:lstStyle/>
-          <a:p>
-            <a:r>
-              <a:rPr lang="en-US" dirty="0"/>
-              <a:t>Background</a:t>
+        <p:spPr>
+          <a:xfrm>
+            <a:off x="838200" y="365126"/>
+            <a:ext cx="10515600" cy="1032600"/>
+          </a:xfrm>
+        </p:spPr>
+        <p:txBody>
+          <a:bodyPr>
+            <a:normAutofit/>
+          </a:bodyPr>
+          <a:lstStyle/>
+          <a:p>
+            <a:r>
+              <a:rPr lang="en-US" sz="3200" dirty="0"/>
+              <a:t>A hierarchical file: 2000 American Community Survey data</a:t>
             </a:r>
           </a:p>
         </p:txBody>
@@ -4650,7 +4552,7 @@
           <p:cNvPr id="3" name="Picture 2">
             <a:extLst>
               <a:ext uri="{FF2B5EF4-FFF2-40B4-BE49-F238E27FC236}">
-                <a16:creationId xmlns:a16="http://schemas.microsoft.com/office/drawing/2014/main" id="{65956377-0A7F-AA44-B0A3-E1ACEB8180FD}"/>
+                <a16:creationId xmlns:a16="http://schemas.microsoft.com/office/drawing/2014/main" id="{88799DF9-C12F-4642-B08C-DDAE451107AC}"/>
               </a:ext>
             </a:extLst>
           </p:cNvPr>
@@ -4660,15 +4562,15 @@
           <p:nvPr/>
         </p:nvPicPr>
         <p:blipFill>
-          <a:blip r:embed="rId2"/>
+          <a:blip r:embed="rId3"/>
           <a:stretch>
             <a:fillRect/>
           </a:stretch>
         </p:blipFill>
         <p:spPr>
           <a:xfrm>
-            <a:off x="838200" y="1424487"/>
-            <a:ext cx="7333125" cy="4924697"/>
+            <a:off x="838200" y="1397726"/>
+            <a:ext cx="6752511" cy="4467497"/>
           </a:xfrm>
           <a:prstGeom prst="rect">
             <a:avLst/>
@@ -4680,7 +4582,7 @@
           <p:cNvPr id="4" name="TextBox 3">
             <a:extLst>
               <a:ext uri="{FF2B5EF4-FFF2-40B4-BE49-F238E27FC236}">
-                <a16:creationId xmlns:a16="http://schemas.microsoft.com/office/drawing/2014/main" id="{C98AA510-1032-6C48-AD00-EA6E6859135A}"/>
+                <a16:creationId xmlns:a16="http://schemas.microsoft.com/office/drawing/2014/main" id="{C8750EF0-BDFC-6844-85A7-38FE4573136A}"/>
               </a:ext>
             </a:extLst>
           </p:cNvPr>
@@ -4689,8 +4591,8 @@
         </p:nvSpPr>
         <p:spPr>
           <a:xfrm>
-            <a:off x="979713" y="6492875"/>
-            <a:ext cx="4053097" cy="276999"/>
+            <a:off x="7929155" y="2782669"/>
+            <a:ext cx="3752502" cy="2031325"/>
           </a:xfrm>
           <a:prstGeom prst="rect">
             <a:avLst/>
@@ -4703,24 +4605,111 @@
           </a:bodyPr>
           <a:lstStyle/>
           <a:p>
-            <a:r>
-              <a:rPr lang="en-US" sz="1200" dirty="0"/>
-              <a:t>Reference:  </a:t>
-            </a:r>
-            <a:r>
-              <a:rPr lang="en-US" sz="1200" dirty="0">
-                <a:hlinkClick r:id="rId3"/>
+            <a:pPr marL="285750" indent="-285750">
+              <a:buFont typeface="Arial" panose="020B0604020202020204" pitchFamily="34" charset="0"/>
+              <a:buChar char="•"/>
+            </a:pPr>
+            <a:r>
+              <a:rPr lang="en-US" dirty="0"/>
+              <a:t>Two types of records, Household</a:t>
+            </a:r>
+            <a:br>
+              <a:rPr lang="en-US" dirty="0"/>
+            </a:br>
+            <a:r>
+              <a:rPr lang="en-US" dirty="0"/>
+              <a:t>and Person </a:t>
+            </a:r>
+          </a:p>
+          <a:p>
+            <a:pPr marL="285750" indent="-285750">
+              <a:buFont typeface="Arial" panose="020B0604020202020204" pitchFamily="34" charset="0"/>
+              <a:buChar char="•"/>
+            </a:pPr>
+            <a:r>
+              <a:rPr lang="en-US" dirty="0"/>
+              <a:t>Data elements vary by record type</a:t>
+            </a:r>
+          </a:p>
+          <a:p>
+            <a:pPr marL="285750" indent="-285750">
+              <a:buFont typeface="Arial" panose="020B0604020202020204" pitchFamily="34" charset="0"/>
+              <a:buChar char="•"/>
+            </a:pPr>
+            <a:r>
+              <a:rPr lang="en-US" dirty="0"/>
+              <a:t>Varying numbers of person records</a:t>
+            </a:r>
+            <a:br>
+              <a:rPr lang="en-US" dirty="0"/>
+            </a:br>
+            <a:r>
+              <a:rPr lang="en-US" dirty="0"/>
+              <a:t>per household </a:t>
+            </a:r>
+          </a:p>
+          <a:p>
+            <a:pPr marL="285750" indent="-285750">
+              <a:buFont typeface="Arial" panose="020B0604020202020204" pitchFamily="34" charset="0"/>
+              <a:buChar char="•"/>
+            </a:pPr>
+            <a:r>
+              <a:rPr lang="en-US" dirty="0"/>
+              <a:t>Data on each type of record is in</a:t>
+            </a:r>
+            <a:br>
+              <a:rPr lang="en-US" dirty="0"/>
+            </a:br>
+            <a:r>
+              <a:rPr lang="en-US" dirty="0"/>
+              <a:t>fixed format</a:t>
+            </a:r>
+          </a:p>
+        </p:txBody>
+      </p:sp>
+      <p:sp>
+        <p:nvSpPr>
+          <p:cNvPr id="5" name="TextBox 4">
+            <a:extLst>
+              <a:ext uri="{FF2B5EF4-FFF2-40B4-BE49-F238E27FC236}">
+                <a16:creationId xmlns:a16="http://schemas.microsoft.com/office/drawing/2014/main" id="{3DC7E886-D15F-9147-9EC8-7E0A7D62C320}"/>
+              </a:ext>
+            </a:extLst>
+          </p:cNvPr>
+          <p:cNvSpPr txBox="1"/>
+          <p:nvPr/>
+        </p:nvSpPr>
+        <p:spPr>
+          <a:xfrm>
+            <a:off x="838200" y="6124176"/>
+            <a:ext cx="7422738" cy="400110"/>
+          </a:xfrm>
+          <a:prstGeom prst="rect">
+            <a:avLst/>
+          </a:prstGeom>
+          <a:noFill/>
+        </p:spPr>
+        <p:txBody>
+          <a:bodyPr wrap="none" rtlCol="0">
+            <a:spAutoFit/>
+          </a:bodyPr>
+          <a:lstStyle/>
+          <a:p>
+            <a:r>
+              <a:rPr lang="en-US" sz="2000" i="1" dirty="0">
+                <a:solidFill>
+                  <a:srgbClr val="FF0000"/>
+                </a:solidFill>
               </a:rPr>
-              <a:t>Public Use Microdata Sample, U. S. Census Bureau </a:t>
-            </a:r>
-            <a:endParaRPr lang="en-US" sz="1200" dirty="0"/>
+              <a:t>How does one go about reading and analyzing the person-level data? </a:t>
+            </a:r>
           </a:p>
         </p:txBody>
       </p:sp>
     </p:spTree>
     <p:extLst>
       <p:ext uri="{BB962C8B-B14F-4D97-AF65-F5344CB8AC3E}">
-        <p14:creationId xmlns:p14="http://schemas.microsoft.com/office/powerpoint/2010/main" val="3787371780"/>
+        <p14:creationId xmlns:p14="http://schemas.microsoft.com/office/powerpoint/2010/main" val="4265880072"/>
       </p:ext>
     </p:extLst>
   </p:cSld>
@@ -4752,7 +4741,7 @@
           <p:cNvPr id="2" name="Title 1">
             <a:extLst>
               <a:ext uri="{FF2B5EF4-FFF2-40B4-BE49-F238E27FC236}">
-                <a16:creationId xmlns:a16="http://schemas.microsoft.com/office/drawing/2014/main" id="{CA2C3D95-765F-4B4E-9DC6-4F120D175A21}"/>
+                <a16:creationId xmlns:a16="http://schemas.microsoft.com/office/drawing/2014/main" id="{EA84F187-250D-0E43-B649-42F6B388DC17}"/>
               </a:ext>
             </a:extLst>
           </p:cNvPr>
@@ -4770,67 +4759,87 @@
           <a:p>
             <a:r>
               <a:rPr lang="en-US" dirty="0"/>
-              <a:t>Considerations</a:t>
-            </a:r>
-          </a:p>
-        </p:txBody>
-      </p:sp>
-      <p:sp>
-        <p:nvSpPr>
-          <p:cNvPr id="3" name="Content Placeholder 2">
-            <a:extLst>
-              <a:ext uri="{FF2B5EF4-FFF2-40B4-BE49-F238E27FC236}">
-                <a16:creationId xmlns:a16="http://schemas.microsoft.com/office/drawing/2014/main" id="{829FF1A4-565B-CF4B-B4E7-57C379F45CC5}"/>
-              </a:ext>
-            </a:extLst>
-          </p:cNvPr>
-          <p:cNvSpPr>
-            <a:spLocks noGrp="1"/>
-          </p:cNvSpPr>
-          <p:nvPr>
-            <p:ph idx="1"/>
-          </p:nvPr>
-        </p:nvSpPr>
-        <p:spPr/>
-        <p:txBody>
-          <a:bodyPr/>
-          <a:lstStyle/>
-          <a:p>
-            <a:r>
-              <a:rPr lang="en-US" dirty="0"/>
-              <a:t>Lots of variables</a:t>
-            </a:r>
-          </a:p>
-          <a:p>
-            <a:r>
-              <a:rPr lang="en-US" dirty="0"/>
-              <a:t>Large file size (Georgia file is 167Mb)</a:t>
-            </a:r>
-          </a:p>
-          <a:p>
-            <a:r>
-              <a:rPr lang="en-US" dirty="0"/>
-              <a:t>Using the data dictionary to configure the data read function</a:t>
-            </a:r>
-          </a:p>
-          <a:p>
-            <a:r>
-              <a:rPr lang="en-US" dirty="0"/>
-              <a:t>Separating 5% sample information from 1% sample information</a:t>
-            </a:r>
-          </a:p>
-          <a:p>
-            <a:r>
-              <a:rPr lang="en-US" dirty="0"/>
-              <a:t>Eliminating value labels from the codebook </a:t>
-            </a:r>
+              <a:t>Background</a:t>
+            </a:r>
+          </a:p>
+        </p:txBody>
+      </p:sp>
+      <p:pic>
+        <p:nvPicPr>
+          <p:cNvPr id="3" name="Picture 2">
+            <a:extLst>
+              <a:ext uri="{FF2B5EF4-FFF2-40B4-BE49-F238E27FC236}">
+                <a16:creationId xmlns:a16="http://schemas.microsoft.com/office/drawing/2014/main" id="{65956377-0A7F-AA44-B0A3-E1ACEB8180FD}"/>
+              </a:ext>
+            </a:extLst>
+          </p:cNvPr>
+          <p:cNvPicPr>
+            <a:picLocks noChangeAspect="1"/>
+          </p:cNvPicPr>
+          <p:nvPr/>
+        </p:nvPicPr>
+        <p:blipFill>
+          <a:blip r:embed="rId2"/>
+          <a:stretch>
+            <a:fillRect/>
+          </a:stretch>
+        </p:blipFill>
+        <p:spPr>
+          <a:xfrm>
+            <a:off x="838200" y="1424487"/>
+            <a:ext cx="7333125" cy="4924697"/>
+          </a:xfrm>
+          <a:prstGeom prst="rect">
+            <a:avLst/>
+          </a:prstGeom>
+        </p:spPr>
+      </p:pic>
+      <p:sp>
+        <p:nvSpPr>
+          <p:cNvPr id="4" name="TextBox 3">
+            <a:extLst>
+              <a:ext uri="{FF2B5EF4-FFF2-40B4-BE49-F238E27FC236}">
+                <a16:creationId xmlns:a16="http://schemas.microsoft.com/office/drawing/2014/main" id="{C98AA510-1032-6C48-AD00-EA6E6859135A}"/>
+              </a:ext>
+            </a:extLst>
+          </p:cNvPr>
+          <p:cNvSpPr txBox="1"/>
+          <p:nvPr/>
+        </p:nvSpPr>
+        <p:spPr>
+          <a:xfrm>
+            <a:off x="979713" y="6492875"/>
+            <a:ext cx="4053097" cy="276999"/>
+          </a:xfrm>
+          <a:prstGeom prst="rect">
+            <a:avLst/>
+          </a:prstGeom>
+          <a:noFill/>
+        </p:spPr>
+        <p:txBody>
+          <a:bodyPr wrap="none" rtlCol="0">
+            <a:spAutoFit/>
+          </a:bodyPr>
+          <a:lstStyle/>
+          <a:p>
+            <a:r>
+              <a:rPr lang="en-US" sz="1200" dirty="0"/>
+              <a:t>Reference:  </a:t>
+            </a:r>
+            <a:r>
+              <a:rPr lang="en-US" sz="1200" dirty="0">
+                <a:hlinkClick r:id="rId3"/>
+              </a:rPr>
+              <a:t>Public Use Microdata Sample, U. S. Census Bureau </a:t>
+            </a:r>
+            <a:endParaRPr lang="en-US" sz="1200" dirty="0"/>
           </a:p>
         </p:txBody>
       </p:sp>
     </p:spTree>
     <p:extLst>
       <p:ext uri="{BB962C8B-B14F-4D97-AF65-F5344CB8AC3E}">
-        <p14:creationId xmlns:p14="http://schemas.microsoft.com/office/powerpoint/2010/main" val="688200898"/>
+        <p14:creationId xmlns:p14="http://schemas.microsoft.com/office/powerpoint/2010/main" val="3787371780"/>
       </p:ext>
     </p:extLst>
   </p:cSld>
@@ -4859,10 +4868,10 @@
       </p:grpSpPr>
       <p:sp>
         <p:nvSpPr>
-          <p:cNvPr id="4" name="Title 3">
-            <a:extLst>
-              <a:ext uri="{FF2B5EF4-FFF2-40B4-BE49-F238E27FC236}">
-                <a16:creationId xmlns:a16="http://schemas.microsoft.com/office/drawing/2014/main" id="{A9925383-F8CF-934C-A9BF-84BF19950896}"/>
+          <p:cNvPr id="2" name="Title 1">
+            <a:extLst>
+              <a:ext uri="{FF2B5EF4-FFF2-40B4-BE49-F238E27FC236}">
+                <a16:creationId xmlns:a16="http://schemas.microsoft.com/office/drawing/2014/main" id="{CA2C3D95-765F-4B4E-9DC6-4F120D175A21}"/>
               </a:ext>
             </a:extLst>
           </p:cNvPr>
@@ -4880,45 +4889,67 @@
           <a:p>
             <a:r>
               <a:rPr lang="en-US" dirty="0"/>
-              <a:t>PUMS Codebook</a:t>
-            </a:r>
-          </a:p>
-        </p:txBody>
-      </p:sp>
-      <p:pic>
-        <p:nvPicPr>
-          <p:cNvPr id="5" name="Picture 4">
-            <a:extLst>
-              <a:ext uri="{FF2B5EF4-FFF2-40B4-BE49-F238E27FC236}">
-                <a16:creationId xmlns:a16="http://schemas.microsoft.com/office/drawing/2014/main" id="{584A8673-E491-E04D-BFDB-8E4330EA5350}"/>
-              </a:ext>
-            </a:extLst>
-          </p:cNvPr>
-          <p:cNvPicPr>
-            <a:picLocks noChangeAspect="1"/>
-          </p:cNvPicPr>
-          <p:nvPr/>
-        </p:nvPicPr>
-        <p:blipFill>
-          <a:blip r:embed="rId2"/>
-          <a:stretch>
-            <a:fillRect/>
-          </a:stretch>
-        </p:blipFill>
-        <p:spPr>
-          <a:xfrm>
-            <a:off x="838200" y="1248101"/>
-            <a:ext cx="8778240" cy="5495796"/>
-          </a:xfrm>
-          <a:prstGeom prst="rect">
-            <a:avLst/>
-          </a:prstGeom>
-        </p:spPr>
-      </p:pic>
+              <a:t>Considerations</a:t>
+            </a:r>
+          </a:p>
+        </p:txBody>
+      </p:sp>
+      <p:sp>
+        <p:nvSpPr>
+          <p:cNvPr id="3" name="Content Placeholder 2">
+            <a:extLst>
+              <a:ext uri="{FF2B5EF4-FFF2-40B4-BE49-F238E27FC236}">
+                <a16:creationId xmlns:a16="http://schemas.microsoft.com/office/drawing/2014/main" id="{829FF1A4-565B-CF4B-B4E7-57C379F45CC5}"/>
+              </a:ext>
+            </a:extLst>
+          </p:cNvPr>
+          <p:cNvSpPr>
+            <a:spLocks noGrp="1"/>
+          </p:cNvSpPr>
+          <p:nvPr>
+            <p:ph idx="1"/>
+          </p:nvPr>
+        </p:nvSpPr>
+        <p:spPr/>
+        <p:txBody>
+          <a:bodyPr/>
+          <a:lstStyle/>
+          <a:p>
+            <a:r>
+              <a:rPr lang="en-US" dirty="0"/>
+              <a:t>Lots of variables</a:t>
+            </a:r>
+          </a:p>
+          <a:p>
+            <a:r>
+              <a:rPr lang="en-US" dirty="0"/>
+              <a:t>Large file size (Georgia file is 167Mb)</a:t>
+            </a:r>
+          </a:p>
+          <a:p>
+            <a:r>
+              <a:rPr lang="en-US" dirty="0"/>
+              <a:t>Using the data dictionary to configure the data read function</a:t>
+            </a:r>
+          </a:p>
+          <a:p>
+            <a:r>
+              <a:rPr lang="en-US" dirty="0"/>
+              <a:t>Separating 5% sample information from 1% sample information</a:t>
+            </a:r>
+          </a:p>
+          <a:p>
+            <a:r>
+              <a:rPr lang="en-US" dirty="0"/>
+              <a:t>Eliminating value labels from the codebook </a:t>
+            </a:r>
+          </a:p>
+        </p:txBody>
+      </p:sp>
     </p:spTree>
     <p:extLst>
       <p:ext uri="{BB962C8B-B14F-4D97-AF65-F5344CB8AC3E}">
-        <p14:creationId xmlns:p14="http://schemas.microsoft.com/office/powerpoint/2010/main" val="2070444847"/>
+        <p14:creationId xmlns:p14="http://schemas.microsoft.com/office/powerpoint/2010/main" val="688200898"/>
       </p:ext>
     </p:extLst>
   </p:cSld>
@@ -4947,10 +4978,10 @@
       </p:grpSpPr>
       <p:sp>
         <p:nvSpPr>
-          <p:cNvPr id="2" name="Title 1">
-            <a:extLst>
-              <a:ext uri="{FF2B5EF4-FFF2-40B4-BE49-F238E27FC236}">
-                <a16:creationId xmlns:a16="http://schemas.microsoft.com/office/drawing/2014/main" id="{F409999C-0680-1945-9F26-743E62B94767}"/>
+          <p:cNvPr id="4" name="Title 3">
+            <a:extLst>
+              <a:ext uri="{FF2B5EF4-FFF2-40B4-BE49-F238E27FC236}">
+                <a16:creationId xmlns:a16="http://schemas.microsoft.com/office/drawing/2014/main" id="{A9925383-F8CF-934C-A9BF-84BF19950896}"/>
               </a:ext>
             </a:extLst>
           </p:cNvPr>
@@ -4968,59 +4999,17 @@
           <a:p>
             <a:r>
               <a:rPr lang="en-US" dirty="0"/>
-              <a:t>Obtaining the data</a:t>
-            </a:r>
-          </a:p>
-        </p:txBody>
-      </p:sp>
-      <p:sp>
-        <p:nvSpPr>
-          <p:cNvPr id="4" name="TextBox 3">
-            <a:extLst>
-              <a:ext uri="{FF2B5EF4-FFF2-40B4-BE49-F238E27FC236}">
-                <a16:creationId xmlns:a16="http://schemas.microsoft.com/office/drawing/2014/main" id="{00150276-F902-0245-AE3C-B2B3331EDA6F}"/>
-              </a:ext>
-            </a:extLst>
-          </p:cNvPr>
-          <p:cNvSpPr txBox="1"/>
-          <p:nvPr/>
-        </p:nvSpPr>
-        <p:spPr>
-          <a:xfrm>
-            <a:off x="729465" y="6303952"/>
-            <a:ext cx="8002896" cy="461665"/>
-          </a:xfrm>
-          <a:prstGeom prst="rect">
-            <a:avLst/>
-          </a:prstGeom>
-          <a:noFill/>
-        </p:spPr>
-        <p:txBody>
-          <a:bodyPr wrap="none" rtlCol="0">
-            <a:spAutoFit/>
-          </a:bodyPr>
-          <a:lstStyle/>
-          <a:p>
-            <a:r>
-              <a:rPr lang="en-US" sz="1200" i="1" dirty="0"/>
-              <a:t>Note: there is a revised PUMS file stored in the same location as the original, but the revised file is not in zip format so it takes </a:t>
-            </a:r>
-            <a:br>
-              <a:rPr lang="en-US" sz="1200" i="1" dirty="0"/>
-            </a:br>
-            <a:r>
-              <a:rPr lang="en-US" sz="1200" i="1" dirty="0"/>
-              <a:t>about 10 minutes to download.  </a:t>
+              <a:t>PUMS Codebook</a:t>
             </a:r>
           </a:p>
         </p:txBody>
       </p:sp>
       <p:pic>
         <p:nvPicPr>
-          <p:cNvPr id="6" name="Picture 5">
-            <a:extLst>
-              <a:ext uri="{FF2B5EF4-FFF2-40B4-BE49-F238E27FC236}">
-                <a16:creationId xmlns:a16="http://schemas.microsoft.com/office/drawing/2014/main" id="{2717F071-91D0-8742-8E0F-A2D30786FE14}"/>
+          <p:cNvPr id="5" name="Picture 4">
+            <a:extLst>
+              <a:ext uri="{FF2B5EF4-FFF2-40B4-BE49-F238E27FC236}">
+                <a16:creationId xmlns:a16="http://schemas.microsoft.com/office/drawing/2014/main" id="{584A8673-E491-E04D-BFDB-8E4330EA5350}"/>
               </a:ext>
             </a:extLst>
           </p:cNvPr>
@@ -5030,15 +5019,15 @@
           <p:nvPr/>
         </p:nvPicPr>
         <p:blipFill>
-          <a:blip r:embed="rId3"/>
+          <a:blip r:embed="rId2"/>
           <a:stretch>
             <a:fillRect/>
           </a:stretch>
         </p:blipFill>
         <p:spPr>
           <a:xfrm>
-            <a:off x="838199" y="1216508"/>
-            <a:ext cx="10200977" cy="5087444"/>
+            <a:off x="838200" y="1248101"/>
+            <a:ext cx="8778240" cy="5495796"/>
           </a:xfrm>
           <a:prstGeom prst="rect">
             <a:avLst/>
@@ -5048,7 +5037,7 @@
     </p:spTree>
     <p:extLst>
       <p:ext uri="{BB962C8B-B14F-4D97-AF65-F5344CB8AC3E}">
-        <p14:creationId xmlns:p14="http://schemas.microsoft.com/office/powerpoint/2010/main" val="4065992348"/>
+        <p14:creationId xmlns:p14="http://schemas.microsoft.com/office/powerpoint/2010/main" val="2070444847"/>
       </p:ext>
     </p:extLst>
   </p:cSld>
@@ -5080,7 +5069,7 @@
           <p:cNvPr id="2" name="Title 1">
             <a:extLst>
               <a:ext uri="{FF2B5EF4-FFF2-40B4-BE49-F238E27FC236}">
-                <a16:creationId xmlns:a16="http://schemas.microsoft.com/office/drawing/2014/main" id="{75EE2DC4-BDFE-B048-8E57-44FA0E997636}"/>
+                <a16:creationId xmlns:a16="http://schemas.microsoft.com/office/drawing/2014/main" id="{F409999C-0680-1945-9F26-743E62B94767}"/>
               </a:ext>
             </a:extLst>
           </p:cNvPr>
@@ -5098,7 +5087,49 @@
           <a:p>
             <a:r>
               <a:rPr lang="en-US" dirty="0"/>
-              <a:t>Read &amp; split the records by record type</a:t>
+              <a:t>Obtaining the data</a:t>
+            </a:r>
+          </a:p>
+        </p:txBody>
+      </p:sp>
+      <p:sp>
+        <p:nvSpPr>
+          <p:cNvPr id="4" name="TextBox 3">
+            <a:extLst>
+              <a:ext uri="{FF2B5EF4-FFF2-40B4-BE49-F238E27FC236}">
+                <a16:creationId xmlns:a16="http://schemas.microsoft.com/office/drawing/2014/main" id="{00150276-F902-0245-AE3C-B2B3331EDA6F}"/>
+              </a:ext>
+            </a:extLst>
+          </p:cNvPr>
+          <p:cNvSpPr txBox="1"/>
+          <p:nvPr/>
+        </p:nvSpPr>
+        <p:spPr>
+          <a:xfrm>
+            <a:off x="729465" y="6303952"/>
+            <a:ext cx="8002896" cy="461665"/>
+          </a:xfrm>
+          <a:prstGeom prst="rect">
+            <a:avLst/>
+          </a:prstGeom>
+          <a:noFill/>
+        </p:spPr>
+        <p:txBody>
+          <a:bodyPr wrap="none" rtlCol="0">
+            <a:spAutoFit/>
+          </a:bodyPr>
+          <a:lstStyle/>
+          <a:p>
+            <a:r>
+              <a:rPr lang="en-US" sz="1200" i="1" dirty="0"/>
+              <a:t>Note: there is a revised PUMS file stored in the same location as the original, but the revised file is not in zip format so it takes </a:t>
+            </a:r>
+            <a:br>
+              <a:rPr lang="en-US" sz="1200" i="1" dirty="0"/>
+            </a:br>
+            <a:r>
+              <a:rPr lang="en-US" sz="1200" i="1" dirty="0"/>
+              <a:t>about 10 minutes to download.  </a:t>
             </a:r>
           </a:p>
         </p:txBody>
@@ -5108,37 +5139,7 @@
           <p:cNvPr id="6" name="Picture 5">
             <a:extLst>
               <a:ext uri="{FF2B5EF4-FFF2-40B4-BE49-F238E27FC236}">
-                <a16:creationId xmlns:a16="http://schemas.microsoft.com/office/drawing/2014/main" id="{28710683-1CAF-F945-B1BA-24AB12F86F73}"/>
-              </a:ext>
-            </a:extLst>
-          </p:cNvPr>
-          <p:cNvPicPr>
-            <a:picLocks noChangeAspect="1"/>
-          </p:cNvPicPr>
-          <p:nvPr/>
-        </p:nvPicPr>
-        <p:blipFill>
-          <a:blip r:embed="rId2"/>
-          <a:stretch>
-            <a:fillRect/>
-          </a:stretch>
-        </p:blipFill>
-        <p:spPr>
-          <a:xfrm>
-            <a:off x="894169" y="3429000"/>
-            <a:ext cx="6261100" cy="2692400"/>
-          </a:xfrm>
-          <a:prstGeom prst="rect">
-            <a:avLst/>
-          </a:prstGeom>
-        </p:spPr>
-      </p:pic>
-      <p:pic>
-        <p:nvPicPr>
-          <p:cNvPr id="3" name="Picture 2">
-            <a:extLst>
-              <a:ext uri="{FF2B5EF4-FFF2-40B4-BE49-F238E27FC236}">
-                <a16:creationId xmlns:a16="http://schemas.microsoft.com/office/drawing/2014/main" id="{B61E285A-80E9-AA4A-BE54-2712FD8BDB8E}"/>
+                <a16:creationId xmlns:a16="http://schemas.microsoft.com/office/drawing/2014/main" id="{2717F071-91D0-8742-8E0F-A2D30786FE14}"/>
               </a:ext>
             </a:extLst>
           </p:cNvPr>
@@ -5155,8 +5156,8 @@
         </p:blipFill>
         <p:spPr>
           <a:xfrm>
-            <a:off x="894169" y="1353668"/>
-            <a:ext cx="9425760" cy="1648612"/>
+            <a:off x="838199" y="1216508"/>
+            <a:ext cx="10200977" cy="5087444"/>
           </a:xfrm>
           <a:prstGeom prst="rect">
             <a:avLst/>
@@ -5166,7 +5167,7 @@
     </p:spTree>
     <p:extLst>
       <p:ext uri="{BB962C8B-B14F-4D97-AF65-F5344CB8AC3E}">
-        <p14:creationId xmlns:p14="http://schemas.microsoft.com/office/powerpoint/2010/main" val="652449204"/>
+        <p14:creationId xmlns:p14="http://schemas.microsoft.com/office/powerpoint/2010/main" val="4065992348"/>
       </p:ext>
     </p:extLst>
   </p:cSld>
@@ -5198,7 +5199,7 @@
           <p:cNvPr id="2" name="Title 1">
             <a:extLst>
               <a:ext uri="{FF2B5EF4-FFF2-40B4-BE49-F238E27FC236}">
-                <a16:creationId xmlns:a16="http://schemas.microsoft.com/office/drawing/2014/main" id="{D78837B3-1C7C-E144-8C26-B46F878299AD}"/>
+                <a16:creationId xmlns:a16="http://schemas.microsoft.com/office/drawing/2014/main" id="{75EE2DC4-BDFE-B048-8E57-44FA0E997636}"/>
               </a:ext>
             </a:extLst>
           </p:cNvPr>
@@ -5216,17 +5217,17 @@
           <a:p>
             <a:r>
               <a:rPr lang="en-US" dirty="0"/>
-              <a:t>Alternate approach: don’t try this at home</a:t>
+              <a:t>Read &amp; split the records by record type</a:t>
             </a:r>
           </a:p>
         </p:txBody>
       </p:sp>
       <p:pic>
         <p:nvPicPr>
-          <p:cNvPr id="4" name="Picture 3">
-            <a:extLst>
-              <a:ext uri="{FF2B5EF4-FFF2-40B4-BE49-F238E27FC236}">
-                <a16:creationId xmlns:a16="http://schemas.microsoft.com/office/drawing/2014/main" id="{F6C69231-5B38-5846-96B3-E1F7728AC58B}"/>
+          <p:cNvPr id="6" name="Picture 5">
+            <a:extLst>
+              <a:ext uri="{FF2B5EF4-FFF2-40B4-BE49-F238E27FC236}">
+                <a16:creationId xmlns:a16="http://schemas.microsoft.com/office/drawing/2014/main" id="{28710683-1CAF-F945-B1BA-24AB12F86F73}"/>
               </a:ext>
             </a:extLst>
           </p:cNvPr>
@@ -5243,8 +5244,38 @@
         </p:blipFill>
         <p:spPr>
           <a:xfrm>
-            <a:off x="838200" y="1569720"/>
-            <a:ext cx="9488488" cy="3276600"/>
+            <a:off x="894169" y="3429000"/>
+            <a:ext cx="6261100" cy="2692400"/>
+          </a:xfrm>
+          <a:prstGeom prst="rect">
+            <a:avLst/>
+          </a:prstGeom>
+        </p:spPr>
+      </p:pic>
+      <p:pic>
+        <p:nvPicPr>
+          <p:cNvPr id="3" name="Picture 2">
+            <a:extLst>
+              <a:ext uri="{FF2B5EF4-FFF2-40B4-BE49-F238E27FC236}">
+                <a16:creationId xmlns:a16="http://schemas.microsoft.com/office/drawing/2014/main" id="{B61E285A-80E9-AA4A-BE54-2712FD8BDB8E}"/>
+              </a:ext>
+            </a:extLst>
+          </p:cNvPr>
+          <p:cNvPicPr>
+            <a:picLocks noChangeAspect="1"/>
+          </p:cNvPicPr>
+          <p:nvPr/>
+        </p:nvPicPr>
+        <p:blipFill>
+          <a:blip r:embed="rId3"/>
+          <a:stretch>
+            <a:fillRect/>
+          </a:stretch>
+        </p:blipFill>
+        <p:spPr>
+          <a:xfrm>
+            <a:off x="894169" y="1353668"/>
+            <a:ext cx="9425760" cy="1648612"/>
           </a:xfrm>
           <a:prstGeom prst="rect">
             <a:avLst/>
@@ -5254,7 +5285,7 @@
     </p:spTree>
     <p:extLst>
       <p:ext uri="{BB962C8B-B14F-4D97-AF65-F5344CB8AC3E}">
-        <p14:creationId xmlns:p14="http://schemas.microsoft.com/office/powerpoint/2010/main" val="2744624890"/>
+        <p14:creationId xmlns:p14="http://schemas.microsoft.com/office/powerpoint/2010/main" val="652449204"/>
       </p:ext>
     </p:extLst>
   </p:cSld>
@@ -5286,7 +5317,7 @@
           <p:cNvPr id="2" name="Title 1">
             <a:extLst>
               <a:ext uri="{FF2B5EF4-FFF2-40B4-BE49-F238E27FC236}">
-                <a16:creationId xmlns:a16="http://schemas.microsoft.com/office/drawing/2014/main" id="{0A1497BC-7306-BF4E-B417-3C6949BBCD1D}"/>
+                <a16:creationId xmlns:a16="http://schemas.microsoft.com/office/drawing/2014/main" id="{D78837B3-1C7C-E144-8C26-B46F878299AD}"/>
               </a:ext>
             </a:extLst>
           </p:cNvPr>
@@ -5304,17 +5335,17 @@
           <a:p>
             <a:r>
               <a:rPr lang="en-US" dirty="0"/>
-              <a:t>Read &amp; clean the codebook</a:t>
+              <a:t>Alternate approach: don’t try this at home</a:t>
             </a:r>
           </a:p>
         </p:txBody>
       </p:sp>
       <p:pic>
         <p:nvPicPr>
-          <p:cNvPr id="3" name="Picture 2">
-            <a:extLst>
-              <a:ext uri="{FF2B5EF4-FFF2-40B4-BE49-F238E27FC236}">
-                <a16:creationId xmlns:a16="http://schemas.microsoft.com/office/drawing/2014/main" id="{A97D9093-FC2C-8148-85AD-178ED33F485F}"/>
+          <p:cNvPr id="4" name="Picture 3">
+            <a:extLst>
+              <a:ext uri="{FF2B5EF4-FFF2-40B4-BE49-F238E27FC236}">
+                <a16:creationId xmlns:a16="http://schemas.microsoft.com/office/drawing/2014/main" id="{F6C69231-5B38-5846-96B3-E1F7728AC58B}"/>
               </a:ext>
             </a:extLst>
           </p:cNvPr>
@@ -5331,8 +5362,8 @@
         </p:blipFill>
         <p:spPr>
           <a:xfrm>
-            <a:off x="838200" y="1353668"/>
-            <a:ext cx="7993925" cy="5142038"/>
+            <a:off x="838200" y="1569720"/>
+            <a:ext cx="9488488" cy="3276600"/>
           </a:xfrm>
           <a:prstGeom prst="rect">
             <a:avLst/>
@@ -5342,7 +5373,7 @@
     </p:spTree>
     <p:extLst>
       <p:ext uri="{BB962C8B-B14F-4D97-AF65-F5344CB8AC3E}">
-        <p14:creationId xmlns:p14="http://schemas.microsoft.com/office/powerpoint/2010/main" val="2820406415"/>
+        <p14:creationId xmlns:p14="http://schemas.microsoft.com/office/powerpoint/2010/main" val="2744624890"/>
       </p:ext>
     </p:extLst>
   </p:cSld>
@@ -5374,7 +5405,7 @@
           <p:cNvPr id="2" name="Title 1">
             <a:extLst>
               <a:ext uri="{FF2B5EF4-FFF2-40B4-BE49-F238E27FC236}">
-                <a16:creationId xmlns:a16="http://schemas.microsoft.com/office/drawing/2014/main" id="{27A200C3-B68A-C44B-A84F-20D44834AEB0}"/>
+                <a16:creationId xmlns:a16="http://schemas.microsoft.com/office/drawing/2014/main" id="{0A1497BC-7306-BF4E-B417-3C6949BBCD1D}"/>
               </a:ext>
             </a:extLst>
           </p:cNvPr>
@@ -5392,15 +5423,7 @@
           <a:p>
             <a:r>
               <a:rPr lang="en-US" dirty="0"/>
-              <a:t>Use codebook to configure </a:t>
-            </a:r>
-            <a:r>
-              <a:rPr lang="en-US" dirty="0" err="1"/>
-              <a:t>read_fwf</a:t>
-            </a:r>
-            <a:r>
-              <a:rPr lang="en-US" dirty="0"/>
-              <a:t>()</a:t>
+              <a:t>Read &amp; clean the codebook</a:t>
             </a:r>
           </a:p>
         </p:txBody>
@@ -5410,7 +5433,7 @@
           <p:cNvPr id="3" name="Picture 2">
             <a:extLst>
               <a:ext uri="{FF2B5EF4-FFF2-40B4-BE49-F238E27FC236}">
-                <a16:creationId xmlns:a16="http://schemas.microsoft.com/office/drawing/2014/main" id="{1108F545-9ECF-8E4D-BB56-275A636D6DE7}"/>
+                <a16:creationId xmlns:a16="http://schemas.microsoft.com/office/drawing/2014/main" id="{A97D9093-FC2C-8148-85AD-178ED33F485F}"/>
               </a:ext>
             </a:extLst>
           </p:cNvPr>
@@ -5427,38 +5450,8 @@
         </p:blipFill>
         <p:spPr>
           <a:xfrm>
-            <a:off x="1043033" y="1353668"/>
-            <a:ext cx="6529406" cy="2410612"/>
-          </a:xfrm>
-          <a:prstGeom prst="rect">
-            <a:avLst/>
-          </a:prstGeom>
-        </p:spPr>
-      </p:pic>
-      <p:pic>
-        <p:nvPicPr>
-          <p:cNvPr id="4" name="Picture 3">
-            <a:extLst>
-              <a:ext uri="{FF2B5EF4-FFF2-40B4-BE49-F238E27FC236}">
-                <a16:creationId xmlns:a16="http://schemas.microsoft.com/office/drawing/2014/main" id="{CE888A91-E21F-DF4E-A36B-09A1AAA3D5CC}"/>
-              </a:ext>
-            </a:extLst>
-          </p:cNvPr>
-          <p:cNvPicPr>
-            <a:picLocks noChangeAspect="1"/>
-          </p:cNvPicPr>
-          <p:nvPr/>
-        </p:nvPicPr>
-        <p:blipFill>
-          <a:blip r:embed="rId3"/>
-          <a:stretch>
-            <a:fillRect/>
-          </a:stretch>
-        </p:blipFill>
-        <p:spPr>
-          <a:xfrm>
-            <a:off x="1043033" y="3794760"/>
-            <a:ext cx="6394087" cy="2643709"/>
+            <a:off x="838200" y="1353668"/>
+            <a:ext cx="7993925" cy="5142038"/>
           </a:xfrm>
           <a:prstGeom prst="rect">
             <a:avLst/>
@@ -5468,7 +5461,7 @@
     </p:spTree>
     <p:extLst>
       <p:ext uri="{BB962C8B-B14F-4D97-AF65-F5344CB8AC3E}">
-        <p14:creationId xmlns:p14="http://schemas.microsoft.com/office/powerpoint/2010/main" val="911978099"/>
+        <p14:creationId xmlns:p14="http://schemas.microsoft.com/office/powerpoint/2010/main" val="2820406415"/>
       </p:ext>
     </p:extLst>
   </p:cSld>
@@ -5500,7 +5493,7 @@
           <p:cNvPr id="2" name="Title 1">
             <a:extLst>
               <a:ext uri="{FF2B5EF4-FFF2-40B4-BE49-F238E27FC236}">
-                <a16:creationId xmlns:a16="http://schemas.microsoft.com/office/drawing/2014/main" id="{A491959E-F635-624A-A884-AB9CE2DC221D}"/>
+                <a16:creationId xmlns:a16="http://schemas.microsoft.com/office/drawing/2014/main" id="{27A200C3-B68A-C44B-A84F-20D44834AEB0}"/>
               </a:ext>
             </a:extLst>
           </p:cNvPr>
@@ -5518,17 +5511,25 @@
           <a:p>
             <a:r>
               <a:rPr lang="en-US" dirty="0"/>
-              <a:t>Read the file</a:t>
+              <a:t>Use codebook to configure </a:t>
+            </a:r>
+            <a:r>
+              <a:rPr lang="en-US" dirty="0" err="1"/>
+              <a:t>read_fwf</a:t>
+            </a:r>
+            <a:r>
+              <a:rPr lang="en-US" dirty="0"/>
+              <a:t>()</a:t>
             </a:r>
           </a:p>
         </p:txBody>
       </p:sp>
       <p:pic>
         <p:nvPicPr>
-          <p:cNvPr id="5" name="Picture 4">
-            <a:extLst>
-              <a:ext uri="{FF2B5EF4-FFF2-40B4-BE49-F238E27FC236}">
-                <a16:creationId xmlns:a16="http://schemas.microsoft.com/office/drawing/2014/main" id="{AB1DB2B9-8648-F54F-8250-8E73ECEDA99E}"/>
+          <p:cNvPr id="3" name="Picture 2">
+            <a:extLst>
+              <a:ext uri="{FF2B5EF4-FFF2-40B4-BE49-F238E27FC236}">
+                <a16:creationId xmlns:a16="http://schemas.microsoft.com/office/drawing/2014/main" id="{1108F545-9ECF-8E4D-BB56-275A636D6DE7}"/>
               </a:ext>
             </a:extLst>
           </p:cNvPr>
@@ -5545,8 +5546,8 @@
         </p:blipFill>
         <p:spPr>
           <a:xfrm>
-            <a:off x="948648" y="1607192"/>
-            <a:ext cx="6841598" cy="981896"/>
+            <a:off x="1043033" y="1353668"/>
+            <a:ext cx="6529406" cy="2410612"/>
           </a:xfrm>
           <a:prstGeom prst="rect">
             <a:avLst/>
@@ -5555,10 +5556,10 @@
       </p:pic>
       <p:pic>
         <p:nvPicPr>
-          <p:cNvPr id="6" name="Picture 5">
-            <a:extLst>
-              <a:ext uri="{FF2B5EF4-FFF2-40B4-BE49-F238E27FC236}">
-                <a16:creationId xmlns:a16="http://schemas.microsoft.com/office/drawing/2014/main" id="{552DDBCC-5B54-8A4A-80EF-DA328FCE87B9}"/>
+          <p:cNvPr id="4" name="Picture 3">
+            <a:extLst>
+              <a:ext uri="{FF2B5EF4-FFF2-40B4-BE49-F238E27FC236}">
+                <a16:creationId xmlns:a16="http://schemas.microsoft.com/office/drawing/2014/main" id="{CE888A91-E21F-DF4E-A36B-09A1AAA3D5CC}"/>
               </a:ext>
             </a:extLst>
           </p:cNvPr>
@@ -5575,8 +5576,8 @@
         </p:blipFill>
         <p:spPr>
           <a:xfrm>
-            <a:off x="838200" y="3379325"/>
-            <a:ext cx="9753754" cy="1767868"/>
+            <a:off x="1043033" y="3794760"/>
+            <a:ext cx="6394087" cy="2643709"/>
           </a:xfrm>
           <a:prstGeom prst="rect">
             <a:avLst/>
@@ -5586,7 +5587,7 @@
     </p:spTree>
     <p:extLst>
       <p:ext uri="{BB962C8B-B14F-4D97-AF65-F5344CB8AC3E}">
-        <p14:creationId xmlns:p14="http://schemas.microsoft.com/office/powerpoint/2010/main" val="3514293667"/>
+        <p14:creationId xmlns:p14="http://schemas.microsoft.com/office/powerpoint/2010/main" val="911978099"/>
       </p:ext>
     </p:extLst>
   </p:cSld>
@@ -5791,7 +5792,7 @@
           <p:cNvPr id="2" name="Title 1">
             <a:extLst>
               <a:ext uri="{FF2B5EF4-FFF2-40B4-BE49-F238E27FC236}">
-                <a16:creationId xmlns:a16="http://schemas.microsoft.com/office/drawing/2014/main" id="{8C733588-1AEF-374A-B095-B4CC21D16DD3}"/>
+                <a16:creationId xmlns:a16="http://schemas.microsoft.com/office/drawing/2014/main" id="{A491959E-F635-624A-A884-AB9CE2DC221D}"/>
               </a:ext>
             </a:extLst>
           </p:cNvPr>
@@ -5809,17 +5810,17 @@
           <a:p>
             <a:r>
               <a:rPr lang="en-US" dirty="0"/>
-              <a:t>Run a simple analysis</a:t>
+              <a:t>Read the file</a:t>
             </a:r>
           </a:p>
         </p:txBody>
       </p:sp>
       <p:pic>
         <p:nvPicPr>
-          <p:cNvPr id="4" name="Picture 3">
-            <a:extLst>
-              <a:ext uri="{FF2B5EF4-FFF2-40B4-BE49-F238E27FC236}">
-                <a16:creationId xmlns:a16="http://schemas.microsoft.com/office/drawing/2014/main" id="{D4BE3F9A-3177-5F44-9FC0-03C062A0ADA3}"/>
+          <p:cNvPr id="5" name="Picture 4">
+            <a:extLst>
+              <a:ext uri="{FF2B5EF4-FFF2-40B4-BE49-F238E27FC236}">
+                <a16:creationId xmlns:a16="http://schemas.microsoft.com/office/drawing/2014/main" id="{AB1DB2B9-8648-F54F-8250-8E73ECEDA99E}"/>
               </a:ext>
             </a:extLst>
           </p:cNvPr>
@@ -5836,8 +5837,8 @@
         </p:blipFill>
         <p:spPr>
           <a:xfrm>
-            <a:off x="838200" y="2377011"/>
-            <a:ext cx="5613400" cy="3441700"/>
+            <a:off x="948648" y="1607192"/>
+            <a:ext cx="6841598" cy="981896"/>
           </a:xfrm>
           <a:prstGeom prst="rect">
             <a:avLst/>
@@ -5846,10 +5847,10 @@
       </p:pic>
       <p:pic>
         <p:nvPicPr>
-          <p:cNvPr id="5" name="Picture 4">
-            <a:extLst>
-              <a:ext uri="{FF2B5EF4-FFF2-40B4-BE49-F238E27FC236}">
-                <a16:creationId xmlns:a16="http://schemas.microsoft.com/office/drawing/2014/main" id="{A61EC309-DF08-DF43-9C98-0ABAFDCC48E3}"/>
+          <p:cNvPr id="6" name="Picture 5">
+            <a:extLst>
+              <a:ext uri="{FF2B5EF4-FFF2-40B4-BE49-F238E27FC236}">
+                <a16:creationId xmlns:a16="http://schemas.microsoft.com/office/drawing/2014/main" id="{552DDBCC-5B54-8A4A-80EF-DA328FCE87B9}"/>
               </a:ext>
             </a:extLst>
           </p:cNvPr>
@@ -5866,38 +5867,8 @@
         </p:blipFill>
         <p:spPr>
           <a:xfrm>
-            <a:off x="838200" y="5703119"/>
-            <a:ext cx="4906281" cy="998126"/>
-          </a:xfrm>
-          <a:prstGeom prst="rect">
-            <a:avLst/>
-          </a:prstGeom>
-        </p:spPr>
-      </p:pic>
-      <p:pic>
-        <p:nvPicPr>
-          <p:cNvPr id="6" name="Picture 5">
-            <a:extLst>
-              <a:ext uri="{FF2B5EF4-FFF2-40B4-BE49-F238E27FC236}">
-                <a16:creationId xmlns:a16="http://schemas.microsoft.com/office/drawing/2014/main" id="{6851049C-7157-D540-A041-2C18A4A85F8D}"/>
-              </a:ext>
-            </a:extLst>
-          </p:cNvPr>
-          <p:cNvPicPr>
-            <a:picLocks noChangeAspect="1"/>
-          </p:cNvPicPr>
-          <p:nvPr/>
-        </p:nvPicPr>
-        <p:blipFill>
-          <a:blip r:embed="rId4"/>
-          <a:stretch>
-            <a:fillRect/>
-          </a:stretch>
-        </p:blipFill>
-        <p:spPr>
-          <a:xfrm>
-            <a:off x="972094" y="1643154"/>
-            <a:ext cx="3439819" cy="901700"/>
+            <a:off x="838200" y="3379325"/>
+            <a:ext cx="9753754" cy="1767868"/>
           </a:xfrm>
           <a:prstGeom prst="rect">
             <a:avLst/>
@@ -5907,7 +5878,7 @@
     </p:spTree>
     <p:extLst>
       <p:ext uri="{BB962C8B-B14F-4D97-AF65-F5344CB8AC3E}">
-        <p14:creationId xmlns:p14="http://schemas.microsoft.com/office/powerpoint/2010/main" val="1008562000"/>
+        <p14:creationId xmlns:p14="http://schemas.microsoft.com/office/powerpoint/2010/main" val="3514293667"/>
       </p:ext>
     </p:extLst>
   </p:cSld>
@@ -5939,7 +5910,7 @@
           <p:cNvPr id="2" name="Title 1">
             <a:extLst>
               <a:ext uri="{FF2B5EF4-FFF2-40B4-BE49-F238E27FC236}">
-                <a16:creationId xmlns:a16="http://schemas.microsoft.com/office/drawing/2014/main" id="{2D4739D4-3A8D-3D41-8E89-B51A1C35C0B7}"/>
+                <a16:creationId xmlns:a16="http://schemas.microsoft.com/office/drawing/2014/main" id="{8C733588-1AEF-374A-B095-B4CC21D16DD3}"/>
               </a:ext>
             </a:extLst>
           </p:cNvPr>
@@ -5957,17 +5928,17 @@
           <a:p>
             <a:r>
               <a:rPr lang="en-US" dirty="0"/>
-              <a:t>Generalizing the solution</a:t>
+              <a:t>Run a simple analysis</a:t>
             </a:r>
           </a:p>
         </p:txBody>
       </p:sp>
       <p:pic>
         <p:nvPicPr>
-          <p:cNvPr id="3" name="Picture 2">
-            <a:extLst>
-              <a:ext uri="{FF2B5EF4-FFF2-40B4-BE49-F238E27FC236}">
-                <a16:creationId xmlns:a16="http://schemas.microsoft.com/office/drawing/2014/main" id="{41663BBC-43D5-1846-98D8-D05860CD2A49}"/>
+          <p:cNvPr id="4" name="Picture 3">
+            <a:extLst>
+              <a:ext uri="{FF2B5EF4-FFF2-40B4-BE49-F238E27FC236}">
+                <a16:creationId xmlns:a16="http://schemas.microsoft.com/office/drawing/2014/main" id="{D4BE3F9A-3177-5F44-9FC0-03C062A0ADA3}"/>
               </a:ext>
             </a:extLst>
           </p:cNvPr>
@@ -5984,111 +5955,78 @@
         </p:blipFill>
         <p:spPr>
           <a:xfrm>
-            <a:off x="838200" y="1216508"/>
-            <a:ext cx="4986020" cy="4986020"/>
+            <a:off x="838200" y="2377011"/>
+            <a:ext cx="5613400" cy="3441700"/>
           </a:xfrm>
           <a:prstGeom prst="rect">
             <a:avLst/>
           </a:prstGeom>
         </p:spPr>
       </p:pic>
-      <p:sp>
-        <p:nvSpPr>
-          <p:cNvPr id="4" name="TextBox 3">
-            <a:extLst>
-              <a:ext uri="{FF2B5EF4-FFF2-40B4-BE49-F238E27FC236}">
-                <a16:creationId xmlns:a16="http://schemas.microsoft.com/office/drawing/2014/main" id="{7A906087-80A7-F442-A7A5-E5099EE64847}"/>
-              </a:ext>
-            </a:extLst>
-          </p:cNvPr>
-          <p:cNvSpPr txBox="1"/>
+      <p:pic>
+        <p:nvPicPr>
+          <p:cNvPr id="5" name="Picture 4">
+            <a:extLst>
+              <a:ext uri="{FF2B5EF4-FFF2-40B4-BE49-F238E27FC236}">
+                <a16:creationId xmlns:a16="http://schemas.microsoft.com/office/drawing/2014/main" id="{A61EC309-DF08-DF43-9C98-0ABAFDCC48E3}"/>
+              </a:ext>
+            </a:extLst>
+          </p:cNvPr>
+          <p:cNvPicPr>
+            <a:picLocks noChangeAspect="1"/>
+          </p:cNvPicPr>
           <p:nvPr/>
-        </p:nvSpPr>
-        <p:spPr>
-          <a:xfrm>
-            <a:off x="838200" y="6397859"/>
-            <a:ext cx="7830220" cy="369332"/>
+        </p:nvPicPr>
+        <p:blipFill>
+          <a:blip r:embed="rId3"/>
+          <a:stretch>
+            <a:fillRect/>
+          </a:stretch>
+        </p:blipFill>
+        <p:spPr>
+          <a:xfrm>
+            <a:off x="838200" y="5703119"/>
+            <a:ext cx="4906281" cy="998126"/>
           </a:xfrm>
           <a:prstGeom prst="rect">
             <a:avLst/>
           </a:prstGeom>
-          <a:noFill/>
-        </p:spPr>
-        <p:txBody>
-          <a:bodyPr wrap="none" rtlCol="0">
-            <a:spAutoFit/>
-          </a:bodyPr>
-          <a:lstStyle/>
-          <a:p>
-            <a:r>
-              <a:rPr lang="en-US" dirty="0"/>
-              <a:t>Reference:  </a:t>
-            </a:r>
-            <a:r>
-              <a:rPr lang="en-US" dirty="0">
-                <a:hlinkClick r:id="rId3"/>
-              </a:rPr>
-              <a:t>https://www2.census.gov/census_2000/datasets/PUMS/FivePercent/</a:t>
-            </a:r>
-            <a:r>
-              <a:rPr lang="en-US" dirty="0"/>
-              <a:t> </a:t>
-            </a:r>
-          </a:p>
-        </p:txBody>
-      </p:sp>
-      <p:sp>
-        <p:nvSpPr>
-          <p:cNvPr id="5" name="TextBox 4">
-            <a:extLst>
-              <a:ext uri="{FF2B5EF4-FFF2-40B4-BE49-F238E27FC236}">
-                <a16:creationId xmlns:a16="http://schemas.microsoft.com/office/drawing/2014/main" id="{FC7C067A-A099-8741-B452-1DEDC8A4037F}"/>
-              </a:ext>
-            </a:extLst>
-          </p:cNvPr>
-          <p:cNvSpPr txBox="1"/>
+        </p:spPr>
+      </p:pic>
+      <p:pic>
+        <p:nvPicPr>
+          <p:cNvPr id="6" name="Picture 5">
+            <a:extLst>
+              <a:ext uri="{FF2B5EF4-FFF2-40B4-BE49-F238E27FC236}">
+                <a16:creationId xmlns:a16="http://schemas.microsoft.com/office/drawing/2014/main" id="{6851049C-7157-D540-A041-2C18A4A85F8D}"/>
+              </a:ext>
+            </a:extLst>
+          </p:cNvPr>
+          <p:cNvPicPr>
+            <a:picLocks noChangeAspect="1"/>
+          </p:cNvPicPr>
           <p:nvPr/>
-        </p:nvSpPr>
-        <p:spPr>
-          <a:xfrm>
-            <a:off x="6555114" y="2997815"/>
-            <a:ext cx="4798686" cy="1200329"/>
+        </p:nvPicPr>
+        <p:blipFill>
+          <a:blip r:embed="rId4"/>
+          <a:stretch>
+            <a:fillRect/>
+          </a:stretch>
+        </p:blipFill>
+        <p:spPr>
+          <a:xfrm>
+            <a:off x="972094" y="1643154"/>
+            <a:ext cx="3439819" cy="901700"/>
           </a:xfrm>
           <a:prstGeom prst="rect">
             <a:avLst/>
           </a:prstGeom>
-          <a:noFill/>
-        </p:spPr>
-        <p:txBody>
-          <a:bodyPr wrap="none" rtlCol="0">
-            <a:spAutoFit/>
-          </a:bodyPr>
-          <a:lstStyle/>
-          <a:p>
-            <a:r>
-              <a:rPr lang="en-US" sz="2400" dirty="0"/>
-              <a:t>We can use the state names to drive</a:t>
-            </a:r>
-          </a:p>
-          <a:p>
-            <a:r>
-              <a:rPr lang="en-US" sz="2400" dirty="0"/>
-              <a:t>an apply() function to download and </a:t>
-            </a:r>
-            <a:br>
-              <a:rPr lang="en-US" sz="2400" dirty="0"/>
-            </a:br>
-            <a:r>
-              <a:rPr lang="en-US" sz="2400" dirty="0"/>
-              <a:t>process the data for multiple states. </a:t>
-            </a:r>
-          </a:p>
-        </p:txBody>
-      </p:sp>
+        </p:spPr>
+      </p:pic>
     </p:spTree>
     <p:extLst>
       <p:ext uri="{BB962C8B-B14F-4D97-AF65-F5344CB8AC3E}">
-        <p14:creationId xmlns:p14="http://schemas.microsoft.com/office/powerpoint/2010/main" val="4173295013"/>
+        <p14:creationId xmlns:p14="http://schemas.microsoft.com/office/powerpoint/2010/main" val="1008562000"/>
       </p:ext>
     </p:extLst>
   </p:cSld>
@@ -6120,7 +6058,7 @@
           <p:cNvPr id="2" name="Title 1">
             <a:extLst>
               <a:ext uri="{FF2B5EF4-FFF2-40B4-BE49-F238E27FC236}">
-                <a16:creationId xmlns:a16="http://schemas.microsoft.com/office/drawing/2014/main" id="{767A8BC1-4E83-7347-8948-6AC77F0765ED}"/>
+                <a16:creationId xmlns:a16="http://schemas.microsoft.com/office/drawing/2014/main" id="{2D4739D4-3A8D-3D41-8E89-B51A1C35C0B7}"/>
               </a:ext>
             </a:extLst>
           </p:cNvPr>
@@ -6138,7 +6076,7 @@
           <a:p>
             <a:r>
               <a:rPr lang="en-US" dirty="0"/>
-              <a:t>First, the setup</a:t>
+              <a:t>Generalizing the solution</a:t>
             </a:r>
           </a:p>
         </p:txBody>
@@ -6148,7 +6086,7 @@
           <p:cNvPr id="3" name="Picture 2">
             <a:extLst>
               <a:ext uri="{FF2B5EF4-FFF2-40B4-BE49-F238E27FC236}">
-                <a16:creationId xmlns:a16="http://schemas.microsoft.com/office/drawing/2014/main" id="{A0E81EDA-850A-7842-A79C-841344DBF191}"/>
+                <a16:creationId xmlns:a16="http://schemas.microsoft.com/office/drawing/2014/main" id="{41663BBC-43D5-1846-98D8-D05860CD2A49}"/>
               </a:ext>
             </a:extLst>
           </p:cNvPr>
@@ -6165,18 +6103,111 @@
         </p:blipFill>
         <p:spPr>
           <a:xfrm>
-            <a:off x="838200" y="1353668"/>
-            <a:ext cx="4780280" cy="2612479"/>
+            <a:off x="838200" y="1216508"/>
+            <a:ext cx="4986020" cy="4986020"/>
           </a:xfrm>
           <a:prstGeom prst="rect">
             <a:avLst/>
           </a:prstGeom>
         </p:spPr>
       </p:pic>
+      <p:sp>
+        <p:nvSpPr>
+          <p:cNvPr id="4" name="TextBox 3">
+            <a:extLst>
+              <a:ext uri="{FF2B5EF4-FFF2-40B4-BE49-F238E27FC236}">
+                <a16:creationId xmlns:a16="http://schemas.microsoft.com/office/drawing/2014/main" id="{7A906087-80A7-F442-A7A5-E5099EE64847}"/>
+              </a:ext>
+            </a:extLst>
+          </p:cNvPr>
+          <p:cNvSpPr txBox="1"/>
+          <p:nvPr/>
+        </p:nvSpPr>
+        <p:spPr>
+          <a:xfrm>
+            <a:off x="838200" y="6397859"/>
+            <a:ext cx="7830220" cy="369332"/>
+          </a:xfrm>
+          <a:prstGeom prst="rect">
+            <a:avLst/>
+          </a:prstGeom>
+          <a:noFill/>
+        </p:spPr>
+        <p:txBody>
+          <a:bodyPr wrap="none" rtlCol="0">
+            <a:spAutoFit/>
+          </a:bodyPr>
+          <a:lstStyle/>
+          <a:p>
+            <a:r>
+              <a:rPr lang="en-US" dirty="0"/>
+              <a:t>Reference:  </a:t>
+            </a:r>
+            <a:r>
+              <a:rPr lang="en-US" dirty="0">
+                <a:hlinkClick r:id="rId3"/>
+              </a:rPr>
+              <a:t>https://www2.census.gov/census_2000/datasets/PUMS/FivePercent/</a:t>
+            </a:r>
+            <a:r>
+              <a:rPr lang="en-US" dirty="0"/>
+              <a:t> </a:t>
+            </a:r>
+          </a:p>
+        </p:txBody>
+      </p:sp>
+      <p:sp>
+        <p:nvSpPr>
+          <p:cNvPr id="5" name="TextBox 4">
+            <a:extLst>
+              <a:ext uri="{FF2B5EF4-FFF2-40B4-BE49-F238E27FC236}">
+                <a16:creationId xmlns:a16="http://schemas.microsoft.com/office/drawing/2014/main" id="{FC7C067A-A099-8741-B452-1DEDC8A4037F}"/>
+              </a:ext>
+            </a:extLst>
+          </p:cNvPr>
+          <p:cNvSpPr txBox="1"/>
+          <p:nvPr/>
+        </p:nvSpPr>
+        <p:spPr>
+          <a:xfrm>
+            <a:off x="6555114" y="2997815"/>
+            <a:ext cx="4798686" cy="1200329"/>
+          </a:xfrm>
+          <a:prstGeom prst="rect">
+            <a:avLst/>
+          </a:prstGeom>
+          <a:noFill/>
+        </p:spPr>
+        <p:txBody>
+          <a:bodyPr wrap="none" rtlCol="0">
+            <a:spAutoFit/>
+          </a:bodyPr>
+          <a:lstStyle/>
+          <a:p>
+            <a:r>
+              <a:rPr lang="en-US" sz="2400" dirty="0"/>
+              <a:t>We can use the state names to drive</a:t>
+            </a:r>
+          </a:p>
+          <a:p>
+            <a:r>
+              <a:rPr lang="en-US" sz="2400" dirty="0"/>
+              <a:t>an apply() function to download and </a:t>
+            </a:r>
+            <a:br>
+              <a:rPr lang="en-US" sz="2400" dirty="0"/>
+            </a:br>
+            <a:r>
+              <a:rPr lang="en-US" sz="2400" dirty="0"/>
+              <a:t>process the data for multiple states. </a:t>
+            </a:r>
+          </a:p>
+        </p:txBody>
+      </p:sp>
     </p:spTree>
     <p:extLst>
       <p:ext uri="{BB962C8B-B14F-4D97-AF65-F5344CB8AC3E}">
-        <p14:creationId xmlns:p14="http://schemas.microsoft.com/office/powerpoint/2010/main" val="2117136955"/>
+        <p14:creationId xmlns:p14="http://schemas.microsoft.com/office/powerpoint/2010/main" val="4173295013"/>
       </p:ext>
     </p:extLst>
   </p:cSld>
@@ -6208,7 +6239,7 @@
           <p:cNvPr id="2" name="Title 1">
             <a:extLst>
               <a:ext uri="{FF2B5EF4-FFF2-40B4-BE49-F238E27FC236}">
-                <a16:creationId xmlns:a16="http://schemas.microsoft.com/office/drawing/2014/main" id="{0E4CF397-91B0-594F-8E45-56EC74CC35E0}"/>
+                <a16:creationId xmlns:a16="http://schemas.microsoft.com/office/drawing/2014/main" id="{767A8BC1-4E83-7347-8948-6AC77F0765ED}"/>
               </a:ext>
             </a:extLst>
           </p:cNvPr>
@@ -6226,25 +6257,17 @@
           <a:p>
             <a:r>
               <a:rPr lang="en-US" dirty="0"/>
-              <a:t>Next, the load process driven by </a:t>
-            </a:r>
-            <a:r>
-              <a:rPr lang="en-US" dirty="0" err="1"/>
-              <a:t>lapply</a:t>
-            </a:r>
-            <a:r>
-              <a:rPr lang="en-US" dirty="0"/>
-              <a:t>()</a:t>
+              <a:t>First, the setup</a:t>
             </a:r>
           </a:p>
         </p:txBody>
       </p:sp>
       <p:pic>
         <p:nvPicPr>
-          <p:cNvPr id="5" name="Picture 4">
-            <a:extLst>
-              <a:ext uri="{FF2B5EF4-FFF2-40B4-BE49-F238E27FC236}">
-                <a16:creationId xmlns:a16="http://schemas.microsoft.com/office/drawing/2014/main" id="{5BEACBD1-FC76-5A43-8BEC-3AF42455F23D}"/>
+          <p:cNvPr id="3" name="Picture 2">
+            <a:extLst>
+              <a:ext uri="{FF2B5EF4-FFF2-40B4-BE49-F238E27FC236}">
+                <a16:creationId xmlns:a16="http://schemas.microsoft.com/office/drawing/2014/main" id="{A0E81EDA-850A-7842-A79C-841344DBF191}"/>
               </a:ext>
             </a:extLst>
           </p:cNvPr>
@@ -6261,8 +6284,8 @@
         </p:blipFill>
         <p:spPr>
           <a:xfrm>
-            <a:off x="838200" y="1319414"/>
-            <a:ext cx="8369778" cy="5401426"/>
+            <a:off x="838200" y="1353668"/>
+            <a:ext cx="4780280" cy="2612479"/>
           </a:xfrm>
           <a:prstGeom prst="rect">
             <a:avLst/>
@@ -6272,7 +6295,7 @@
     </p:spTree>
     <p:extLst>
       <p:ext uri="{BB962C8B-B14F-4D97-AF65-F5344CB8AC3E}">
-        <p14:creationId xmlns:p14="http://schemas.microsoft.com/office/powerpoint/2010/main" val="1415465657"/>
+        <p14:creationId xmlns:p14="http://schemas.microsoft.com/office/powerpoint/2010/main" val="2117136955"/>
       </p:ext>
     </p:extLst>
   </p:cSld>
@@ -6301,6 +6324,102 @@
       </p:grpSpPr>
       <p:sp>
         <p:nvSpPr>
+          <p:cNvPr id="2" name="Title 1">
+            <a:extLst>
+              <a:ext uri="{FF2B5EF4-FFF2-40B4-BE49-F238E27FC236}">
+                <a16:creationId xmlns:a16="http://schemas.microsoft.com/office/drawing/2014/main" id="{0E4CF397-91B0-594F-8E45-56EC74CC35E0}"/>
+              </a:ext>
+            </a:extLst>
+          </p:cNvPr>
+          <p:cNvSpPr>
+            <a:spLocks noGrp="1"/>
+          </p:cNvSpPr>
+          <p:nvPr>
+            <p:ph type="title"/>
+          </p:nvPr>
+        </p:nvSpPr>
+        <p:spPr/>
+        <p:txBody>
+          <a:bodyPr/>
+          <a:lstStyle/>
+          <a:p>
+            <a:r>
+              <a:rPr lang="en-US" dirty="0"/>
+              <a:t>Next, the load process driven by </a:t>
+            </a:r>
+            <a:r>
+              <a:rPr lang="en-US" dirty="0" err="1"/>
+              <a:t>lapply</a:t>
+            </a:r>
+            <a:r>
+              <a:rPr lang="en-US" dirty="0"/>
+              <a:t>()</a:t>
+            </a:r>
+          </a:p>
+        </p:txBody>
+      </p:sp>
+      <p:pic>
+        <p:nvPicPr>
+          <p:cNvPr id="5" name="Picture 4">
+            <a:extLst>
+              <a:ext uri="{FF2B5EF4-FFF2-40B4-BE49-F238E27FC236}">
+                <a16:creationId xmlns:a16="http://schemas.microsoft.com/office/drawing/2014/main" id="{5BEACBD1-FC76-5A43-8BEC-3AF42455F23D}"/>
+              </a:ext>
+            </a:extLst>
+          </p:cNvPr>
+          <p:cNvPicPr>
+            <a:picLocks noChangeAspect="1"/>
+          </p:cNvPicPr>
+          <p:nvPr/>
+        </p:nvPicPr>
+        <p:blipFill>
+          <a:blip r:embed="rId2"/>
+          <a:stretch>
+            <a:fillRect/>
+          </a:stretch>
+        </p:blipFill>
+        <p:spPr>
+          <a:xfrm>
+            <a:off x="838200" y="1319414"/>
+            <a:ext cx="8369778" cy="5401426"/>
+          </a:xfrm>
+          <a:prstGeom prst="rect">
+            <a:avLst/>
+          </a:prstGeom>
+        </p:spPr>
+      </p:pic>
+    </p:spTree>
+    <p:extLst>
+      <p:ext uri="{BB962C8B-B14F-4D97-AF65-F5344CB8AC3E}">
+        <p14:creationId xmlns:p14="http://schemas.microsoft.com/office/powerpoint/2010/main" val="1415465657"/>
+      </p:ext>
+    </p:extLst>
+  </p:cSld>
+  <p:clrMapOvr>
+    <a:masterClrMapping/>
+  </p:clrMapOvr>
+</p:sld>
+</file>
+
+<file path=ppt/slides/slide25.xml><?xml version="1.0" encoding="utf-8"?>
+<p:sld xmlns:a="http://schemas.openxmlformats.org/drawingml/2006/main" xmlns:r="http://schemas.openxmlformats.org/officeDocument/2006/relationships" xmlns:p="http://schemas.openxmlformats.org/presentationml/2006/main">
+  <p:cSld>
+    <p:spTree>
+      <p:nvGrpSpPr>
+        <p:cNvPr id="1" name=""/>
+        <p:cNvGrpSpPr/>
+        <p:nvPr/>
+      </p:nvGrpSpPr>
+      <p:grpSpPr>
+        <a:xfrm>
+          <a:off x="0" y="0"/>
+          <a:ext cx="0" cy="0"/>
+          <a:chOff x="0" y="0"/>
+          <a:chExt cx="0" cy="0"/>
+        </a:xfrm>
+      </p:grpSpPr>
+      <p:sp>
+        <p:nvSpPr>
           <p:cNvPr id="3" name="TextBox 2">
             <a:extLst>
               <a:ext uri="{FF2B5EF4-FFF2-40B4-BE49-F238E27FC236}">
@@ -6347,7 +6466,7 @@
 </p:sld>
 </file>
 
-<file path=ppt/slides/slide25.xml><?xml version="1.0" encoding="utf-8"?>
+<file path=ppt/slides/slide26.xml><?xml version="1.0" encoding="utf-8"?>
 <p:sld xmlns:a="http://schemas.openxmlformats.org/drawingml/2006/main" xmlns:r="http://schemas.openxmlformats.org/officeDocument/2006/relationships" xmlns:p="http://schemas.openxmlformats.org/presentationml/2006/main">
   <p:cSld>
     <p:spTree>
@@ -7523,7 +7642,7 @@
           <p:cNvPr id="2" name="Title 1">
             <a:extLst>
               <a:ext uri="{FF2B5EF4-FFF2-40B4-BE49-F238E27FC236}">
-                <a16:creationId xmlns:a16="http://schemas.microsoft.com/office/drawing/2014/main" id="{F002EE92-23F9-8F47-8A38-DF50873CE207}"/>
+                <a16:creationId xmlns:a16="http://schemas.microsoft.com/office/drawing/2014/main" id="{6AABEE3D-4E30-2347-A865-9E519FB55537}"/>
               </a:ext>
             </a:extLst>
           </p:cNvPr>
@@ -7541,15 +7660,7 @@
           <a:p>
             <a:r>
               <a:rPr lang="en-US" dirty="0"/>
-              <a:t>“Yes Virginia, there is a </a:t>
-            </a:r>
-            <a:r>
-              <a:rPr lang="en-US" dirty="0" err="1"/>
-              <a:t>read.fortran</a:t>
-            </a:r>
-            <a:r>
-              <a:rPr lang="en-US" dirty="0"/>
-              <a:t>()” </a:t>
+              <a:t>What is a .for file? </a:t>
             </a:r>
           </a:p>
         </p:txBody>
@@ -7559,7 +7670,7 @@
           <p:cNvPr id="3" name="Picture 2">
             <a:extLst>
               <a:ext uri="{FF2B5EF4-FFF2-40B4-BE49-F238E27FC236}">
-                <a16:creationId xmlns:a16="http://schemas.microsoft.com/office/drawing/2014/main" id="{860FA241-5A4C-5544-B053-859C2176AED0}"/>
+                <a16:creationId xmlns:a16="http://schemas.microsoft.com/office/drawing/2014/main" id="{61AD49A1-0DB8-9048-B904-4358EAB83A7C}"/>
               </a:ext>
             </a:extLst>
           </p:cNvPr>
@@ -7569,97 +7680,25 @@
           <p:nvPr/>
         </p:nvPicPr>
         <p:blipFill>
-          <a:blip r:embed="rId3"/>
+          <a:blip r:embed="rId2"/>
           <a:stretch>
             <a:fillRect/>
           </a:stretch>
         </p:blipFill>
         <p:spPr>
           <a:xfrm>
-            <a:off x="838200" y="1898650"/>
-            <a:ext cx="7391400" cy="3060700"/>
+            <a:off x="838200" y="1353668"/>
+            <a:ext cx="6832600" cy="5067300"/>
           </a:xfrm>
           <a:prstGeom prst="rect">
             <a:avLst/>
           </a:prstGeom>
         </p:spPr>
       </p:pic>
-      <p:pic>
-        <p:nvPicPr>
-          <p:cNvPr id="4" name="Picture 3">
-            <a:extLst>
-              <a:ext uri="{FF2B5EF4-FFF2-40B4-BE49-F238E27FC236}">
-                <a16:creationId xmlns:a16="http://schemas.microsoft.com/office/drawing/2014/main" id="{6CFC94A1-EC36-B842-8216-5E9B81C465E6}"/>
-              </a:ext>
-            </a:extLst>
-          </p:cNvPr>
-          <p:cNvPicPr>
-            <a:picLocks noChangeAspect="1"/>
-          </p:cNvPicPr>
-          <p:nvPr/>
-        </p:nvPicPr>
-        <p:blipFill>
-          <a:blip r:embed="rId4"/>
-          <a:stretch>
-            <a:fillRect/>
-          </a:stretch>
-        </p:blipFill>
-        <p:spPr>
-          <a:xfrm>
-            <a:off x="8229600" y="1846167"/>
-            <a:ext cx="3722914" cy="3171922"/>
-          </a:xfrm>
-          <a:prstGeom prst="rect">
-            <a:avLst/>
-          </a:prstGeom>
-        </p:spPr>
-      </p:pic>
-      <p:sp>
-        <p:nvSpPr>
-          <p:cNvPr id="5" name="TextBox 4">
-            <a:extLst>
-              <a:ext uri="{FF2B5EF4-FFF2-40B4-BE49-F238E27FC236}">
-                <a16:creationId xmlns:a16="http://schemas.microsoft.com/office/drawing/2014/main" id="{88E665E8-8143-B645-AF29-5A93DC2E7495}"/>
-              </a:ext>
-            </a:extLst>
-          </p:cNvPr>
-          <p:cNvSpPr txBox="1"/>
-          <p:nvPr/>
-        </p:nvSpPr>
-        <p:spPr>
-          <a:xfrm>
-            <a:off x="838200" y="6123543"/>
-            <a:ext cx="5311775" cy="307777"/>
-          </a:xfrm>
-          <a:prstGeom prst="rect">
-            <a:avLst/>
-          </a:prstGeom>
-          <a:noFill/>
-        </p:spPr>
-        <p:txBody>
-          <a:bodyPr wrap="none" rtlCol="0">
-            <a:spAutoFit/>
-          </a:bodyPr>
-          <a:lstStyle/>
-          <a:p>
-            <a:r>
-              <a:rPr lang="en-US" sz="1400" dirty="0"/>
-              <a:t>Reference: </a:t>
-            </a:r>
-            <a:r>
-              <a:rPr lang="en-US" sz="1400" dirty="0">
-                <a:hlinkClick r:id="rId5"/>
-              </a:rPr>
-              <a:t>Michigan Technological University CS201 – Fortran Formats</a:t>
-            </a:r>
-            <a:endParaRPr lang="en-US" sz="1400" dirty="0"/>
-          </a:p>
-        </p:txBody>
-      </p:sp>
     </p:spTree>
     <p:extLst>
       <p:ext uri="{BB962C8B-B14F-4D97-AF65-F5344CB8AC3E}">
-        <p14:creationId xmlns:p14="http://schemas.microsoft.com/office/powerpoint/2010/main" val="383555310"/>
+        <p14:creationId xmlns:p14="http://schemas.microsoft.com/office/powerpoint/2010/main" val="848474286"/>
       </p:ext>
     </p:extLst>
   </p:cSld>
@@ -7691,7 +7730,7 @@
           <p:cNvPr id="2" name="Title 1">
             <a:extLst>
               <a:ext uri="{FF2B5EF4-FFF2-40B4-BE49-F238E27FC236}">
-                <a16:creationId xmlns:a16="http://schemas.microsoft.com/office/drawing/2014/main" id="{4D5D29CC-D988-D946-96FA-2FE04DEAB8FD}"/>
+                <a16:creationId xmlns:a16="http://schemas.microsoft.com/office/drawing/2014/main" id="{F002EE92-23F9-8F47-8A38-DF50873CE207}"/>
               </a:ext>
             </a:extLst>
           </p:cNvPr>
@@ -7709,7 +7748,15 @@
           <a:p>
             <a:r>
               <a:rPr lang="en-US" dirty="0"/>
-              <a:t>…and the output</a:t>
+              <a:t>“Yes Virginia, there is a </a:t>
+            </a:r>
+            <a:r>
+              <a:rPr lang="en-US" dirty="0" err="1"/>
+              <a:t>read.fortran</a:t>
+            </a:r>
+            <a:r>
+              <a:rPr lang="en-US" dirty="0"/>
+              <a:t>()” </a:t>
             </a:r>
           </a:p>
         </p:txBody>
@@ -7719,7 +7766,7 @@
           <p:cNvPr id="3" name="Picture 2">
             <a:extLst>
               <a:ext uri="{FF2B5EF4-FFF2-40B4-BE49-F238E27FC236}">
-                <a16:creationId xmlns:a16="http://schemas.microsoft.com/office/drawing/2014/main" id="{3965C5D7-2755-4245-8E63-FD72665E384A}"/>
+                <a16:creationId xmlns:a16="http://schemas.microsoft.com/office/drawing/2014/main" id="{860FA241-5A4C-5544-B053-859C2176AED0}"/>
               </a:ext>
             </a:extLst>
           </p:cNvPr>
@@ -7729,25 +7776,97 @@
           <p:nvPr/>
         </p:nvPicPr>
         <p:blipFill>
-          <a:blip r:embed="rId2"/>
+          <a:blip r:embed="rId3"/>
           <a:stretch>
             <a:fillRect/>
           </a:stretch>
         </p:blipFill>
         <p:spPr>
           <a:xfrm>
-            <a:off x="1027612" y="1690688"/>
-            <a:ext cx="7315200" cy="3492500"/>
+            <a:off x="838200" y="1898650"/>
+            <a:ext cx="7391400" cy="3060700"/>
           </a:xfrm>
           <a:prstGeom prst="rect">
             <a:avLst/>
           </a:prstGeom>
         </p:spPr>
       </p:pic>
+      <p:pic>
+        <p:nvPicPr>
+          <p:cNvPr id="4" name="Picture 3">
+            <a:extLst>
+              <a:ext uri="{FF2B5EF4-FFF2-40B4-BE49-F238E27FC236}">
+                <a16:creationId xmlns:a16="http://schemas.microsoft.com/office/drawing/2014/main" id="{6CFC94A1-EC36-B842-8216-5E9B81C465E6}"/>
+              </a:ext>
+            </a:extLst>
+          </p:cNvPr>
+          <p:cNvPicPr>
+            <a:picLocks noChangeAspect="1"/>
+          </p:cNvPicPr>
+          <p:nvPr/>
+        </p:nvPicPr>
+        <p:blipFill>
+          <a:blip r:embed="rId4"/>
+          <a:stretch>
+            <a:fillRect/>
+          </a:stretch>
+        </p:blipFill>
+        <p:spPr>
+          <a:xfrm>
+            <a:off x="8229600" y="1846167"/>
+            <a:ext cx="3722914" cy="3171922"/>
+          </a:xfrm>
+          <a:prstGeom prst="rect">
+            <a:avLst/>
+          </a:prstGeom>
+        </p:spPr>
+      </p:pic>
+      <p:sp>
+        <p:nvSpPr>
+          <p:cNvPr id="5" name="TextBox 4">
+            <a:extLst>
+              <a:ext uri="{FF2B5EF4-FFF2-40B4-BE49-F238E27FC236}">
+                <a16:creationId xmlns:a16="http://schemas.microsoft.com/office/drawing/2014/main" id="{88E665E8-8143-B645-AF29-5A93DC2E7495}"/>
+              </a:ext>
+            </a:extLst>
+          </p:cNvPr>
+          <p:cNvSpPr txBox="1"/>
+          <p:nvPr/>
+        </p:nvSpPr>
+        <p:spPr>
+          <a:xfrm>
+            <a:off x="838200" y="6123543"/>
+            <a:ext cx="5311775" cy="307777"/>
+          </a:xfrm>
+          <a:prstGeom prst="rect">
+            <a:avLst/>
+          </a:prstGeom>
+          <a:noFill/>
+        </p:spPr>
+        <p:txBody>
+          <a:bodyPr wrap="none" rtlCol="0">
+            <a:spAutoFit/>
+          </a:bodyPr>
+          <a:lstStyle/>
+          <a:p>
+            <a:r>
+              <a:rPr lang="en-US" sz="1400" dirty="0"/>
+              <a:t>Reference: </a:t>
+            </a:r>
+            <a:r>
+              <a:rPr lang="en-US" sz="1400" dirty="0">
+                <a:hlinkClick r:id="rId5"/>
+              </a:rPr>
+              <a:t>Michigan Technological University CS201 – Fortran Formats</a:t>
+            </a:r>
+            <a:endParaRPr lang="en-US" sz="1400" dirty="0"/>
+          </a:p>
+        </p:txBody>
+      </p:sp>
     </p:spTree>
     <p:extLst>
       <p:ext uri="{BB962C8B-B14F-4D97-AF65-F5344CB8AC3E}">
-        <p14:creationId xmlns:p14="http://schemas.microsoft.com/office/powerpoint/2010/main" val="4242672988"/>
+        <p14:creationId xmlns:p14="http://schemas.microsoft.com/office/powerpoint/2010/main" val="383555310"/>
       </p:ext>
     </p:extLst>
   </p:cSld>
@@ -7779,7 +7898,7 @@
           <p:cNvPr id="2" name="Title 1">
             <a:extLst>
               <a:ext uri="{FF2B5EF4-FFF2-40B4-BE49-F238E27FC236}">
-                <a16:creationId xmlns:a16="http://schemas.microsoft.com/office/drawing/2014/main" id="{79C709C9-2311-4C4D-92BA-FAEEBA908401}"/>
+                <a16:creationId xmlns:a16="http://schemas.microsoft.com/office/drawing/2014/main" id="{4D5D29CC-D988-D946-96FA-2FE04DEAB8FD}"/>
               </a:ext>
             </a:extLst>
           </p:cNvPr>
@@ -7797,33 +7916,17 @@
           <a:p>
             <a:r>
               <a:rPr lang="en-US" dirty="0"/>
-              <a:t>Alternatives: </a:t>
-            </a:r>
-            <a:r>
-              <a:rPr lang="en-US" dirty="0" err="1"/>
-              <a:t>read.fwf</a:t>
-            </a:r>
-            <a:r>
-              <a:rPr lang="en-US" dirty="0"/>
-              <a:t>() and </a:t>
-            </a:r>
-            <a:r>
-              <a:rPr lang="en-US" dirty="0" err="1"/>
-              <a:t>read_fwf</a:t>
-            </a:r>
-            <a:r>
-              <a:rPr lang="en-US" dirty="0"/>
-              <a:t>()</a:t>
+              <a:t>…and the output</a:t>
             </a:r>
           </a:p>
         </p:txBody>
       </p:sp>
       <p:pic>
         <p:nvPicPr>
-          <p:cNvPr id="4" name="Picture 3">
-            <a:extLst>
-              <a:ext uri="{FF2B5EF4-FFF2-40B4-BE49-F238E27FC236}">
-                <a16:creationId xmlns:a16="http://schemas.microsoft.com/office/drawing/2014/main" id="{86A9F9DA-BAFC-A640-9C0F-7F5CC7B192DE}"/>
+          <p:cNvPr id="3" name="Picture 2">
+            <a:extLst>
+              <a:ext uri="{FF2B5EF4-FFF2-40B4-BE49-F238E27FC236}">
+                <a16:creationId xmlns:a16="http://schemas.microsoft.com/office/drawing/2014/main" id="{3965C5D7-2755-4245-8E63-FD72665E384A}"/>
               </a:ext>
             </a:extLst>
           </p:cNvPr>
@@ -7840,8 +7943,8 @@
         </p:blipFill>
         <p:spPr>
           <a:xfrm>
-            <a:off x="838200" y="1584596"/>
-            <a:ext cx="9547452" cy="3932284"/>
+            <a:off x="1027612" y="1690688"/>
+            <a:ext cx="7315200" cy="3492500"/>
           </a:xfrm>
           <a:prstGeom prst="rect">
             <a:avLst/>
@@ -7851,7 +7954,7 @@
     </p:spTree>
     <p:extLst>
       <p:ext uri="{BB962C8B-B14F-4D97-AF65-F5344CB8AC3E}">
-        <p14:creationId xmlns:p14="http://schemas.microsoft.com/office/powerpoint/2010/main" val="894325570"/>
+        <p14:creationId xmlns:p14="http://schemas.microsoft.com/office/powerpoint/2010/main" val="4242672988"/>
       </p:ext>
     </p:extLst>
   </p:cSld>
@@ -7883,7 +7986,7 @@
           <p:cNvPr id="2" name="Title 1">
             <a:extLst>
               <a:ext uri="{FF2B5EF4-FFF2-40B4-BE49-F238E27FC236}">
-                <a16:creationId xmlns:a16="http://schemas.microsoft.com/office/drawing/2014/main" id="{FA91C373-D12A-DF42-BFA7-D33BE3A2442A}"/>
+                <a16:creationId xmlns:a16="http://schemas.microsoft.com/office/drawing/2014/main" id="{79C709C9-2311-4C4D-92BA-FAEEBA908401}"/>
               </a:ext>
             </a:extLst>
           </p:cNvPr>
@@ -7901,7 +8004,23 @@
           <a:p>
             <a:r>
               <a:rPr lang="en-US" dirty="0"/>
-              <a:t>Checking our results…</a:t>
+              <a:t>Alternatives: </a:t>
+            </a:r>
+            <a:r>
+              <a:rPr lang="en-US" dirty="0" err="1"/>
+              <a:t>read.fwf</a:t>
+            </a:r>
+            <a:r>
+              <a:rPr lang="en-US" dirty="0"/>
+              <a:t>() and </a:t>
+            </a:r>
+            <a:r>
+              <a:rPr lang="en-US" dirty="0" err="1"/>
+              <a:t>read_fwf</a:t>
+            </a:r>
+            <a:r>
+              <a:rPr lang="en-US" dirty="0"/>
+              <a:t>()</a:t>
             </a:r>
           </a:p>
         </p:txBody>
@@ -7911,7 +8030,7 @@
           <p:cNvPr id="4" name="Picture 3">
             <a:extLst>
               <a:ext uri="{FF2B5EF4-FFF2-40B4-BE49-F238E27FC236}">
-                <a16:creationId xmlns:a16="http://schemas.microsoft.com/office/drawing/2014/main" id="{CA1CCE43-C5F6-5742-BF52-2E396EDA0582}"/>
+                <a16:creationId xmlns:a16="http://schemas.microsoft.com/office/drawing/2014/main" id="{86A9F9DA-BAFC-A640-9C0F-7F5CC7B192DE}"/>
               </a:ext>
             </a:extLst>
           </p:cNvPr>
@@ -7928,38 +8047,8 @@
         </p:blipFill>
         <p:spPr>
           <a:xfrm>
-            <a:off x="838200" y="1381578"/>
-            <a:ext cx="6502400" cy="5270500"/>
-          </a:xfrm>
-          <a:prstGeom prst="rect">
-            <a:avLst/>
-          </a:prstGeom>
-        </p:spPr>
-      </p:pic>
-      <p:pic>
-        <p:nvPicPr>
-          <p:cNvPr id="5" name="Picture 4">
-            <a:extLst>
-              <a:ext uri="{FF2B5EF4-FFF2-40B4-BE49-F238E27FC236}">
-                <a16:creationId xmlns:a16="http://schemas.microsoft.com/office/drawing/2014/main" id="{2306BF28-0DB4-CB46-BD4C-E4C77891E1F4}"/>
-              </a:ext>
-            </a:extLst>
-          </p:cNvPr>
-          <p:cNvPicPr>
-            <a:picLocks noChangeAspect="1"/>
-          </p:cNvPicPr>
-          <p:nvPr/>
-        </p:nvPicPr>
-        <p:blipFill>
-          <a:blip r:embed="rId3"/>
-          <a:stretch>
-            <a:fillRect/>
-          </a:stretch>
-        </p:blipFill>
-        <p:spPr>
-          <a:xfrm>
-            <a:off x="7340600" y="1381578"/>
-            <a:ext cx="4672587" cy="3177359"/>
+            <a:off x="838200" y="1584596"/>
+            <a:ext cx="9547452" cy="3932284"/>
           </a:xfrm>
           <a:prstGeom prst="rect">
             <a:avLst/>
@@ -7969,7 +8058,7 @@
     </p:spTree>
     <p:extLst>
       <p:ext uri="{BB962C8B-B14F-4D97-AF65-F5344CB8AC3E}">
-        <p14:creationId xmlns:p14="http://schemas.microsoft.com/office/powerpoint/2010/main" val="2643501384"/>
+        <p14:creationId xmlns:p14="http://schemas.microsoft.com/office/powerpoint/2010/main" val="894325570"/>
       </p:ext>
     </p:extLst>
   </p:cSld>

</xml_diff>

<commit_message>
Include slides for hipread solution
</commit_message>
<xml_diff>
--- a/presentation/readingFixedFilesInR.pptx
+++ b/presentation/readingFixedFilesInR.pptx
@@ -5,7 +5,7 @@
     <p:sldMasterId id="2147483648" r:id="rId1"/>
   </p:sldMasterIdLst>
   <p:notesMasterIdLst>
-    <p:notesMasterId r:id="rId28"/>
+    <p:notesMasterId r:id="rId33"/>
   </p:notesMasterIdLst>
   <p:sldIdLst>
     <p:sldId id="256" r:id="rId2"/>
@@ -32,8 +32,13 @@
     <p:sldId id="280" r:id="rId23"/>
     <p:sldId id="281" r:id="rId24"/>
     <p:sldId id="282" r:id="rId25"/>
-    <p:sldId id="276" r:id="rId26"/>
-    <p:sldId id="278" r:id="rId27"/>
+    <p:sldId id="284" r:id="rId26"/>
+    <p:sldId id="285" r:id="rId27"/>
+    <p:sldId id="286" r:id="rId28"/>
+    <p:sldId id="287" r:id="rId29"/>
+    <p:sldId id="288" r:id="rId30"/>
+    <p:sldId id="276" r:id="rId31"/>
+    <p:sldId id="278" r:id="rId32"/>
   </p:sldIdLst>
   <p:sldSz cx="12192000" cy="6858000"/>
   <p:notesSz cx="6858000" cy="9144000"/>
@@ -222,7 +227,7 @@
           <a:p>
             <a:fld id="{18A5D979-93FC-144A-AB28-6BA00BC12244}" type="datetimeFigureOut">
               <a:rPr lang="en-US" smtClean="0"/>
-              <a:t>1/23/21</a:t>
+              <a:t>1/28/21</a:t>
             </a:fld>
             <a:endParaRPr lang="en-US"/>
           </a:p>
@@ -1099,7 +1104,7 @@
           <a:p>
             <a:fld id="{211EC6DF-777A-4142-B847-255B1624343C}" type="datetimeFigureOut">
               <a:rPr lang="en-US" smtClean="0"/>
-              <a:t>1/23/21</a:t>
+              <a:t>1/28/21</a:t>
             </a:fld>
             <a:endParaRPr lang="en-US"/>
           </a:p>
@@ -1297,7 +1302,7 @@
           <a:p>
             <a:fld id="{211EC6DF-777A-4142-B847-255B1624343C}" type="datetimeFigureOut">
               <a:rPr lang="en-US" smtClean="0"/>
-              <a:t>1/23/21</a:t>
+              <a:t>1/28/21</a:t>
             </a:fld>
             <a:endParaRPr lang="en-US"/>
           </a:p>
@@ -1505,7 +1510,7 @@
           <a:p>
             <a:fld id="{211EC6DF-777A-4142-B847-255B1624343C}" type="datetimeFigureOut">
               <a:rPr lang="en-US" smtClean="0"/>
-              <a:t>1/23/21</a:t>
+              <a:t>1/28/21</a:t>
             </a:fld>
             <a:endParaRPr lang="en-US"/>
           </a:p>
@@ -1703,7 +1708,7 @@
           <a:p>
             <a:fld id="{211EC6DF-777A-4142-B847-255B1624343C}" type="datetimeFigureOut">
               <a:rPr lang="en-US" smtClean="0"/>
-              <a:t>1/23/21</a:t>
+              <a:t>1/28/21</a:t>
             </a:fld>
             <a:endParaRPr lang="en-US"/>
           </a:p>
@@ -1978,7 +1983,7 @@
           <a:p>
             <a:fld id="{211EC6DF-777A-4142-B847-255B1624343C}" type="datetimeFigureOut">
               <a:rPr lang="en-US" smtClean="0"/>
-              <a:t>1/23/21</a:t>
+              <a:t>1/28/21</a:t>
             </a:fld>
             <a:endParaRPr lang="en-US"/>
           </a:p>
@@ -2243,7 +2248,7 @@
           <a:p>
             <a:fld id="{211EC6DF-777A-4142-B847-255B1624343C}" type="datetimeFigureOut">
               <a:rPr lang="en-US" smtClean="0"/>
-              <a:t>1/23/21</a:t>
+              <a:t>1/28/21</a:t>
             </a:fld>
             <a:endParaRPr lang="en-US"/>
           </a:p>
@@ -2655,7 +2660,7 @@
           <a:p>
             <a:fld id="{211EC6DF-777A-4142-B847-255B1624343C}" type="datetimeFigureOut">
               <a:rPr lang="en-US" smtClean="0"/>
-              <a:t>1/23/21</a:t>
+              <a:t>1/28/21</a:t>
             </a:fld>
             <a:endParaRPr lang="en-US"/>
           </a:p>
@@ -2807,7 +2812,7 @@
           <a:p>
             <a:fld id="{211EC6DF-777A-4142-B847-255B1624343C}" type="datetimeFigureOut">
               <a:rPr lang="en-US" smtClean="0"/>
-              <a:t>1/23/21</a:t>
+              <a:t>1/28/21</a:t>
             </a:fld>
             <a:endParaRPr lang="en-US"/>
           </a:p>
@@ -2920,7 +2925,7 @@
           <a:p>
             <a:fld id="{211EC6DF-777A-4142-B847-255B1624343C}" type="datetimeFigureOut">
               <a:rPr lang="en-US" smtClean="0"/>
-              <a:t>1/23/21</a:t>
+              <a:t>1/28/21</a:t>
             </a:fld>
             <a:endParaRPr lang="en-US"/>
           </a:p>
@@ -3231,7 +3236,7 @@
           <a:p>
             <a:fld id="{211EC6DF-777A-4142-B847-255B1624343C}" type="datetimeFigureOut">
               <a:rPr lang="en-US" smtClean="0"/>
-              <a:t>1/23/21</a:t>
+              <a:t>1/28/21</a:t>
             </a:fld>
             <a:endParaRPr lang="en-US"/>
           </a:p>
@@ -3519,7 +3524,7 @@
           <a:p>
             <a:fld id="{211EC6DF-777A-4142-B847-255B1624343C}" type="datetimeFigureOut">
               <a:rPr lang="en-US" smtClean="0"/>
-              <a:t>1/23/21</a:t>
+              <a:t>1/28/21</a:t>
             </a:fld>
             <a:endParaRPr lang="en-US"/>
           </a:p>
@@ -3760,7 +3765,7 @@
           <a:p>
             <a:fld id="{211EC6DF-777A-4142-B847-255B1624343C}" type="datetimeFigureOut">
               <a:rPr lang="en-US" smtClean="0"/>
-              <a:t>1/23/21</a:t>
+              <a:t>1/28/21</a:t>
             </a:fld>
             <a:endParaRPr lang="en-US"/>
           </a:p>
@@ -5935,10 +5940,10 @@
       </p:sp>
       <p:pic>
         <p:nvPicPr>
-          <p:cNvPr id="4" name="Picture 3">
-            <a:extLst>
-              <a:ext uri="{FF2B5EF4-FFF2-40B4-BE49-F238E27FC236}">
-                <a16:creationId xmlns:a16="http://schemas.microsoft.com/office/drawing/2014/main" id="{D4BE3F9A-3177-5F44-9FC0-03C062A0ADA3}"/>
+          <p:cNvPr id="5" name="Picture 4">
+            <a:extLst>
+              <a:ext uri="{FF2B5EF4-FFF2-40B4-BE49-F238E27FC236}">
+                <a16:creationId xmlns:a16="http://schemas.microsoft.com/office/drawing/2014/main" id="{A61EC309-DF08-DF43-9C98-0ABAFDCC48E3}"/>
               </a:ext>
             </a:extLst>
           </p:cNvPr>
@@ -5955,8 +5960,8 @@
         </p:blipFill>
         <p:spPr>
           <a:xfrm>
-            <a:off x="838200" y="2377011"/>
-            <a:ext cx="5613400" cy="3441700"/>
+            <a:off x="838200" y="2834340"/>
+            <a:ext cx="4906281" cy="998126"/>
           </a:xfrm>
           <a:prstGeom prst="rect">
             <a:avLst/>
@@ -5965,10 +5970,10 @@
       </p:pic>
       <p:pic>
         <p:nvPicPr>
-          <p:cNvPr id="5" name="Picture 4">
-            <a:extLst>
-              <a:ext uri="{FF2B5EF4-FFF2-40B4-BE49-F238E27FC236}">
-                <a16:creationId xmlns:a16="http://schemas.microsoft.com/office/drawing/2014/main" id="{A61EC309-DF08-DF43-9C98-0ABAFDCC48E3}"/>
+          <p:cNvPr id="6" name="Picture 5">
+            <a:extLst>
+              <a:ext uri="{FF2B5EF4-FFF2-40B4-BE49-F238E27FC236}">
+                <a16:creationId xmlns:a16="http://schemas.microsoft.com/office/drawing/2014/main" id="{6851049C-7157-D540-A041-2C18A4A85F8D}"/>
               </a:ext>
             </a:extLst>
           </p:cNvPr>
@@ -5985,8 +5990,8 @@
         </p:blipFill>
         <p:spPr>
           <a:xfrm>
-            <a:off x="838200" y="5703119"/>
-            <a:ext cx="4906281" cy="998126"/>
+            <a:off x="972094" y="1643154"/>
+            <a:ext cx="3439819" cy="901700"/>
           </a:xfrm>
           <a:prstGeom prst="rect">
             <a:avLst/>
@@ -5995,10 +6000,10 @@
       </p:pic>
       <p:pic>
         <p:nvPicPr>
-          <p:cNvPr id="6" name="Picture 5">
-            <a:extLst>
-              <a:ext uri="{FF2B5EF4-FFF2-40B4-BE49-F238E27FC236}">
-                <a16:creationId xmlns:a16="http://schemas.microsoft.com/office/drawing/2014/main" id="{6851049C-7157-D540-A041-2C18A4A85F8D}"/>
+          <p:cNvPr id="3" name="Picture 2">
+            <a:extLst>
+              <a:ext uri="{FF2B5EF4-FFF2-40B4-BE49-F238E27FC236}">
+                <a16:creationId xmlns:a16="http://schemas.microsoft.com/office/drawing/2014/main" id="{AEAEF71C-6911-C949-9964-5075BD151A68}"/>
               </a:ext>
             </a:extLst>
           </p:cNvPr>
@@ -6015,8 +6020,8 @@
         </p:blipFill>
         <p:spPr>
           <a:xfrm>
-            <a:off x="972094" y="1643154"/>
-            <a:ext cx="3439819" cy="901700"/>
+            <a:off x="5983967" y="2006817"/>
+            <a:ext cx="5837919" cy="3989034"/>
           </a:xfrm>
           <a:prstGeom prst="rect">
             <a:avLst/>
@@ -6420,43 +6425,66 @@
       </p:grpSpPr>
       <p:sp>
         <p:nvSpPr>
-          <p:cNvPr id="3" name="TextBox 2">
-            <a:extLst>
-              <a:ext uri="{FF2B5EF4-FFF2-40B4-BE49-F238E27FC236}">
-                <a16:creationId xmlns:a16="http://schemas.microsoft.com/office/drawing/2014/main" id="{D639DFBB-76B2-E64D-91BA-C82ACDE98D30}"/>
-              </a:ext>
-            </a:extLst>
-          </p:cNvPr>
-          <p:cNvSpPr txBox="1"/>
+          <p:cNvPr id="2" name="Title 1">
+            <a:extLst>
+              <a:ext uri="{FF2B5EF4-FFF2-40B4-BE49-F238E27FC236}">
+                <a16:creationId xmlns:a16="http://schemas.microsoft.com/office/drawing/2014/main" id="{FB083C70-CE6A-A64E-AF7C-522A28583B07}"/>
+              </a:ext>
+            </a:extLst>
+          </p:cNvPr>
+          <p:cNvSpPr>
+            <a:spLocks noGrp="1"/>
+          </p:cNvSpPr>
+          <p:nvPr>
+            <p:ph type="title"/>
+          </p:nvPr>
+        </p:nvSpPr>
+        <p:spPr/>
+        <p:txBody>
+          <a:bodyPr/>
+          <a:lstStyle/>
+          <a:p>
+            <a:r>
+              <a:rPr lang="en-US" dirty="0"/>
+              <a:t>Isn’t there a package for this? </a:t>
+            </a:r>
+          </a:p>
+        </p:txBody>
+      </p:sp>
+      <p:pic>
+        <p:nvPicPr>
+          <p:cNvPr id="3" name="Picture 2">
+            <a:extLst>
+              <a:ext uri="{FF2B5EF4-FFF2-40B4-BE49-F238E27FC236}">
+                <a16:creationId xmlns:a16="http://schemas.microsoft.com/office/drawing/2014/main" id="{765D9960-09E7-2145-9F1A-D1E4EAFA50C2}"/>
+              </a:ext>
+            </a:extLst>
+          </p:cNvPr>
+          <p:cNvPicPr>
+            <a:picLocks noChangeAspect="1"/>
+          </p:cNvPicPr>
           <p:nvPr/>
-        </p:nvSpPr>
-        <p:spPr>
-          <a:xfrm>
-            <a:off x="4526165" y="2967200"/>
-            <a:ext cx="3401893" cy="1569660"/>
+        </p:nvPicPr>
+        <p:blipFill>
+          <a:blip r:embed="rId2"/>
+          <a:stretch>
+            <a:fillRect/>
+          </a:stretch>
+        </p:blipFill>
+        <p:spPr>
+          <a:xfrm>
+            <a:off x="838200" y="1353668"/>
+            <a:ext cx="8451127" cy="5061515"/>
           </a:xfrm>
           <a:prstGeom prst="rect">
             <a:avLst/>
           </a:prstGeom>
-          <a:noFill/>
-        </p:spPr>
-        <p:txBody>
-          <a:bodyPr wrap="none" rtlCol="0">
-            <a:spAutoFit/>
-          </a:bodyPr>
-          <a:lstStyle/>
-          <a:p>
-            <a:r>
-              <a:rPr lang="en-US" sz="9600" dirty="0"/>
-              <a:t>Q &amp; A </a:t>
-            </a:r>
-          </a:p>
-        </p:txBody>
-      </p:sp>
+        </p:spPr>
+      </p:pic>
     </p:spTree>
     <p:extLst>
       <p:ext uri="{BB962C8B-B14F-4D97-AF65-F5344CB8AC3E}">
-        <p14:creationId xmlns:p14="http://schemas.microsoft.com/office/powerpoint/2010/main" val="3085140371"/>
+        <p14:creationId xmlns:p14="http://schemas.microsoft.com/office/powerpoint/2010/main" val="1906474577"/>
       </p:ext>
     </p:extLst>
   </p:cSld>
@@ -6488,7 +6516,7 @@
           <p:cNvPr id="2" name="Title 1">
             <a:extLst>
               <a:ext uri="{FF2B5EF4-FFF2-40B4-BE49-F238E27FC236}">
-                <a16:creationId xmlns:a16="http://schemas.microsoft.com/office/drawing/2014/main" id="{6092EAB6-FFEF-B54D-886F-29B8FBD73691}"/>
+                <a16:creationId xmlns:a16="http://schemas.microsoft.com/office/drawing/2014/main" id="{F61CA35B-2393-5747-8980-6B751ECE3AD8}"/>
               </a:ext>
             </a:extLst>
           </p:cNvPr>
@@ -6501,22 +6529,32 @@
         </p:nvSpPr>
         <p:spPr/>
         <p:txBody>
-          <a:bodyPr/>
-          <a:lstStyle/>
-          <a:p>
-            <a:r>
-              <a:rPr lang="en-US" dirty="0"/>
-              <a:t>About Len</a:t>
+          <a:bodyPr>
+            <a:normAutofit fontScale="90000"/>
+          </a:bodyPr>
+          <a:lstStyle/>
+          <a:p>
+            <a:r>
+              <a:rPr lang="en-US" dirty="0"/>
+              <a:t>A </a:t>
+            </a:r>
+            <a:r>
+              <a:rPr lang="en-US" dirty="0" err="1"/>
+              <a:t>hipread</a:t>
+            </a:r>
+            <a:r>
+              <a:rPr lang="en-US" dirty="0"/>
+              <a:t> solution: read the person dictionary</a:t>
             </a:r>
           </a:p>
         </p:txBody>
       </p:sp>
       <p:pic>
         <p:nvPicPr>
-          <p:cNvPr id="4" name="Picture 3">
-            <a:extLst>
-              <a:ext uri="{FF2B5EF4-FFF2-40B4-BE49-F238E27FC236}">
-                <a16:creationId xmlns:a16="http://schemas.microsoft.com/office/drawing/2014/main" id="{F5842CDC-9BCF-ED4A-B142-F82CFFC48374}"/>
+          <p:cNvPr id="3" name="Picture 2">
+            <a:extLst>
+              <a:ext uri="{FF2B5EF4-FFF2-40B4-BE49-F238E27FC236}">
+                <a16:creationId xmlns:a16="http://schemas.microsoft.com/office/drawing/2014/main" id="{482E74BD-708D-3F4A-9802-41D2F4E92641}"/>
               </a:ext>
             </a:extLst>
           </p:cNvPr>
@@ -6533,62 +6571,329 @@
         </p:blipFill>
         <p:spPr>
           <a:xfrm>
-            <a:off x="838200" y="1487692"/>
-            <a:ext cx="1828800" cy="1848679"/>
+            <a:off x="838200" y="1099638"/>
+            <a:ext cx="6858000" cy="5651500"/>
           </a:xfrm>
           <a:prstGeom prst="rect">
             <a:avLst/>
           </a:prstGeom>
         </p:spPr>
       </p:pic>
-      <p:sp>
-        <p:nvSpPr>
-          <p:cNvPr id="5" name="TextBox 4">
-            <a:extLst>
-              <a:ext uri="{FF2B5EF4-FFF2-40B4-BE49-F238E27FC236}">
-                <a16:creationId xmlns:a16="http://schemas.microsoft.com/office/drawing/2014/main" id="{6414056E-90F6-7344-ACA0-21B67F079388}"/>
-              </a:ext>
-            </a:extLst>
-          </p:cNvPr>
-          <p:cNvSpPr txBox="1"/>
+    </p:spTree>
+    <p:extLst>
+      <p:ext uri="{BB962C8B-B14F-4D97-AF65-F5344CB8AC3E}">
+        <p14:creationId xmlns:p14="http://schemas.microsoft.com/office/powerpoint/2010/main" val="695434590"/>
+      </p:ext>
+    </p:extLst>
+  </p:cSld>
+  <p:clrMapOvr>
+    <a:masterClrMapping/>
+  </p:clrMapOvr>
+</p:sld>
+</file>
+
+<file path=ppt/slides/slide27.xml><?xml version="1.0" encoding="utf-8"?>
+<p:sld xmlns:a="http://schemas.openxmlformats.org/drawingml/2006/main" xmlns:r="http://schemas.openxmlformats.org/officeDocument/2006/relationships" xmlns:p="http://schemas.openxmlformats.org/presentationml/2006/main">
+  <p:cSld>
+    <p:spTree>
+      <p:nvGrpSpPr>
+        <p:cNvPr id="1" name=""/>
+        <p:cNvGrpSpPr/>
+        <p:nvPr/>
+      </p:nvGrpSpPr>
+      <p:grpSpPr>
+        <a:xfrm>
+          <a:off x="0" y="0"/>
+          <a:ext cx="0" cy="0"/>
+          <a:chOff x="0" y="0"/>
+          <a:chExt cx="0" cy="0"/>
+        </a:xfrm>
+      </p:grpSpPr>
+      <p:sp>
+        <p:nvSpPr>
+          <p:cNvPr id="2" name="Title 1">
+            <a:extLst>
+              <a:ext uri="{FF2B5EF4-FFF2-40B4-BE49-F238E27FC236}">
+                <a16:creationId xmlns:a16="http://schemas.microsoft.com/office/drawing/2014/main" id="{F61CA35B-2393-5747-8980-6B751ECE3AD8}"/>
+              </a:ext>
+            </a:extLst>
+          </p:cNvPr>
+          <p:cNvSpPr>
+            <a:spLocks noGrp="1"/>
+          </p:cNvSpPr>
+          <p:nvPr>
+            <p:ph type="title"/>
+          </p:nvPr>
+        </p:nvSpPr>
+        <p:spPr/>
+        <p:txBody>
+          <a:bodyPr>
+            <a:normAutofit fontScale="90000"/>
+          </a:bodyPr>
+          <a:lstStyle/>
+          <a:p>
+            <a:r>
+              <a:rPr lang="en-US" dirty="0"/>
+              <a:t>A </a:t>
+            </a:r>
+            <a:r>
+              <a:rPr lang="en-US" dirty="0" err="1"/>
+              <a:t>hipread</a:t>
+            </a:r>
+            <a:r>
+              <a:rPr lang="en-US" dirty="0"/>
+              <a:t> solution: read the household dictionary</a:t>
+            </a:r>
+          </a:p>
+        </p:txBody>
+      </p:sp>
+      <p:pic>
+        <p:nvPicPr>
+          <p:cNvPr id="4" name="Picture 3">
+            <a:extLst>
+              <a:ext uri="{FF2B5EF4-FFF2-40B4-BE49-F238E27FC236}">
+                <a16:creationId xmlns:a16="http://schemas.microsoft.com/office/drawing/2014/main" id="{929C6334-2C05-C744-81F6-D5E7101FB735}"/>
+              </a:ext>
+            </a:extLst>
+          </p:cNvPr>
+          <p:cNvPicPr>
+            <a:picLocks noChangeAspect="1"/>
+          </p:cNvPicPr>
           <p:nvPr/>
-        </p:nvSpPr>
-        <p:spPr>
-          <a:xfrm>
-            <a:off x="1456297" y="3810270"/>
-            <a:ext cx="2116605" cy="369332"/>
+        </p:nvPicPr>
+        <p:blipFill>
+          <a:blip r:embed="rId2"/>
+          <a:stretch>
+            <a:fillRect/>
+          </a:stretch>
+        </p:blipFill>
+        <p:spPr>
+          <a:xfrm>
+            <a:off x="838200" y="1353668"/>
+            <a:ext cx="7353300" cy="4965700"/>
           </a:xfrm>
           <a:prstGeom prst="rect">
             <a:avLst/>
           </a:prstGeom>
-          <a:noFill/>
-        </p:spPr>
-        <p:txBody>
-          <a:bodyPr wrap="none" rtlCol="0">
-            <a:spAutoFit/>
-          </a:bodyPr>
-          <a:lstStyle/>
-          <a:p>
-            <a:r>
-              <a:rPr lang="en-US" dirty="0"/>
-              <a:t> </a:t>
-            </a:r>
-            <a:r>
-              <a:rPr lang="en-US" dirty="0">
-                <a:hlinkClick r:id="rId3"/>
-              </a:rPr>
-              <a:t>len@greskilabs.com</a:t>
+        </p:spPr>
+      </p:pic>
+    </p:spTree>
+    <p:extLst>
+      <p:ext uri="{BB962C8B-B14F-4D97-AF65-F5344CB8AC3E}">
+        <p14:creationId xmlns:p14="http://schemas.microsoft.com/office/powerpoint/2010/main" val="1500190499"/>
+      </p:ext>
+    </p:extLst>
+  </p:cSld>
+  <p:clrMapOvr>
+    <a:masterClrMapping/>
+  </p:clrMapOvr>
+</p:sld>
+</file>
+
+<file path=ppt/slides/slide28.xml><?xml version="1.0" encoding="utf-8"?>
+<p:sld xmlns:a="http://schemas.openxmlformats.org/drawingml/2006/main" xmlns:r="http://schemas.openxmlformats.org/officeDocument/2006/relationships" xmlns:p="http://schemas.openxmlformats.org/presentationml/2006/main">
+  <p:cSld>
+    <p:spTree>
+      <p:nvGrpSpPr>
+        <p:cNvPr id="1" name=""/>
+        <p:cNvGrpSpPr/>
+        <p:nvPr/>
+      </p:nvGrpSpPr>
+      <p:grpSpPr>
+        <a:xfrm>
+          <a:off x="0" y="0"/>
+          <a:ext cx="0" cy="0"/>
+          <a:chOff x="0" y="0"/>
+          <a:chExt cx="0" cy="0"/>
+        </a:xfrm>
+      </p:grpSpPr>
+      <p:sp>
+        <p:nvSpPr>
+          <p:cNvPr id="2" name="Title 1">
+            <a:extLst>
+              <a:ext uri="{FF2B5EF4-FFF2-40B4-BE49-F238E27FC236}">
+                <a16:creationId xmlns:a16="http://schemas.microsoft.com/office/drawing/2014/main" id="{67B1F003-586D-974A-9A30-6C102862E33B}"/>
+              </a:ext>
+            </a:extLst>
+          </p:cNvPr>
+          <p:cNvSpPr>
+            <a:spLocks noGrp="1"/>
+          </p:cNvSpPr>
+          <p:nvPr>
+            <p:ph type="title"/>
+          </p:nvPr>
+        </p:nvSpPr>
+        <p:spPr/>
+        <p:txBody>
+          <a:bodyPr/>
+          <a:lstStyle/>
+          <a:p>
+            <a:r>
+              <a:rPr lang="en-US" dirty="0"/>
+              <a:t>…and then read the raw </a:t>
+            </a:r>
+            <a:r>
+              <a:rPr lang="en-US" dirty="0" err="1"/>
+              <a:t>datra</a:t>
             </a:r>
             <a:endParaRPr lang="en-US" dirty="0"/>
           </a:p>
         </p:txBody>
       </p:sp>
+      <p:pic>
+        <p:nvPicPr>
+          <p:cNvPr id="3" name="Picture 2">
+            <a:extLst>
+              <a:ext uri="{FF2B5EF4-FFF2-40B4-BE49-F238E27FC236}">
+                <a16:creationId xmlns:a16="http://schemas.microsoft.com/office/drawing/2014/main" id="{CCBE7FD0-CF51-DF4F-B1DF-CB8D9DF76970}"/>
+              </a:ext>
+            </a:extLst>
+          </p:cNvPr>
+          <p:cNvPicPr>
+            <a:picLocks noChangeAspect="1"/>
+          </p:cNvPicPr>
+          <p:nvPr/>
+        </p:nvPicPr>
+        <p:blipFill>
+          <a:blip r:embed="rId2"/>
+          <a:stretch>
+            <a:fillRect/>
+          </a:stretch>
+        </p:blipFill>
+        <p:spPr>
+          <a:xfrm>
+            <a:off x="934901" y="1546497"/>
+            <a:ext cx="4025900" cy="3556000"/>
+          </a:xfrm>
+          <a:prstGeom prst="rect">
+            <a:avLst/>
+          </a:prstGeom>
+        </p:spPr>
+      </p:pic>
+    </p:spTree>
+    <p:extLst>
+      <p:ext uri="{BB962C8B-B14F-4D97-AF65-F5344CB8AC3E}">
+        <p14:creationId xmlns:p14="http://schemas.microsoft.com/office/powerpoint/2010/main" val="2618030611"/>
+      </p:ext>
+    </p:extLst>
+  </p:cSld>
+  <p:clrMapOvr>
+    <a:masterClrMapping/>
+  </p:clrMapOvr>
+</p:sld>
+</file>
+
+<file path=ppt/slides/slide29.xml><?xml version="1.0" encoding="utf-8"?>
+<p:sld xmlns:a="http://schemas.openxmlformats.org/drawingml/2006/main" xmlns:r="http://schemas.openxmlformats.org/officeDocument/2006/relationships" xmlns:p="http://schemas.openxmlformats.org/presentationml/2006/main">
+  <p:cSld>
+    <p:spTree>
+      <p:nvGrpSpPr>
+        <p:cNvPr id="1" name=""/>
+        <p:cNvGrpSpPr/>
+        <p:nvPr/>
+      </p:nvGrpSpPr>
+      <p:grpSpPr>
+        <a:xfrm>
+          <a:off x="0" y="0"/>
+          <a:ext cx="0" cy="0"/>
+          <a:chOff x="0" y="0"/>
+          <a:chExt cx="0" cy="0"/>
+        </a:xfrm>
+      </p:grpSpPr>
+      <p:sp>
+        <p:nvSpPr>
+          <p:cNvPr id="2" name="Title 1">
+            <a:extLst>
+              <a:ext uri="{FF2B5EF4-FFF2-40B4-BE49-F238E27FC236}">
+                <a16:creationId xmlns:a16="http://schemas.microsoft.com/office/drawing/2014/main" id="{B05B8F72-AD83-2242-9A62-445E7C4B0A98}"/>
+              </a:ext>
+            </a:extLst>
+          </p:cNvPr>
+          <p:cNvSpPr>
+            <a:spLocks noGrp="1"/>
+          </p:cNvSpPr>
+          <p:nvPr>
+            <p:ph type="title"/>
+          </p:nvPr>
+        </p:nvSpPr>
+        <p:spPr/>
+        <p:txBody>
+          <a:bodyPr/>
+          <a:lstStyle/>
+          <a:p>
+            <a:r>
+              <a:rPr lang="en-US" dirty="0"/>
+              <a:t>Verifying results</a:t>
+            </a:r>
+          </a:p>
+        </p:txBody>
+      </p:sp>
+      <p:pic>
+        <p:nvPicPr>
+          <p:cNvPr id="3" name="Picture 2">
+            <a:extLst>
+              <a:ext uri="{FF2B5EF4-FFF2-40B4-BE49-F238E27FC236}">
+                <a16:creationId xmlns:a16="http://schemas.microsoft.com/office/drawing/2014/main" id="{9199331C-2357-A149-B67A-DC9D6A54AB7E}"/>
+              </a:ext>
+            </a:extLst>
+          </p:cNvPr>
+          <p:cNvPicPr>
+            <a:picLocks noChangeAspect="1"/>
+          </p:cNvPicPr>
+          <p:nvPr/>
+        </p:nvPicPr>
+        <p:blipFill>
+          <a:blip r:embed="rId2"/>
+          <a:stretch>
+            <a:fillRect/>
+          </a:stretch>
+        </p:blipFill>
+        <p:spPr>
+          <a:xfrm>
+            <a:off x="838200" y="1649186"/>
+            <a:ext cx="3873500" cy="1600200"/>
+          </a:xfrm>
+          <a:prstGeom prst="rect">
+            <a:avLst/>
+          </a:prstGeom>
+        </p:spPr>
+      </p:pic>
+      <p:pic>
+        <p:nvPicPr>
+          <p:cNvPr id="4" name="Picture 3">
+            <a:extLst>
+              <a:ext uri="{FF2B5EF4-FFF2-40B4-BE49-F238E27FC236}">
+                <a16:creationId xmlns:a16="http://schemas.microsoft.com/office/drawing/2014/main" id="{432DD9E0-A351-184A-A0B1-CC905A7D3422}"/>
+              </a:ext>
+            </a:extLst>
+          </p:cNvPr>
+          <p:cNvPicPr>
+            <a:picLocks noChangeAspect="1"/>
+          </p:cNvPicPr>
+          <p:nvPr/>
+        </p:nvPicPr>
+        <p:blipFill>
+          <a:blip r:embed="rId3"/>
+          <a:stretch>
+            <a:fillRect/>
+          </a:stretch>
+        </p:blipFill>
+        <p:spPr>
+          <a:xfrm>
+            <a:off x="838200" y="3765187"/>
+            <a:ext cx="4419600" cy="2044700"/>
+          </a:xfrm>
+          <a:prstGeom prst="rect">
+            <a:avLst/>
+          </a:prstGeom>
+        </p:spPr>
+      </p:pic>
       <p:pic>
         <p:nvPicPr>
           <p:cNvPr id="6" name="Picture 5">
             <a:extLst>
               <a:ext uri="{FF2B5EF4-FFF2-40B4-BE49-F238E27FC236}">
-                <a16:creationId xmlns:a16="http://schemas.microsoft.com/office/drawing/2014/main" id="{C78A498D-59ED-254A-8EA3-0F3D3158DAB6}"/>
+                <a16:creationId xmlns:a16="http://schemas.microsoft.com/office/drawing/2014/main" id="{A7076E3E-00C7-6940-A7CD-E12E0B8C0309}"/>
               </a:ext>
             </a:extLst>
           </p:cNvPr>
@@ -6605,394 +6910,8 @@
         </p:blipFill>
         <p:spPr>
           <a:xfrm>
-            <a:off x="912737" y="4410881"/>
-            <a:ext cx="355600" cy="368300"/>
-          </a:xfrm>
-          <a:prstGeom prst="rect">
-            <a:avLst/>
-          </a:prstGeom>
-        </p:spPr>
-      </p:pic>
-      <p:pic>
-        <p:nvPicPr>
-          <p:cNvPr id="7" name="Picture 6">
-            <a:extLst>
-              <a:ext uri="{FF2B5EF4-FFF2-40B4-BE49-F238E27FC236}">
-                <a16:creationId xmlns:a16="http://schemas.microsoft.com/office/drawing/2014/main" id="{8564C8CC-7A1B-5848-BB26-0560A3F83B9A}"/>
-              </a:ext>
-            </a:extLst>
-          </p:cNvPr>
-          <p:cNvPicPr>
-            <a:picLocks noChangeAspect="1"/>
-          </p:cNvPicPr>
-          <p:nvPr/>
-        </p:nvPicPr>
-        <p:blipFill>
-          <a:blip r:embed="rId5"/>
-          <a:stretch>
-            <a:fillRect/>
-          </a:stretch>
-        </p:blipFill>
-        <p:spPr>
-          <a:xfrm>
-            <a:off x="882257" y="3810270"/>
-            <a:ext cx="419100" cy="419100"/>
-          </a:xfrm>
-          <a:prstGeom prst="rect">
-            <a:avLst/>
-          </a:prstGeom>
-        </p:spPr>
-      </p:pic>
-      <p:sp>
-        <p:nvSpPr>
-          <p:cNvPr id="8" name="TextBox 7">
-            <a:extLst>
-              <a:ext uri="{FF2B5EF4-FFF2-40B4-BE49-F238E27FC236}">
-                <a16:creationId xmlns:a16="http://schemas.microsoft.com/office/drawing/2014/main" id="{C121EDAC-2901-CC45-A0A7-8D75B4C1AB41}"/>
-              </a:ext>
-            </a:extLst>
-          </p:cNvPr>
-          <p:cNvSpPr txBox="1"/>
-          <p:nvPr/>
-        </p:nvSpPr>
-        <p:spPr>
-          <a:xfrm>
-            <a:off x="1456297" y="4296832"/>
-            <a:ext cx="838884" cy="369332"/>
-          </a:xfrm>
-          <a:prstGeom prst="rect">
-            <a:avLst/>
-          </a:prstGeom>
-          <a:noFill/>
-        </p:spPr>
-        <p:txBody>
-          <a:bodyPr wrap="none" rtlCol="0">
-            <a:spAutoFit/>
-          </a:bodyPr>
-          <a:lstStyle/>
-          <a:p>
-            <a:r>
-              <a:rPr lang="en-US" dirty="0"/>
-              <a:t> </a:t>
-            </a:r>
-            <a:r>
-              <a:rPr lang="en-US" dirty="0" err="1"/>
-              <a:t>lgreski</a:t>
-            </a:r>
-            <a:endParaRPr lang="en-US" dirty="0"/>
-          </a:p>
-        </p:txBody>
-      </p:sp>
-      <p:sp>
-        <p:nvSpPr>
-          <p:cNvPr id="9" name="TextBox 8">
-            <a:extLst>
-              <a:ext uri="{FF2B5EF4-FFF2-40B4-BE49-F238E27FC236}">
-                <a16:creationId xmlns:a16="http://schemas.microsoft.com/office/drawing/2014/main" id="{F66CC08F-50EB-9442-9382-9749498C8D6E}"/>
-              </a:ext>
-            </a:extLst>
-          </p:cNvPr>
-          <p:cNvSpPr txBox="1"/>
-          <p:nvPr/>
-        </p:nvSpPr>
-        <p:spPr>
-          <a:xfrm>
-            <a:off x="1456297" y="4609946"/>
-            <a:ext cx="8283101" cy="369332"/>
-          </a:xfrm>
-          <a:prstGeom prst="rect">
-            <a:avLst/>
-          </a:prstGeom>
-          <a:noFill/>
-        </p:spPr>
-        <p:txBody>
-          <a:bodyPr wrap="none" rtlCol="0">
-            <a:spAutoFit/>
-          </a:bodyPr>
-          <a:lstStyle/>
-          <a:p>
-            <a:r>
-              <a:rPr lang="en-US" dirty="0"/>
-              <a:t> </a:t>
-            </a:r>
-            <a:r>
-              <a:rPr lang="en-US" dirty="0" err="1"/>
-              <a:t>lgreski</a:t>
-            </a:r>
-            <a:r>
-              <a:rPr lang="en-US" dirty="0"/>
-              <a:t>/</a:t>
-            </a:r>
-            <a:r>
-              <a:rPr lang="en-US" dirty="0" err="1"/>
-              <a:t>readingFilesInR</a:t>
-            </a:r>
-            <a:r>
-              <a:rPr lang="en-US" dirty="0"/>
-              <a:t> – repository where tonight’s code and presentation are stored </a:t>
-            </a:r>
-          </a:p>
-        </p:txBody>
-      </p:sp>
-      <p:pic>
-        <p:nvPicPr>
-          <p:cNvPr id="10" name="Picture 9">
-            <a:extLst>
-              <a:ext uri="{FF2B5EF4-FFF2-40B4-BE49-F238E27FC236}">
-                <a16:creationId xmlns:a16="http://schemas.microsoft.com/office/drawing/2014/main" id="{939D18BB-69F5-B443-91B0-AB1B112D102A}"/>
-              </a:ext>
-            </a:extLst>
-          </p:cNvPr>
-          <p:cNvPicPr>
-            <a:picLocks noChangeAspect="1"/>
-          </p:cNvPicPr>
-          <p:nvPr/>
-        </p:nvPicPr>
-        <p:blipFill>
-          <a:blip r:embed="rId6"/>
-          <a:stretch>
-            <a:fillRect/>
-          </a:stretch>
-        </p:blipFill>
-        <p:spPr>
-          <a:xfrm>
-            <a:off x="894957" y="5026221"/>
-            <a:ext cx="406400" cy="406400"/>
-          </a:xfrm>
-          <a:prstGeom prst="rect">
-            <a:avLst/>
-          </a:prstGeom>
-        </p:spPr>
-      </p:pic>
-      <p:sp>
-        <p:nvSpPr>
-          <p:cNvPr id="11" name="TextBox 10">
-            <a:extLst>
-              <a:ext uri="{FF2B5EF4-FFF2-40B4-BE49-F238E27FC236}">
-                <a16:creationId xmlns:a16="http://schemas.microsoft.com/office/drawing/2014/main" id="{821E509B-E0B5-984D-8495-D099B3C62B4E}"/>
-              </a:ext>
-            </a:extLst>
-          </p:cNvPr>
-          <p:cNvSpPr txBox="1"/>
-          <p:nvPr/>
-        </p:nvSpPr>
-        <p:spPr>
-          <a:xfrm>
-            <a:off x="1456297" y="5044755"/>
-            <a:ext cx="838884" cy="369332"/>
-          </a:xfrm>
-          <a:prstGeom prst="rect">
-            <a:avLst/>
-          </a:prstGeom>
-          <a:noFill/>
-        </p:spPr>
-        <p:txBody>
-          <a:bodyPr wrap="none" rtlCol="0">
-            <a:spAutoFit/>
-          </a:bodyPr>
-          <a:lstStyle/>
-          <a:p>
-            <a:r>
-              <a:rPr lang="en-US" dirty="0"/>
-              <a:t> </a:t>
-            </a:r>
-            <a:r>
-              <a:rPr lang="en-US" dirty="0" err="1"/>
-              <a:t>lgreski</a:t>
-            </a:r>
-            <a:endParaRPr lang="en-US" dirty="0"/>
-          </a:p>
-        </p:txBody>
-      </p:sp>
-      <p:pic>
-        <p:nvPicPr>
-          <p:cNvPr id="12" name="Picture 11">
-            <a:extLst>
-              <a:ext uri="{FF2B5EF4-FFF2-40B4-BE49-F238E27FC236}">
-                <a16:creationId xmlns:a16="http://schemas.microsoft.com/office/drawing/2014/main" id="{E258D6E7-31DF-B841-B3A5-67880E34E6C6}"/>
-              </a:ext>
-            </a:extLst>
-          </p:cNvPr>
-          <p:cNvPicPr>
-            <a:picLocks noChangeAspect="1"/>
-          </p:cNvPicPr>
-          <p:nvPr/>
-        </p:nvPicPr>
-        <p:blipFill>
-          <a:blip r:embed="rId7"/>
-          <a:stretch>
-            <a:fillRect/>
-          </a:stretch>
-        </p:blipFill>
-        <p:spPr>
-          <a:xfrm>
-            <a:off x="822013" y="5531999"/>
-            <a:ext cx="537047" cy="537047"/>
-          </a:xfrm>
-          <a:prstGeom prst="rect">
-            <a:avLst/>
-          </a:prstGeom>
-        </p:spPr>
-      </p:pic>
-      <p:sp>
-        <p:nvSpPr>
-          <p:cNvPr id="13" name="TextBox 12">
-            <a:extLst>
-              <a:ext uri="{FF2B5EF4-FFF2-40B4-BE49-F238E27FC236}">
-                <a16:creationId xmlns:a16="http://schemas.microsoft.com/office/drawing/2014/main" id="{C7BC55D7-BE16-0543-9D90-8400CC766953}"/>
-              </a:ext>
-            </a:extLst>
-          </p:cNvPr>
-          <p:cNvSpPr txBox="1"/>
-          <p:nvPr/>
-        </p:nvSpPr>
-        <p:spPr>
-          <a:xfrm>
-            <a:off x="1456297" y="5615856"/>
-            <a:ext cx="6703182" cy="369332"/>
-          </a:xfrm>
-          <a:prstGeom prst="rect">
-            <a:avLst/>
-          </a:prstGeom>
-          <a:noFill/>
-        </p:spPr>
-        <p:txBody>
-          <a:bodyPr wrap="none" rtlCol="0">
-            <a:spAutoFit/>
-          </a:bodyPr>
-          <a:lstStyle/>
-          <a:p>
-            <a:r>
-              <a:rPr lang="en-US" dirty="0"/>
-              <a:t> Data Science Depot blog: </a:t>
-            </a:r>
-            <a:r>
-              <a:rPr lang="en-US" dirty="0">
-                <a:hlinkClick r:id="rId8"/>
-              </a:rPr>
-              <a:t>https://lgreski.github.io/datasciencedepot/</a:t>
-            </a:r>
-            <a:r>
-              <a:rPr lang="en-US" dirty="0"/>
-              <a:t> </a:t>
-            </a:r>
-          </a:p>
-        </p:txBody>
-      </p:sp>
-      <p:sp>
-        <p:nvSpPr>
-          <p:cNvPr id="14" name="TextBox 13">
-            <a:extLst>
-              <a:ext uri="{FF2B5EF4-FFF2-40B4-BE49-F238E27FC236}">
-                <a16:creationId xmlns:a16="http://schemas.microsoft.com/office/drawing/2014/main" id="{A9F10A48-1AA5-F144-818F-BACDFEE8248C}"/>
-              </a:ext>
-            </a:extLst>
-          </p:cNvPr>
-          <p:cNvSpPr txBox="1"/>
-          <p:nvPr/>
-        </p:nvSpPr>
-        <p:spPr>
-          <a:xfrm>
-            <a:off x="2865120" y="1384844"/>
-            <a:ext cx="8883009" cy="2308324"/>
-          </a:xfrm>
-          <a:prstGeom prst="rect">
-            <a:avLst/>
-          </a:prstGeom>
-          <a:noFill/>
-        </p:spPr>
-        <p:txBody>
-          <a:bodyPr wrap="none" rtlCol="0">
-            <a:spAutoFit/>
-          </a:bodyPr>
-          <a:lstStyle/>
-          <a:p>
-            <a:r>
-              <a:rPr lang="en-US" dirty="0"/>
-              <a:t>Len Greski currently serves as Principal Consultant at LeadingAgile, the leader in helping large</a:t>
-            </a:r>
-            <a:br>
-              <a:rPr lang="en-US" dirty="0"/>
-            </a:br>
-            <a:r>
-              <a:rPr lang="en-US" dirty="0"/>
-              <a:t>companies generate economic value through agile transformation. Len started his </a:t>
-            </a:r>
-            <a:br>
-              <a:rPr lang="en-US" dirty="0"/>
-            </a:br>
-            <a:r>
-              <a:rPr lang="en-US" dirty="0"/>
-              <a:t>career at Information Resources Inc., developing statistical and AI models to predict</a:t>
-            </a:r>
-            <a:br>
-              <a:rPr lang="en-US" dirty="0"/>
-            </a:br>
-            <a:r>
-              <a:rPr lang="en-US" dirty="0"/>
-              <a:t>consumer behavior. He learned R in 2015 when he needed a way to analyze the value of a </a:t>
-            </a:r>
-            <a:br>
-              <a:rPr lang="en-US" dirty="0"/>
-            </a:br>
-            <a:r>
-              <a:rPr lang="en-US" dirty="0"/>
-              <a:t>software portfolio without spending $9,000 on a copy of SAS.  Len has mentored hundreds </a:t>
-            </a:r>
-          </a:p>
-          <a:p>
-            <a:r>
-              <a:rPr lang="en-US" dirty="0"/>
-              <a:t>of thousands of students in the Johns Hopkins University Data Science Specialization on </a:t>
-            </a:r>
-          </a:p>
-          <a:p>
-            <a:r>
-              <a:rPr lang="en-US" dirty="0"/>
-              <a:t>Coursera, having served as a Community Mentor since 2015.  Len has a top 5% </a:t>
-            </a:r>
-            <a:br>
-              <a:rPr lang="en-US" dirty="0"/>
-            </a:br>
-            <a:r>
-              <a:rPr lang="en-US" dirty="0"/>
-              <a:t>ranking on </a:t>
-            </a:r>
-            <a:r>
-              <a:rPr lang="en-US" dirty="0" err="1"/>
-              <a:t>Stackoverflow.com</a:t>
-            </a:r>
-            <a:r>
-              <a:rPr lang="en-US" dirty="0"/>
-              <a:t>, where he primarily answers questions about R. </a:t>
-            </a:r>
-          </a:p>
-        </p:txBody>
-      </p:sp>
-      <p:pic>
-        <p:nvPicPr>
-          <p:cNvPr id="15" name="Picture 14">
-            <a:extLst>
-              <a:ext uri="{FF2B5EF4-FFF2-40B4-BE49-F238E27FC236}">
-                <a16:creationId xmlns:a16="http://schemas.microsoft.com/office/drawing/2014/main" id="{7BC9C847-7C77-4C44-8CB7-A571842D5092}"/>
-              </a:ext>
-            </a:extLst>
-          </p:cNvPr>
-          <p:cNvPicPr>
-            <a:picLocks noChangeAspect="1"/>
-          </p:cNvPicPr>
-          <p:nvPr/>
-        </p:nvPicPr>
-        <p:blipFill>
-          <a:blip r:embed="rId9"/>
-          <a:stretch>
-            <a:fillRect/>
-          </a:stretch>
-        </p:blipFill>
-        <p:spPr>
-          <a:xfrm>
-            <a:off x="803811" y="6115199"/>
-            <a:ext cx="2013926" cy="537047"/>
+            <a:off x="5542776" y="2205688"/>
+            <a:ext cx="5811024" cy="3926198"/>
           </a:xfrm>
           <a:prstGeom prst="rect">
             <a:avLst/>
@@ -7002,7 +6921,7 @@
     </p:spTree>
     <p:extLst>
       <p:ext uri="{BB962C8B-B14F-4D97-AF65-F5344CB8AC3E}">
-        <p14:creationId xmlns:p14="http://schemas.microsoft.com/office/powerpoint/2010/main" val="3418446521"/>
+        <p14:creationId xmlns:p14="http://schemas.microsoft.com/office/powerpoint/2010/main" val="4100078750"/>
       </p:ext>
     </p:extLst>
   </p:cSld>
@@ -7233,6 +7152,617 @@
     <p:extLst>
       <p:ext uri="{BB962C8B-B14F-4D97-AF65-F5344CB8AC3E}">
         <p14:creationId xmlns:p14="http://schemas.microsoft.com/office/powerpoint/2010/main" val="3812804173"/>
+      </p:ext>
+    </p:extLst>
+  </p:cSld>
+  <p:clrMapOvr>
+    <a:masterClrMapping/>
+  </p:clrMapOvr>
+</p:sld>
+</file>
+
+<file path=ppt/slides/slide30.xml><?xml version="1.0" encoding="utf-8"?>
+<p:sld xmlns:a="http://schemas.openxmlformats.org/drawingml/2006/main" xmlns:r="http://schemas.openxmlformats.org/officeDocument/2006/relationships" xmlns:p="http://schemas.openxmlformats.org/presentationml/2006/main">
+  <p:cSld>
+    <p:spTree>
+      <p:nvGrpSpPr>
+        <p:cNvPr id="1" name=""/>
+        <p:cNvGrpSpPr/>
+        <p:nvPr/>
+      </p:nvGrpSpPr>
+      <p:grpSpPr>
+        <a:xfrm>
+          <a:off x="0" y="0"/>
+          <a:ext cx="0" cy="0"/>
+          <a:chOff x="0" y="0"/>
+          <a:chExt cx="0" cy="0"/>
+        </a:xfrm>
+      </p:grpSpPr>
+      <p:sp>
+        <p:nvSpPr>
+          <p:cNvPr id="3" name="TextBox 2">
+            <a:extLst>
+              <a:ext uri="{FF2B5EF4-FFF2-40B4-BE49-F238E27FC236}">
+                <a16:creationId xmlns:a16="http://schemas.microsoft.com/office/drawing/2014/main" id="{D639DFBB-76B2-E64D-91BA-C82ACDE98D30}"/>
+              </a:ext>
+            </a:extLst>
+          </p:cNvPr>
+          <p:cNvSpPr txBox="1"/>
+          <p:nvPr/>
+        </p:nvSpPr>
+        <p:spPr>
+          <a:xfrm>
+            <a:off x="4526165" y="2967200"/>
+            <a:ext cx="3401893" cy="1569660"/>
+          </a:xfrm>
+          <a:prstGeom prst="rect">
+            <a:avLst/>
+          </a:prstGeom>
+          <a:noFill/>
+        </p:spPr>
+        <p:txBody>
+          <a:bodyPr wrap="none" rtlCol="0">
+            <a:spAutoFit/>
+          </a:bodyPr>
+          <a:lstStyle/>
+          <a:p>
+            <a:r>
+              <a:rPr lang="en-US" sz="9600" dirty="0"/>
+              <a:t>Q &amp; A </a:t>
+            </a:r>
+          </a:p>
+        </p:txBody>
+      </p:sp>
+    </p:spTree>
+    <p:extLst>
+      <p:ext uri="{BB962C8B-B14F-4D97-AF65-F5344CB8AC3E}">
+        <p14:creationId xmlns:p14="http://schemas.microsoft.com/office/powerpoint/2010/main" val="3085140371"/>
+      </p:ext>
+    </p:extLst>
+  </p:cSld>
+  <p:clrMapOvr>
+    <a:masterClrMapping/>
+  </p:clrMapOvr>
+</p:sld>
+</file>
+
+<file path=ppt/slides/slide31.xml><?xml version="1.0" encoding="utf-8"?>
+<p:sld xmlns:a="http://schemas.openxmlformats.org/drawingml/2006/main" xmlns:r="http://schemas.openxmlformats.org/officeDocument/2006/relationships" xmlns:p="http://schemas.openxmlformats.org/presentationml/2006/main">
+  <p:cSld>
+    <p:spTree>
+      <p:nvGrpSpPr>
+        <p:cNvPr id="1" name=""/>
+        <p:cNvGrpSpPr/>
+        <p:nvPr/>
+      </p:nvGrpSpPr>
+      <p:grpSpPr>
+        <a:xfrm>
+          <a:off x="0" y="0"/>
+          <a:ext cx="0" cy="0"/>
+          <a:chOff x="0" y="0"/>
+          <a:chExt cx="0" cy="0"/>
+        </a:xfrm>
+      </p:grpSpPr>
+      <p:sp>
+        <p:nvSpPr>
+          <p:cNvPr id="2" name="Title 1">
+            <a:extLst>
+              <a:ext uri="{FF2B5EF4-FFF2-40B4-BE49-F238E27FC236}">
+                <a16:creationId xmlns:a16="http://schemas.microsoft.com/office/drawing/2014/main" id="{6092EAB6-FFEF-B54D-886F-29B8FBD73691}"/>
+              </a:ext>
+            </a:extLst>
+          </p:cNvPr>
+          <p:cNvSpPr>
+            <a:spLocks noGrp="1"/>
+          </p:cNvSpPr>
+          <p:nvPr>
+            <p:ph type="title"/>
+          </p:nvPr>
+        </p:nvSpPr>
+        <p:spPr/>
+        <p:txBody>
+          <a:bodyPr/>
+          <a:lstStyle/>
+          <a:p>
+            <a:r>
+              <a:rPr lang="en-US" dirty="0"/>
+              <a:t>About Len</a:t>
+            </a:r>
+          </a:p>
+        </p:txBody>
+      </p:sp>
+      <p:pic>
+        <p:nvPicPr>
+          <p:cNvPr id="4" name="Picture 3">
+            <a:extLst>
+              <a:ext uri="{FF2B5EF4-FFF2-40B4-BE49-F238E27FC236}">
+                <a16:creationId xmlns:a16="http://schemas.microsoft.com/office/drawing/2014/main" id="{F5842CDC-9BCF-ED4A-B142-F82CFFC48374}"/>
+              </a:ext>
+            </a:extLst>
+          </p:cNvPr>
+          <p:cNvPicPr>
+            <a:picLocks noChangeAspect="1"/>
+          </p:cNvPicPr>
+          <p:nvPr/>
+        </p:nvPicPr>
+        <p:blipFill>
+          <a:blip r:embed="rId2"/>
+          <a:stretch>
+            <a:fillRect/>
+          </a:stretch>
+        </p:blipFill>
+        <p:spPr>
+          <a:xfrm>
+            <a:off x="838200" y="1487692"/>
+            <a:ext cx="1828800" cy="1848679"/>
+          </a:xfrm>
+          <a:prstGeom prst="rect">
+            <a:avLst/>
+          </a:prstGeom>
+        </p:spPr>
+      </p:pic>
+      <p:sp>
+        <p:nvSpPr>
+          <p:cNvPr id="5" name="TextBox 4">
+            <a:extLst>
+              <a:ext uri="{FF2B5EF4-FFF2-40B4-BE49-F238E27FC236}">
+                <a16:creationId xmlns:a16="http://schemas.microsoft.com/office/drawing/2014/main" id="{6414056E-90F6-7344-ACA0-21B67F079388}"/>
+              </a:ext>
+            </a:extLst>
+          </p:cNvPr>
+          <p:cNvSpPr txBox="1"/>
+          <p:nvPr/>
+        </p:nvSpPr>
+        <p:spPr>
+          <a:xfrm>
+            <a:off x="1456297" y="3810270"/>
+            <a:ext cx="2116605" cy="369332"/>
+          </a:xfrm>
+          <a:prstGeom prst="rect">
+            <a:avLst/>
+          </a:prstGeom>
+          <a:noFill/>
+        </p:spPr>
+        <p:txBody>
+          <a:bodyPr wrap="none" rtlCol="0">
+            <a:spAutoFit/>
+          </a:bodyPr>
+          <a:lstStyle/>
+          <a:p>
+            <a:r>
+              <a:rPr lang="en-US" dirty="0"/>
+              <a:t> </a:t>
+            </a:r>
+            <a:r>
+              <a:rPr lang="en-US" dirty="0">
+                <a:hlinkClick r:id="rId3"/>
+              </a:rPr>
+              <a:t>len@greskilabs.com</a:t>
+            </a:r>
+            <a:endParaRPr lang="en-US" dirty="0"/>
+          </a:p>
+        </p:txBody>
+      </p:sp>
+      <p:pic>
+        <p:nvPicPr>
+          <p:cNvPr id="6" name="Picture 5">
+            <a:extLst>
+              <a:ext uri="{FF2B5EF4-FFF2-40B4-BE49-F238E27FC236}">
+                <a16:creationId xmlns:a16="http://schemas.microsoft.com/office/drawing/2014/main" id="{C78A498D-59ED-254A-8EA3-0F3D3158DAB6}"/>
+              </a:ext>
+            </a:extLst>
+          </p:cNvPr>
+          <p:cNvPicPr>
+            <a:picLocks noChangeAspect="1"/>
+          </p:cNvPicPr>
+          <p:nvPr/>
+        </p:nvPicPr>
+        <p:blipFill>
+          <a:blip r:embed="rId4"/>
+          <a:stretch>
+            <a:fillRect/>
+          </a:stretch>
+        </p:blipFill>
+        <p:spPr>
+          <a:xfrm>
+            <a:off x="912737" y="4410881"/>
+            <a:ext cx="355600" cy="368300"/>
+          </a:xfrm>
+          <a:prstGeom prst="rect">
+            <a:avLst/>
+          </a:prstGeom>
+        </p:spPr>
+      </p:pic>
+      <p:pic>
+        <p:nvPicPr>
+          <p:cNvPr id="7" name="Picture 6">
+            <a:extLst>
+              <a:ext uri="{FF2B5EF4-FFF2-40B4-BE49-F238E27FC236}">
+                <a16:creationId xmlns:a16="http://schemas.microsoft.com/office/drawing/2014/main" id="{8564C8CC-7A1B-5848-BB26-0560A3F83B9A}"/>
+              </a:ext>
+            </a:extLst>
+          </p:cNvPr>
+          <p:cNvPicPr>
+            <a:picLocks noChangeAspect="1"/>
+          </p:cNvPicPr>
+          <p:nvPr/>
+        </p:nvPicPr>
+        <p:blipFill>
+          <a:blip r:embed="rId5"/>
+          <a:stretch>
+            <a:fillRect/>
+          </a:stretch>
+        </p:blipFill>
+        <p:spPr>
+          <a:xfrm>
+            <a:off x="882257" y="3810270"/>
+            <a:ext cx="419100" cy="419100"/>
+          </a:xfrm>
+          <a:prstGeom prst="rect">
+            <a:avLst/>
+          </a:prstGeom>
+        </p:spPr>
+      </p:pic>
+      <p:sp>
+        <p:nvSpPr>
+          <p:cNvPr id="8" name="TextBox 7">
+            <a:extLst>
+              <a:ext uri="{FF2B5EF4-FFF2-40B4-BE49-F238E27FC236}">
+                <a16:creationId xmlns:a16="http://schemas.microsoft.com/office/drawing/2014/main" id="{C121EDAC-2901-CC45-A0A7-8D75B4C1AB41}"/>
+              </a:ext>
+            </a:extLst>
+          </p:cNvPr>
+          <p:cNvSpPr txBox="1"/>
+          <p:nvPr/>
+        </p:nvSpPr>
+        <p:spPr>
+          <a:xfrm>
+            <a:off x="1456297" y="4296832"/>
+            <a:ext cx="838884" cy="369332"/>
+          </a:xfrm>
+          <a:prstGeom prst="rect">
+            <a:avLst/>
+          </a:prstGeom>
+          <a:noFill/>
+        </p:spPr>
+        <p:txBody>
+          <a:bodyPr wrap="none" rtlCol="0">
+            <a:spAutoFit/>
+          </a:bodyPr>
+          <a:lstStyle/>
+          <a:p>
+            <a:r>
+              <a:rPr lang="en-US" dirty="0"/>
+              <a:t> </a:t>
+            </a:r>
+            <a:r>
+              <a:rPr lang="en-US" dirty="0" err="1"/>
+              <a:t>lgreski</a:t>
+            </a:r>
+            <a:endParaRPr lang="en-US" dirty="0"/>
+          </a:p>
+        </p:txBody>
+      </p:sp>
+      <p:sp>
+        <p:nvSpPr>
+          <p:cNvPr id="9" name="TextBox 8">
+            <a:extLst>
+              <a:ext uri="{FF2B5EF4-FFF2-40B4-BE49-F238E27FC236}">
+                <a16:creationId xmlns:a16="http://schemas.microsoft.com/office/drawing/2014/main" id="{F66CC08F-50EB-9442-9382-9749498C8D6E}"/>
+              </a:ext>
+            </a:extLst>
+          </p:cNvPr>
+          <p:cNvSpPr txBox="1"/>
+          <p:nvPr/>
+        </p:nvSpPr>
+        <p:spPr>
+          <a:xfrm>
+            <a:off x="1456297" y="4609946"/>
+            <a:ext cx="8283101" cy="369332"/>
+          </a:xfrm>
+          <a:prstGeom prst="rect">
+            <a:avLst/>
+          </a:prstGeom>
+          <a:noFill/>
+        </p:spPr>
+        <p:txBody>
+          <a:bodyPr wrap="none" rtlCol="0">
+            <a:spAutoFit/>
+          </a:bodyPr>
+          <a:lstStyle/>
+          <a:p>
+            <a:r>
+              <a:rPr lang="en-US" dirty="0"/>
+              <a:t> </a:t>
+            </a:r>
+            <a:r>
+              <a:rPr lang="en-US" dirty="0" err="1"/>
+              <a:t>lgreski</a:t>
+            </a:r>
+            <a:r>
+              <a:rPr lang="en-US" dirty="0"/>
+              <a:t>/</a:t>
+            </a:r>
+            <a:r>
+              <a:rPr lang="en-US" dirty="0" err="1"/>
+              <a:t>readingFilesInR</a:t>
+            </a:r>
+            <a:r>
+              <a:rPr lang="en-US" dirty="0"/>
+              <a:t> – repository where tonight’s code and presentation are stored </a:t>
+            </a:r>
+          </a:p>
+        </p:txBody>
+      </p:sp>
+      <p:pic>
+        <p:nvPicPr>
+          <p:cNvPr id="10" name="Picture 9">
+            <a:extLst>
+              <a:ext uri="{FF2B5EF4-FFF2-40B4-BE49-F238E27FC236}">
+                <a16:creationId xmlns:a16="http://schemas.microsoft.com/office/drawing/2014/main" id="{939D18BB-69F5-B443-91B0-AB1B112D102A}"/>
+              </a:ext>
+            </a:extLst>
+          </p:cNvPr>
+          <p:cNvPicPr>
+            <a:picLocks noChangeAspect="1"/>
+          </p:cNvPicPr>
+          <p:nvPr/>
+        </p:nvPicPr>
+        <p:blipFill>
+          <a:blip r:embed="rId6"/>
+          <a:stretch>
+            <a:fillRect/>
+          </a:stretch>
+        </p:blipFill>
+        <p:spPr>
+          <a:xfrm>
+            <a:off x="894957" y="5026221"/>
+            <a:ext cx="406400" cy="406400"/>
+          </a:xfrm>
+          <a:prstGeom prst="rect">
+            <a:avLst/>
+          </a:prstGeom>
+        </p:spPr>
+      </p:pic>
+      <p:sp>
+        <p:nvSpPr>
+          <p:cNvPr id="11" name="TextBox 10">
+            <a:extLst>
+              <a:ext uri="{FF2B5EF4-FFF2-40B4-BE49-F238E27FC236}">
+                <a16:creationId xmlns:a16="http://schemas.microsoft.com/office/drawing/2014/main" id="{821E509B-E0B5-984D-8495-D099B3C62B4E}"/>
+              </a:ext>
+            </a:extLst>
+          </p:cNvPr>
+          <p:cNvSpPr txBox="1"/>
+          <p:nvPr/>
+        </p:nvSpPr>
+        <p:spPr>
+          <a:xfrm>
+            <a:off x="1456297" y="5044755"/>
+            <a:ext cx="838884" cy="369332"/>
+          </a:xfrm>
+          <a:prstGeom prst="rect">
+            <a:avLst/>
+          </a:prstGeom>
+          <a:noFill/>
+        </p:spPr>
+        <p:txBody>
+          <a:bodyPr wrap="none" rtlCol="0">
+            <a:spAutoFit/>
+          </a:bodyPr>
+          <a:lstStyle/>
+          <a:p>
+            <a:r>
+              <a:rPr lang="en-US" dirty="0"/>
+              <a:t> </a:t>
+            </a:r>
+            <a:r>
+              <a:rPr lang="en-US" dirty="0" err="1"/>
+              <a:t>lgreski</a:t>
+            </a:r>
+            <a:endParaRPr lang="en-US" dirty="0"/>
+          </a:p>
+        </p:txBody>
+      </p:sp>
+      <p:pic>
+        <p:nvPicPr>
+          <p:cNvPr id="12" name="Picture 11">
+            <a:extLst>
+              <a:ext uri="{FF2B5EF4-FFF2-40B4-BE49-F238E27FC236}">
+                <a16:creationId xmlns:a16="http://schemas.microsoft.com/office/drawing/2014/main" id="{E258D6E7-31DF-B841-B3A5-67880E34E6C6}"/>
+              </a:ext>
+            </a:extLst>
+          </p:cNvPr>
+          <p:cNvPicPr>
+            <a:picLocks noChangeAspect="1"/>
+          </p:cNvPicPr>
+          <p:nvPr/>
+        </p:nvPicPr>
+        <p:blipFill>
+          <a:blip r:embed="rId7"/>
+          <a:stretch>
+            <a:fillRect/>
+          </a:stretch>
+        </p:blipFill>
+        <p:spPr>
+          <a:xfrm>
+            <a:off x="822013" y="5531999"/>
+            <a:ext cx="537047" cy="537047"/>
+          </a:xfrm>
+          <a:prstGeom prst="rect">
+            <a:avLst/>
+          </a:prstGeom>
+        </p:spPr>
+      </p:pic>
+      <p:sp>
+        <p:nvSpPr>
+          <p:cNvPr id="13" name="TextBox 12">
+            <a:extLst>
+              <a:ext uri="{FF2B5EF4-FFF2-40B4-BE49-F238E27FC236}">
+                <a16:creationId xmlns:a16="http://schemas.microsoft.com/office/drawing/2014/main" id="{C7BC55D7-BE16-0543-9D90-8400CC766953}"/>
+              </a:ext>
+            </a:extLst>
+          </p:cNvPr>
+          <p:cNvSpPr txBox="1"/>
+          <p:nvPr/>
+        </p:nvSpPr>
+        <p:spPr>
+          <a:xfrm>
+            <a:off x="1456297" y="5615856"/>
+            <a:ext cx="6703182" cy="369332"/>
+          </a:xfrm>
+          <a:prstGeom prst="rect">
+            <a:avLst/>
+          </a:prstGeom>
+          <a:noFill/>
+        </p:spPr>
+        <p:txBody>
+          <a:bodyPr wrap="none" rtlCol="0">
+            <a:spAutoFit/>
+          </a:bodyPr>
+          <a:lstStyle/>
+          <a:p>
+            <a:r>
+              <a:rPr lang="en-US" dirty="0"/>
+              <a:t> Data Science Depot blog: </a:t>
+            </a:r>
+            <a:r>
+              <a:rPr lang="en-US" dirty="0">
+                <a:hlinkClick r:id="rId8"/>
+              </a:rPr>
+              <a:t>https://lgreski.github.io/datasciencedepot/</a:t>
+            </a:r>
+            <a:r>
+              <a:rPr lang="en-US" dirty="0"/>
+              <a:t> </a:t>
+            </a:r>
+          </a:p>
+        </p:txBody>
+      </p:sp>
+      <p:sp>
+        <p:nvSpPr>
+          <p:cNvPr id="14" name="TextBox 13">
+            <a:extLst>
+              <a:ext uri="{FF2B5EF4-FFF2-40B4-BE49-F238E27FC236}">
+                <a16:creationId xmlns:a16="http://schemas.microsoft.com/office/drawing/2014/main" id="{A9F10A48-1AA5-F144-818F-BACDFEE8248C}"/>
+              </a:ext>
+            </a:extLst>
+          </p:cNvPr>
+          <p:cNvSpPr txBox="1"/>
+          <p:nvPr/>
+        </p:nvSpPr>
+        <p:spPr>
+          <a:xfrm>
+            <a:off x="2865120" y="1384844"/>
+            <a:ext cx="8883009" cy="2308324"/>
+          </a:xfrm>
+          <a:prstGeom prst="rect">
+            <a:avLst/>
+          </a:prstGeom>
+          <a:noFill/>
+        </p:spPr>
+        <p:txBody>
+          <a:bodyPr wrap="none" rtlCol="0">
+            <a:spAutoFit/>
+          </a:bodyPr>
+          <a:lstStyle/>
+          <a:p>
+            <a:r>
+              <a:rPr lang="en-US" dirty="0"/>
+              <a:t>Len Greski currently serves as Principal Consultant at LeadingAgile, the leader in helping large</a:t>
+            </a:r>
+            <a:br>
+              <a:rPr lang="en-US" dirty="0"/>
+            </a:br>
+            <a:r>
+              <a:rPr lang="en-US" dirty="0"/>
+              <a:t>companies generate economic value through agile transformation. Len started his </a:t>
+            </a:r>
+            <a:br>
+              <a:rPr lang="en-US" dirty="0"/>
+            </a:br>
+            <a:r>
+              <a:rPr lang="en-US" dirty="0"/>
+              <a:t>career at Information Resources Inc., developing statistical and AI models to predict</a:t>
+            </a:r>
+            <a:br>
+              <a:rPr lang="en-US" dirty="0"/>
+            </a:br>
+            <a:r>
+              <a:rPr lang="en-US" dirty="0"/>
+              <a:t>consumer behavior. He learned R in 2015 when he needed a way to analyze the value of a </a:t>
+            </a:r>
+            <a:br>
+              <a:rPr lang="en-US" dirty="0"/>
+            </a:br>
+            <a:r>
+              <a:rPr lang="en-US" dirty="0"/>
+              <a:t>software portfolio without spending $9,000 on a copy of SAS.  Len has mentored hundreds </a:t>
+            </a:r>
+          </a:p>
+          <a:p>
+            <a:r>
+              <a:rPr lang="en-US" dirty="0"/>
+              <a:t>of thousands of students in the Johns Hopkins University Data Science Specialization on </a:t>
+            </a:r>
+          </a:p>
+          <a:p>
+            <a:r>
+              <a:rPr lang="en-US" dirty="0"/>
+              <a:t>Coursera, having served as a Community Mentor since 2015.  Len has a top 5% </a:t>
+            </a:r>
+            <a:br>
+              <a:rPr lang="en-US" dirty="0"/>
+            </a:br>
+            <a:r>
+              <a:rPr lang="en-US" dirty="0"/>
+              <a:t>ranking on </a:t>
+            </a:r>
+            <a:r>
+              <a:rPr lang="en-US" dirty="0" err="1"/>
+              <a:t>Stackoverflow.com</a:t>
+            </a:r>
+            <a:r>
+              <a:rPr lang="en-US" dirty="0"/>
+              <a:t>, where he primarily answers questions about R. </a:t>
+            </a:r>
+          </a:p>
+        </p:txBody>
+      </p:sp>
+      <p:pic>
+        <p:nvPicPr>
+          <p:cNvPr id="15" name="Picture 14">
+            <a:extLst>
+              <a:ext uri="{FF2B5EF4-FFF2-40B4-BE49-F238E27FC236}">
+                <a16:creationId xmlns:a16="http://schemas.microsoft.com/office/drawing/2014/main" id="{7BC9C847-7C77-4C44-8CB7-A571842D5092}"/>
+              </a:ext>
+            </a:extLst>
+          </p:cNvPr>
+          <p:cNvPicPr>
+            <a:picLocks noChangeAspect="1"/>
+          </p:cNvPicPr>
+          <p:nvPr/>
+        </p:nvPicPr>
+        <p:blipFill>
+          <a:blip r:embed="rId9"/>
+          <a:stretch>
+            <a:fillRect/>
+          </a:stretch>
+        </p:blipFill>
+        <p:spPr>
+          <a:xfrm>
+            <a:off x="803811" y="6115199"/>
+            <a:ext cx="2013926" cy="537047"/>
+          </a:xfrm>
+          <a:prstGeom prst="rect">
+            <a:avLst/>
+          </a:prstGeom>
+        </p:spPr>
+      </p:pic>
+    </p:spTree>
+    <p:extLst>
+      <p:ext uri="{BB962C8B-B14F-4D97-AF65-F5344CB8AC3E}">
+        <p14:creationId xmlns:p14="http://schemas.microsoft.com/office/powerpoint/2010/main" val="3418446521"/>
       </p:ext>
     </p:extLst>
   </p:cSld>

</xml_diff>